<commit_message>
product / progress slides
</commit_message>
<xml_diff>
--- a/own-me-pitch.pptx
+++ b/own-me-pitch.pptx
@@ -10,12 +10,13 @@
     <p:sldId id="258" r:id="rId4"/>
     <p:sldId id="259" r:id="rId5"/>
     <p:sldId id="265" r:id="rId6"/>
-    <p:sldId id="260" r:id="rId7"/>
-    <p:sldId id="261" r:id="rId8"/>
-    <p:sldId id="262" r:id="rId9"/>
-    <p:sldId id="263" r:id="rId10"/>
-    <p:sldId id="264" r:id="rId11"/>
-    <p:sldId id="266" r:id="rId12"/>
+    <p:sldId id="267" r:id="rId7"/>
+    <p:sldId id="268" r:id="rId8"/>
+    <p:sldId id="260" r:id="rId9"/>
+    <p:sldId id="261" r:id="rId10"/>
+    <p:sldId id="262" r:id="rId11"/>
+    <p:sldId id="263" r:id="rId12"/>
+    <p:sldId id="264" r:id="rId13"/>
   </p:sldIdLst>
   <p:sldSz cx="12192000" cy="6858000"/>
   <p:notesSz cx="6858000" cy="9144000"/>
@@ -3769,7 +3770,7 @@
           <p:cNvPr id="2" name="Title 1">
             <a:extLst>
               <a:ext uri="{FF2B5EF4-FFF2-40B4-BE49-F238E27FC236}">
-                <a16:creationId xmlns:a16="http://schemas.microsoft.com/office/drawing/2014/main" id="{A7BE9879-6337-419D-994C-BD4650A6FB10}"/>
+                <a16:creationId xmlns:a16="http://schemas.microsoft.com/office/drawing/2014/main" id="{73C4E103-203C-4E4F-97B0-23C6EF7FD9F2}"/>
               </a:ext>
             </a:extLst>
           </p:cNvPr>
@@ -3780,25 +3781,18 @@
             <p:ph type="title"/>
           </p:nvPr>
         </p:nvSpPr>
-        <p:spPr>
-          <a:xfrm>
-            <a:off x="838200" y="395257"/>
-            <a:ext cx="10246688" cy="1295431"/>
-          </a:xfrm>
-        </p:spPr>
-        <p:txBody>
-          <a:bodyPr>
-            <a:normAutofit/>
-          </a:bodyPr>
-          <a:lstStyle/>
-          <a:p>
-            <a:r>
-              <a:rPr lang="en-US" sz="4000" dirty="0">
+        <p:spPr/>
+        <p:txBody>
+          <a:bodyPr/>
+          <a:lstStyle/>
+          <a:p>
+            <a:r>
+              <a:rPr lang="en-US" dirty="0">
                 <a:latin typeface="Yeseva One" panose="00000500000000000000" pitchFamily="2" charset="0"/>
               </a:rPr>
-              <a:t>Why are we better then everyone else?</a:t>
-            </a:r>
-            <a:endParaRPr lang="en-CA" sz="4000" dirty="0"/>
+              <a:t>How do we make money?</a:t>
+            </a:r>
+            <a:endParaRPr lang="en-CA" dirty="0"/>
           </a:p>
         </p:txBody>
       </p:sp>
@@ -3807,7 +3801,7 @@
           <p:cNvPr id="3" name="Content Placeholder 2">
             <a:extLst>
               <a:ext uri="{FF2B5EF4-FFF2-40B4-BE49-F238E27FC236}">
-                <a16:creationId xmlns:a16="http://schemas.microsoft.com/office/drawing/2014/main" id="{2DA3F201-2856-41F8-9404-A21C6063907F}"/>
+                <a16:creationId xmlns:a16="http://schemas.microsoft.com/office/drawing/2014/main" id="{599A44D3-BED2-4D82-BD38-AC3F2CE02450}"/>
               </a:ext>
             </a:extLst>
           </p:cNvPr>
@@ -3818,130 +3812,150 @@
             <p:ph idx="1"/>
           </p:nvPr>
         </p:nvSpPr>
-        <p:spPr/>
-        <p:txBody>
-          <a:bodyPr>
-            <a:normAutofit fontScale="85000" lnSpcReduction="10000"/>
-          </a:bodyPr>
-          <a:lstStyle/>
-          <a:p>
-            <a:pPr>
-              <a:lnSpc>
-                <a:spcPct val="110000"/>
-              </a:lnSpc>
-            </a:pPr>
+        <p:spPr>
+          <a:xfrm>
+            <a:off x="838200" y="1825625"/>
+            <a:ext cx="5969655" cy="4351338"/>
+          </a:xfrm>
+        </p:spPr>
+        <p:txBody>
+          <a:bodyPr/>
+          <a:lstStyle/>
+          <a:p>
             <a:r>
               <a:rPr lang="en-US" dirty="0">
                 <a:latin typeface="Poppins Light" panose="00000400000000000000" pitchFamily="2" charset="0"/>
                 <a:cs typeface="Poppins Light" panose="00000400000000000000" pitchFamily="2" charset="0"/>
               </a:rPr>
-              <a:t>Lowball transaction fees. They charge 20%, we charge 10%.</a:t>
-            </a:r>
-          </a:p>
-          <a:p>
-            <a:pPr>
-              <a:lnSpc>
-                <a:spcPct val="110000"/>
-              </a:lnSpc>
-            </a:pPr>
-            <a:r>
-              <a:rPr lang="en-US" dirty="0">
-                <a:latin typeface="Poppins Light" panose="00000400000000000000" pitchFamily="2" charset="0"/>
-                <a:cs typeface="Poppins Light" panose="00000400000000000000" pitchFamily="2" charset="0"/>
-              </a:rPr>
-              <a:t>Blockchain, not dependent on big banks, hard to cancel.</a:t>
-            </a:r>
-          </a:p>
-          <a:p>
-            <a:pPr>
-              <a:lnSpc>
-                <a:spcPct val="110000"/>
-              </a:lnSpc>
-            </a:pPr>
-            <a:r>
-              <a:rPr lang="en-US" dirty="0">
-                <a:latin typeface="Poppins Light" panose="00000400000000000000" pitchFamily="2" charset="0"/>
-                <a:cs typeface="Poppins Light" panose="00000400000000000000" pitchFamily="2" charset="0"/>
-              </a:rPr>
-              <a:t>Lead founder / CEO is an experienced, talented, software engineer.</a:t>
-            </a:r>
-          </a:p>
-          <a:p>
-            <a:pPr>
-              <a:lnSpc>
-                <a:spcPct val="110000"/>
-              </a:lnSpc>
-            </a:pPr>
-            <a:r>
-              <a:rPr lang="en-US" dirty="0">
-                <a:latin typeface="Poppins Light" panose="00000400000000000000" pitchFamily="2" charset="0"/>
-                <a:cs typeface="Poppins Light" panose="00000400000000000000" pitchFamily="2" charset="0"/>
-              </a:rPr>
-              <a:t>We have a niched product design specific for adult content.</a:t>
-            </a:r>
-          </a:p>
-          <a:p>
-            <a:pPr>
-              <a:lnSpc>
-                <a:spcPct val="110000"/>
-              </a:lnSpc>
-            </a:pPr>
-            <a:r>
-              <a:rPr lang="en-US" dirty="0">
-                <a:latin typeface="Poppins Light" panose="00000400000000000000" pitchFamily="2" charset="0"/>
-                <a:cs typeface="Poppins Light" panose="00000400000000000000" pitchFamily="2" charset="0"/>
-              </a:rPr>
-              <a:t>We have innovative ideas that have never been done before.</a:t>
-            </a:r>
-          </a:p>
-          <a:p>
-            <a:pPr>
-              <a:lnSpc>
-                <a:spcPct val="110000"/>
-              </a:lnSpc>
-            </a:pPr>
-            <a:r>
-              <a:rPr lang="en-US" dirty="0">
-                <a:latin typeface="Poppins Light" panose="00000400000000000000" pitchFamily="2" charset="0"/>
-                <a:cs typeface="Poppins Light" panose="00000400000000000000" pitchFamily="2" charset="0"/>
-              </a:rPr>
-              <a:t>We are smaller, fresher, can pivot, adapt quicker.</a:t>
-            </a:r>
-          </a:p>
-          <a:p>
-            <a:pPr>
-              <a:lnSpc>
-                <a:spcPct val="110000"/>
-              </a:lnSpc>
-            </a:pPr>
+              <a:t>10% cut on each transaction. </a:t>
+            </a:r>
+          </a:p>
+          <a:p>
             <a:r>
               <a:rPr lang="en-CA" dirty="0">
                 <a:latin typeface="Poppins Light" panose="00000400000000000000" pitchFamily="2" charset="0"/>
                 <a:cs typeface="Poppins Light" panose="00000400000000000000" pitchFamily="2" charset="0"/>
               </a:rPr>
-              <a:t>We combine the crypto, social media and adult content industries.</a:t>
-            </a:r>
-          </a:p>
-          <a:p>
-            <a:pPr>
-              <a:lnSpc>
-                <a:spcPct val="110000"/>
-              </a:lnSpc>
-            </a:pPr>
+              <a:t>Celebrity promotions. </a:t>
+            </a:r>
+          </a:p>
+          <a:p>
             <a:r>
               <a:rPr lang="en-CA" dirty="0">
                 <a:latin typeface="Poppins Light" panose="00000400000000000000" pitchFamily="2" charset="0"/>
                 <a:cs typeface="Poppins Light" panose="00000400000000000000" pitchFamily="2" charset="0"/>
               </a:rPr>
-              <a:t>We are not rich yet and are more hungry then the fat cats.</a:t>
-            </a:r>
-          </a:p>
-        </p:txBody>
-      </p:sp>
+              <a:t>Company plugs.</a:t>
+            </a:r>
+          </a:p>
+          <a:p>
+            <a:r>
+              <a:rPr lang="en-CA" dirty="0">
+                <a:latin typeface="Poppins Light" panose="00000400000000000000" pitchFamily="2" charset="0"/>
+                <a:cs typeface="Poppins Light" panose="00000400000000000000" pitchFamily="2" charset="0"/>
+              </a:rPr>
+              <a:t>Advertisements.</a:t>
+            </a:r>
+          </a:p>
+          <a:p>
+            <a:r>
+              <a:rPr lang="en-CA" dirty="0">
+                <a:latin typeface="Poppins Light" panose="00000400000000000000" pitchFamily="2" charset="0"/>
+                <a:cs typeface="Poppins Light" panose="00000400000000000000" pitchFamily="2" charset="0"/>
+              </a:rPr>
+              <a:t>Merch.</a:t>
+            </a:r>
+          </a:p>
+          <a:p>
+            <a:r>
+              <a:rPr lang="en-CA" dirty="0">
+                <a:latin typeface="Poppins Light" panose="00000400000000000000" pitchFamily="2" charset="0"/>
+                <a:cs typeface="Poppins Light" panose="00000400000000000000" pitchFamily="2" charset="0"/>
+              </a:rPr>
+              <a:t>Crypto. $NUDE token.</a:t>
+            </a:r>
+          </a:p>
+          <a:p>
+            <a:endParaRPr lang="en-CA" dirty="0"/>
+          </a:p>
+        </p:txBody>
+      </p:sp>
+      <p:pic>
+        <p:nvPicPr>
+          <p:cNvPr id="5" name="Picture 4">
+            <a:extLst>
+              <a:ext uri="{FF2B5EF4-FFF2-40B4-BE49-F238E27FC236}">
+                <a16:creationId xmlns:a16="http://schemas.microsoft.com/office/drawing/2014/main" id="{313110A8-4B4D-43E9-A94D-69FF1E4BE2BB}"/>
+              </a:ext>
+            </a:extLst>
+          </p:cNvPr>
+          <p:cNvPicPr>
+            <a:picLocks noChangeAspect="1"/>
+          </p:cNvPicPr>
+          <p:nvPr/>
+        </p:nvPicPr>
+        <p:blipFill>
+          <a:blip r:embed="rId2">
+            <a:extLst>
+              <a:ext uri="{28A0092B-C50C-407E-A947-70E740481C1C}">
+                <a14:useLocalDpi xmlns:a14="http://schemas.microsoft.com/office/drawing/2010/main" val="0"/>
+              </a:ext>
+            </a:extLst>
+          </a:blip>
+          <a:stretch>
+            <a:fillRect/>
+          </a:stretch>
+        </p:blipFill>
+        <p:spPr>
+          <a:xfrm>
+            <a:off x="11300819" y="312780"/>
+            <a:ext cx="519030" cy="519030"/>
+          </a:xfrm>
+          <a:prstGeom prst="rect">
+            <a:avLst/>
+          </a:prstGeom>
+        </p:spPr>
+      </p:pic>
+      <p:pic>
+        <p:nvPicPr>
+          <p:cNvPr id="6" name="Picture 5">
+            <a:extLst>
+              <a:ext uri="{FF2B5EF4-FFF2-40B4-BE49-F238E27FC236}">
+                <a16:creationId xmlns:a16="http://schemas.microsoft.com/office/drawing/2014/main" id="{45BCCCF6-BDD6-4B6E-8769-7B01C1160510}"/>
+              </a:ext>
+            </a:extLst>
+          </p:cNvPr>
+          <p:cNvPicPr>
+            <a:picLocks noChangeAspect="1"/>
+          </p:cNvPicPr>
+          <p:nvPr/>
+        </p:nvPicPr>
+        <p:blipFill>
+          <a:blip r:embed="rId3">
+            <a:extLst>
+              <a:ext uri="{28A0092B-C50C-407E-A947-70E740481C1C}">
+                <a14:useLocalDpi xmlns:a14="http://schemas.microsoft.com/office/drawing/2010/main" val="0"/>
+              </a:ext>
+            </a:extLst>
+          </a:blip>
+          <a:stretch>
+            <a:fillRect/>
+          </a:stretch>
+        </p:blipFill>
+        <p:spPr>
+          <a:xfrm>
+            <a:off x="7505945" y="3002772"/>
+            <a:ext cx="2796442" cy="2796442"/>
+          </a:xfrm>
+          <a:prstGeom prst="rect">
+            <a:avLst/>
+          </a:prstGeom>
+        </p:spPr>
+      </p:pic>
     </p:spTree>
     <p:extLst>
       <p:ext uri="{BB962C8B-B14F-4D97-AF65-F5344CB8AC3E}">
-        <p14:creationId xmlns:p14="http://schemas.microsoft.com/office/powerpoint/2010/main" val="539992873"/>
+        <p14:creationId xmlns:p14="http://schemas.microsoft.com/office/powerpoint/2010/main" val="625031941"/>
       </p:ext>
     </p:extLst>
   </p:cSld>
@@ -3973,7 +3987,7 @@
           <p:cNvPr id="2" name="Title 1">
             <a:extLst>
               <a:ext uri="{FF2B5EF4-FFF2-40B4-BE49-F238E27FC236}">
-                <a16:creationId xmlns:a16="http://schemas.microsoft.com/office/drawing/2014/main" id="{9764E327-F01A-4B64-B8BE-0F5EA70B2BBA}"/>
+                <a16:creationId xmlns:a16="http://schemas.microsoft.com/office/drawing/2014/main" id="{5A7D9E14-614B-4A34-A711-812427B03D19}"/>
               </a:ext>
             </a:extLst>
           </p:cNvPr>
@@ -3990,19 +4004,314 @@
           <a:lstStyle/>
           <a:p>
             <a:r>
+              <a:rPr lang="en-US" dirty="0">
+                <a:latin typeface="Yeseva One" panose="00000500000000000000" pitchFamily="2" charset="0"/>
+              </a:rPr>
+              <a:t>Our Competition</a:t>
+            </a:r>
+            <a:endParaRPr lang="en-CA" dirty="0"/>
+          </a:p>
+        </p:txBody>
+      </p:sp>
+      <p:pic>
+        <p:nvPicPr>
+          <p:cNvPr id="5" name="Picture 4">
+            <a:extLst>
+              <a:ext uri="{FF2B5EF4-FFF2-40B4-BE49-F238E27FC236}">
+                <a16:creationId xmlns:a16="http://schemas.microsoft.com/office/drawing/2014/main" id="{0D8AA00E-2FA8-436C-93AF-81D3B677D479}"/>
+              </a:ext>
+            </a:extLst>
+          </p:cNvPr>
+          <p:cNvPicPr>
+            <a:picLocks noChangeAspect="1"/>
+          </p:cNvPicPr>
+          <p:nvPr/>
+        </p:nvPicPr>
+        <p:blipFill>
+          <a:blip r:embed="rId2">
+            <a:extLst>
+              <a:ext uri="{28A0092B-C50C-407E-A947-70E740481C1C}">
+                <a14:useLocalDpi xmlns:a14="http://schemas.microsoft.com/office/drawing/2010/main" val="0"/>
+              </a:ext>
+            </a:extLst>
+          </a:blip>
+          <a:stretch>
+            <a:fillRect/>
+          </a:stretch>
+        </p:blipFill>
+        <p:spPr>
+          <a:xfrm>
+            <a:off x="7275533" y="1873668"/>
+            <a:ext cx="2600325" cy="638175"/>
+          </a:xfrm>
+          <a:prstGeom prst="rect">
+            <a:avLst/>
+          </a:prstGeom>
+        </p:spPr>
+      </p:pic>
+      <p:pic>
+        <p:nvPicPr>
+          <p:cNvPr id="7" name="Picture 6">
+            <a:extLst>
+              <a:ext uri="{FF2B5EF4-FFF2-40B4-BE49-F238E27FC236}">
+                <a16:creationId xmlns:a16="http://schemas.microsoft.com/office/drawing/2014/main" id="{95D5B2F7-E7EA-4F59-9EBB-DBD901D8A269}"/>
+              </a:ext>
+            </a:extLst>
+          </p:cNvPr>
+          <p:cNvPicPr>
+            <a:picLocks noChangeAspect="1"/>
+          </p:cNvPicPr>
+          <p:nvPr/>
+        </p:nvPicPr>
+        <p:blipFill>
+          <a:blip r:embed="rId3">
+            <a:extLst>
+              <a:ext uri="{28A0092B-C50C-407E-A947-70E740481C1C}">
+                <a14:useLocalDpi xmlns:a14="http://schemas.microsoft.com/office/drawing/2010/main" val="0"/>
+              </a:ext>
+            </a:extLst>
+          </a:blip>
+          <a:stretch>
+            <a:fillRect/>
+          </a:stretch>
+        </p:blipFill>
+        <p:spPr>
+          <a:xfrm>
+            <a:off x="1875995" y="1902243"/>
+            <a:ext cx="2438400" cy="609600"/>
+          </a:xfrm>
+          <a:prstGeom prst="rect">
+            <a:avLst/>
+          </a:prstGeom>
+        </p:spPr>
+      </p:pic>
+      <p:pic>
+        <p:nvPicPr>
+          <p:cNvPr id="9" name="Picture 8">
+            <a:extLst>
+              <a:ext uri="{FF2B5EF4-FFF2-40B4-BE49-F238E27FC236}">
+                <a16:creationId xmlns:a16="http://schemas.microsoft.com/office/drawing/2014/main" id="{30C5F91F-6535-4CAC-83CB-8DFD72912499}"/>
+              </a:ext>
+            </a:extLst>
+          </p:cNvPr>
+          <p:cNvPicPr>
+            <a:picLocks noChangeAspect="1"/>
+          </p:cNvPicPr>
+          <p:nvPr/>
+        </p:nvPicPr>
+        <p:blipFill>
+          <a:blip r:embed="rId4">
+            <a:extLst>
+              <a:ext uri="{28A0092B-C50C-407E-A947-70E740481C1C}">
+                <a14:useLocalDpi xmlns:a14="http://schemas.microsoft.com/office/drawing/2010/main" val="0"/>
+              </a:ext>
+            </a:extLst>
+          </a:blip>
+          <a:stretch>
+            <a:fillRect/>
+          </a:stretch>
+        </p:blipFill>
+        <p:spPr>
+          <a:xfrm>
+            <a:off x="1675417" y="4400761"/>
+            <a:ext cx="2456096" cy="559333"/>
+          </a:xfrm>
+          <a:prstGeom prst="rect">
+            <a:avLst/>
+          </a:prstGeom>
+        </p:spPr>
+      </p:pic>
+      <p:sp>
+        <p:nvSpPr>
+          <p:cNvPr id="12" name="TextBox 11">
+            <a:extLst>
+              <a:ext uri="{FF2B5EF4-FFF2-40B4-BE49-F238E27FC236}">
+                <a16:creationId xmlns:a16="http://schemas.microsoft.com/office/drawing/2014/main" id="{1C3F524C-586F-47FA-AC6B-343DD406BACC}"/>
+              </a:ext>
+            </a:extLst>
+          </p:cNvPr>
+          <p:cNvSpPr txBox="1"/>
+          <p:nvPr/>
+        </p:nvSpPr>
+        <p:spPr>
+          <a:xfrm>
+            <a:off x="1280162" y="2694823"/>
+            <a:ext cx="4147246" cy="1323439"/>
+          </a:xfrm>
+          <a:prstGeom prst="rect">
+            <a:avLst/>
+          </a:prstGeom>
+          <a:noFill/>
+        </p:spPr>
+        <p:txBody>
+          <a:bodyPr wrap="square" rtlCol="0">
+            <a:spAutoFit/>
+          </a:bodyPr>
+          <a:lstStyle/>
+          <a:p>
+            <a:r>
+              <a:rPr lang="en-US" sz="1600" dirty="0">
+                <a:latin typeface="Poppins Light" panose="00000400000000000000" pitchFamily="2" charset="0"/>
+                <a:cs typeface="Poppins Light" panose="00000400000000000000" pitchFamily="2" charset="0"/>
+              </a:rPr>
+              <a:t>Only Fans suffers majorly by using traditional banking solutions. We are using the blockchain and do not have the same concerns. Not adult content niched. Trying to appeal to everyone</a:t>
+            </a:r>
+            <a:endParaRPr lang="en-CA" sz="1600" dirty="0">
+              <a:latin typeface="Poppins Light" panose="00000400000000000000" pitchFamily="2" charset="0"/>
+              <a:cs typeface="Poppins Light" panose="00000400000000000000" pitchFamily="2" charset="0"/>
+            </a:endParaRPr>
+          </a:p>
+        </p:txBody>
+      </p:sp>
+      <p:sp>
+        <p:nvSpPr>
+          <p:cNvPr id="13" name="TextBox 12">
+            <a:extLst>
+              <a:ext uri="{FF2B5EF4-FFF2-40B4-BE49-F238E27FC236}">
+                <a16:creationId xmlns:a16="http://schemas.microsoft.com/office/drawing/2014/main" id="{AE78E4DA-87B6-444E-8B28-3D20637E3824}"/>
+              </a:ext>
+            </a:extLst>
+          </p:cNvPr>
+          <p:cNvSpPr txBox="1"/>
+          <p:nvPr/>
+        </p:nvSpPr>
+        <p:spPr>
+          <a:xfrm>
+            <a:off x="6599410" y="2665106"/>
+            <a:ext cx="4208207" cy="1569660"/>
+          </a:xfrm>
+          <a:prstGeom prst="rect">
+            <a:avLst/>
+          </a:prstGeom>
+          <a:noFill/>
+        </p:spPr>
+        <p:txBody>
+          <a:bodyPr wrap="square" rtlCol="0">
+            <a:spAutoFit/>
+          </a:bodyPr>
+          <a:lstStyle/>
+          <a:p>
+            <a:r>
+              <a:rPr lang="en-US" sz="1600" dirty="0" err="1">
+                <a:latin typeface="Poppins Light" panose="00000400000000000000" pitchFamily="2" charset="0"/>
+                <a:cs typeface="Poppins Light" panose="00000400000000000000" pitchFamily="2" charset="0"/>
+              </a:rPr>
+              <a:t>Nafter</a:t>
+            </a:r>
+            <a:r>
+              <a:rPr lang="en-US" sz="1600" dirty="0">
+                <a:latin typeface="Poppins Light" panose="00000400000000000000" pitchFamily="2" charset="0"/>
+                <a:cs typeface="Poppins Light" panose="00000400000000000000" pitchFamily="2" charset="0"/>
+              </a:rPr>
+              <a:t> is using the </a:t>
+            </a:r>
+            <a:r>
+              <a:rPr lang="en-US" sz="1600" dirty="0" err="1">
+                <a:latin typeface="Poppins Light" panose="00000400000000000000" pitchFamily="2" charset="0"/>
+                <a:cs typeface="Poppins Light" panose="00000400000000000000" pitchFamily="2" charset="0"/>
+              </a:rPr>
+              <a:t>Binance</a:t>
+            </a:r>
+            <a:r>
+              <a:rPr lang="en-US" sz="1600" dirty="0">
+                <a:latin typeface="Poppins Light" panose="00000400000000000000" pitchFamily="2" charset="0"/>
+                <a:cs typeface="Poppins Light" panose="00000400000000000000" pitchFamily="2" charset="0"/>
+              </a:rPr>
+              <a:t> smart chain for their tokens. </a:t>
+            </a:r>
+            <a:r>
+              <a:rPr lang="en-US" sz="1600" dirty="0" err="1">
+                <a:latin typeface="Poppins Light" panose="00000400000000000000" pitchFamily="2" charset="0"/>
+                <a:cs typeface="Poppins Light" panose="00000400000000000000" pitchFamily="2" charset="0"/>
+              </a:rPr>
+              <a:t>Binance</a:t>
+            </a:r>
+            <a:r>
+              <a:rPr lang="en-US" sz="1600" dirty="0">
+                <a:latin typeface="Poppins Light" panose="00000400000000000000" pitchFamily="2" charset="0"/>
+                <a:cs typeface="Poppins Light" panose="00000400000000000000" pitchFamily="2" charset="0"/>
+              </a:rPr>
+              <a:t> has many centralized concerns and is in deep with controversial Tether. We just use regular Ethereum. Not adult content niched. Trying to appeal to everyone.</a:t>
+            </a:r>
+            <a:endParaRPr lang="en-CA" sz="1600" dirty="0">
+              <a:latin typeface="Poppins Light" panose="00000400000000000000" pitchFamily="2" charset="0"/>
+              <a:cs typeface="Poppins Light" panose="00000400000000000000" pitchFamily="2" charset="0"/>
+            </a:endParaRPr>
+          </a:p>
+        </p:txBody>
+      </p:sp>
+      <p:sp>
+        <p:nvSpPr>
+          <p:cNvPr id="14" name="TextBox 13">
+            <a:extLst>
+              <a:ext uri="{FF2B5EF4-FFF2-40B4-BE49-F238E27FC236}">
+                <a16:creationId xmlns:a16="http://schemas.microsoft.com/office/drawing/2014/main" id="{E242F2EA-3E63-4B2A-B9DA-0E6BF3894027}"/>
+              </a:ext>
+            </a:extLst>
+          </p:cNvPr>
+          <p:cNvSpPr txBox="1"/>
+          <p:nvPr/>
+        </p:nvSpPr>
+        <p:spPr>
+          <a:xfrm>
+            <a:off x="1510234" y="5291722"/>
+            <a:ext cx="3516016" cy="369332"/>
+          </a:xfrm>
+          <a:prstGeom prst="rect">
+            <a:avLst/>
+          </a:prstGeom>
+          <a:noFill/>
+        </p:spPr>
+        <p:txBody>
+          <a:bodyPr wrap="square" rtlCol="0">
+            <a:spAutoFit/>
+          </a:bodyPr>
+          <a:lstStyle/>
+          <a:p>
+            <a:r>
               <a:rPr lang="en-US" dirty="0"/>
-              <a:t>Conclusion</a:t>
+              <a:t>…</a:t>
             </a:r>
             <a:endParaRPr lang="en-CA" dirty="0"/>
           </a:p>
         </p:txBody>
       </p:sp>
-      <p:sp>
-        <p:nvSpPr>
-          <p:cNvPr id="3" name="Content Placeholder 2">
-            <a:extLst>
-              <a:ext uri="{FF2B5EF4-FFF2-40B4-BE49-F238E27FC236}">
-                <a16:creationId xmlns:a16="http://schemas.microsoft.com/office/drawing/2014/main" id="{9AE310D3-98D1-4584-B481-12741089C721}"/>
+    </p:spTree>
+    <p:extLst>
+      <p:ext uri="{BB962C8B-B14F-4D97-AF65-F5344CB8AC3E}">
+        <p14:creationId xmlns:p14="http://schemas.microsoft.com/office/powerpoint/2010/main" val="1638852775"/>
+      </p:ext>
+    </p:extLst>
+  </p:cSld>
+  <p:clrMapOvr>
+    <a:masterClrMapping/>
+  </p:clrMapOvr>
+</p:sld>
+</file>
+
+<file path=ppt/slides/slide12.xml><?xml version="1.0" encoding="utf-8"?>
+<p:sld xmlns:a="http://schemas.openxmlformats.org/drawingml/2006/main" xmlns:r="http://schemas.openxmlformats.org/officeDocument/2006/relationships" xmlns:p="http://schemas.openxmlformats.org/presentationml/2006/main">
+  <p:cSld>
+    <p:spTree>
+      <p:nvGrpSpPr>
+        <p:cNvPr id="1" name=""/>
+        <p:cNvGrpSpPr/>
+        <p:nvPr/>
+      </p:nvGrpSpPr>
+      <p:grpSpPr>
+        <a:xfrm>
+          <a:off x="0" y="0"/>
+          <a:ext cx="0" cy="0"/>
+          <a:chOff x="0" y="0"/>
+          <a:chExt cx="0" cy="0"/>
+        </a:xfrm>
+      </p:grpSpPr>
+      <p:sp>
+        <p:nvSpPr>
+          <p:cNvPr id="2" name="Title 1">
+            <a:extLst>
+              <a:ext uri="{FF2B5EF4-FFF2-40B4-BE49-F238E27FC236}">
+                <a16:creationId xmlns:a16="http://schemas.microsoft.com/office/drawing/2014/main" id="{A7BE9879-6337-419D-994C-BD4650A6FB10}"/>
               </a:ext>
             </a:extLst>
           </p:cNvPr>
@@ -4010,22 +4319,171 @@
             <a:spLocks noGrp="1"/>
           </p:cNvSpPr>
           <p:nvPr>
+            <p:ph type="title"/>
+          </p:nvPr>
+        </p:nvSpPr>
+        <p:spPr>
+          <a:xfrm>
+            <a:off x="838200" y="395257"/>
+            <a:ext cx="10246688" cy="1295431"/>
+          </a:xfrm>
+        </p:spPr>
+        <p:txBody>
+          <a:bodyPr>
+            <a:normAutofit/>
+          </a:bodyPr>
+          <a:lstStyle/>
+          <a:p>
+            <a:r>
+              <a:rPr lang="en-US" sz="4000" dirty="0">
+                <a:latin typeface="Yeseva One" panose="00000500000000000000" pitchFamily="2" charset="0"/>
+              </a:rPr>
+              <a:t>Why are we better then everyone else?</a:t>
+            </a:r>
+            <a:endParaRPr lang="en-CA" sz="4000" dirty="0"/>
+          </a:p>
+        </p:txBody>
+      </p:sp>
+      <p:sp>
+        <p:nvSpPr>
+          <p:cNvPr id="3" name="Content Placeholder 2">
+            <a:extLst>
+              <a:ext uri="{FF2B5EF4-FFF2-40B4-BE49-F238E27FC236}">
+                <a16:creationId xmlns:a16="http://schemas.microsoft.com/office/drawing/2014/main" id="{2DA3F201-2856-41F8-9404-A21C6063907F}"/>
+              </a:ext>
+            </a:extLst>
+          </p:cNvPr>
+          <p:cNvSpPr>
+            <a:spLocks noGrp="1"/>
+          </p:cNvSpPr>
+          <p:nvPr>
             <p:ph idx="1"/>
           </p:nvPr>
         </p:nvSpPr>
         <p:spPr/>
         <p:txBody>
-          <a:bodyPr/>
-          <a:lstStyle/>
-          <a:p>
-            <a:endParaRPr lang="en-CA" dirty="0"/>
+          <a:bodyPr>
+            <a:normAutofit fontScale="85000" lnSpcReduction="10000"/>
+          </a:bodyPr>
+          <a:lstStyle/>
+          <a:p>
+            <a:pPr>
+              <a:lnSpc>
+                <a:spcPct val="110000"/>
+              </a:lnSpc>
+            </a:pPr>
+            <a:r>
+              <a:rPr lang="en-US" dirty="0">
+                <a:latin typeface="Poppins Light" panose="00000400000000000000" pitchFamily="2" charset="0"/>
+                <a:cs typeface="Poppins Light" panose="00000400000000000000" pitchFamily="2" charset="0"/>
+              </a:rPr>
+              <a:t>Lowball transaction fees. They charge 20%, we charge 10%.</a:t>
+            </a:r>
+          </a:p>
+          <a:p>
+            <a:pPr>
+              <a:lnSpc>
+                <a:spcPct val="110000"/>
+              </a:lnSpc>
+            </a:pPr>
+            <a:r>
+              <a:rPr lang="en-US" dirty="0">
+                <a:latin typeface="Poppins Light" panose="00000400000000000000" pitchFamily="2" charset="0"/>
+                <a:cs typeface="Poppins Light" panose="00000400000000000000" pitchFamily="2" charset="0"/>
+              </a:rPr>
+              <a:t>Blockchain, not dependent on big banks, hard to cancel.</a:t>
+            </a:r>
+          </a:p>
+          <a:p>
+            <a:pPr>
+              <a:lnSpc>
+                <a:spcPct val="110000"/>
+              </a:lnSpc>
+            </a:pPr>
+            <a:r>
+              <a:rPr lang="en-US" dirty="0">
+                <a:latin typeface="Poppins Light" panose="00000400000000000000" pitchFamily="2" charset="0"/>
+                <a:cs typeface="Poppins Light" panose="00000400000000000000" pitchFamily="2" charset="0"/>
+              </a:rPr>
+              <a:t>Lead founder / CEO is an experienced, talented, software engineer.</a:t>
+            </a:r>
+          </a:p>
+          <a:p>
+            <a:pPr>
+              <a:lnSpc>
+                <a:spcPct val="110000"/>
+              </a:lnSpc>
+            </a:pPr>
+            <a:r>
+              <a:rPr lang="en-US" dirty="0">
+                <a:latin typeface="Poppins Light" panose="00000400000000000000" pitchFamily="2" charset="0"/>
+                <a:cs typeface="Poppins Light" panose="00000400000000000000" pitchFamily="2" charset="0"/>
+              </a:rPr>
+              <a:t>We have a niched product design specific for adult content.</a:t>
+            </a:r>
+          </a:p>
+          <a:p>
+            <a:pPr>
+              <a:lnSpc>
+                <a:spcPct val="110000"/>
+              </a:lnSpc>
+            </a:pPr>
+            <a:r>
+              <a:rPr lang="en-US" dirty="0">
+                <a:latin typeface="Poppins Light" panose="00000400000000000000" pitchFamily="2" charset="0"/>
+                <a:cs typeface="Poppins Light" panose="00000400000000000000" pitchFamily="2" charset="0"/>
+              </a:rPr>
+              <a:t>We have innovative ideas that have never been done before.</a:t>
+            </a:r>
+          </a:p>
+          <a:p>
+            <a:pPr>
+              <a:lnSpc>
+                <a:spcPct val="110000"/>
+              </a:lnSpc>
+            </a:pPr>
+            <a:r>
+              <a:rPr lang="en-US" dirty="0">
+                <a:latin typeface="Poppins Light" panose="00000400000000000000" pitchFamily="2" charset="0"/>
+                <a:cs typeface="Poppins Light" panose="00000400000000000000" pitchFamily="2" charset="0"/>
+              </a:rPr>
+              <a:t>We are smaller, fresher, can pivot, adapt quicker.</a:t>
+            </a:r>
+          </a:p>
+          <a:p>
+            <a:pPr>
+              <a:lnSpc>
+                <a:spcPct val="110000"/>
+              </a:lnSpc>
+            </a:pPr>
+            <a:r>
+              <a:rPr lang="en-CA" dirty="0">
+                <a:latin typeface="Poppins Light" panose="00000400000000000000" pitchFamily="2" charset="0"/>
+                <a:cs typeface="Poppins Light" panose="00000400000000000000" pitchFamily="2" charset="0"/>
+              </a:rPr>
+              <a:t>We combine the crypto, social media and adult content industries.</a:t>
+            </a:r>
+          </a:p>
+          <a:p>
+            <a:pPr>
+              <a:lnSpc>
+                <a:spcPct val="110000"/>
+              </a:lnSpc>
+            </a:pPr>
+            <a:r>
+              <a:rPr lang="en-CA" dirty="0">
+                <a:latin typeface="Poppins Light" panose="00000400000000000000" pitchFamily="2" charset="0"/>
+                <a:cs typeface="Poppins Light" panose="00000400000000000000" pitchFamily="2" charset="0"/>
+              </a:rPr>
+              <a:t>We are not rich yet and are more hungry then the fat cats.</a:t>
+            </a:r>
           </a:p>
         </p:txBody>
       </p:sp>
     </p:spTree>
     <p:extLst>
       <p:ext uri="{BB962C8B-B14F-4D97-AF65-F5344CB8AC3E}">
-        <p14:creationId xmlns:p14="http://schemas.microsoft.com/office/powerpoint/2010/main" val="3318940678"/>
+        <p14:creationId xmlns:p14="http://schemas.microsoft.com/office/powerpoint/2010/main" val="539992873"/>
       </p:ext>
     </p:extLst>
   </p:cSld>
@@ -5182,7 +5640,7 @@
                 </a:solidFill>
                 <a:latin typeface="Rock Salt" pitchFamily="2" charset="0"/>
               </a:rPr>
-              <a:t>$5 Billion</a:t>
+              <a:t>$25 Billion</a:t>
             </a:r>
             <a:endParaRPr lang="en-CA" sz="1600" dirty="0">
               <a:solidFill>
@@ -5923,104 +6381,12 @@
           <a:chExt cx="0" cy="0"/>
         </a:xfrm>
       </p:grpSpPr>
-      <p:cxnSp>
-        <p:nvCxnSpPr>
-          <p:cNvPr id="27" name="Straight Connector 26">
-            <a:extLst>
-              <a:ext uri="{FF2B5EF4-FFF2-40B4-BE49-F238E27FC236}">
-                <a16:creationId xmlns:a16="http://schemas.microsoft.com/office/drawing/2014/main" id="{5E824EAC-ADEC-43E9-BD94-ADFF2DFD5F85}"/>
-              </a:ext>
-            </a:extLst>
-          </p:cNvPr>
-          <p:cNvCxnSpPr>
-            <a:cxnSpLocks/>
-          </p:cNvCxnSpPr>
-          <p:nvPr/>
-        </p:nvCxnSpPr>
-        <p:spPr>
-          <a:xfrm flipV="1">
-            <a:off x="973029" y="2799795"/>
-            <a:ext cx="2601615" cy="24582"/>
-          </a:xfrm>
-          <a:prstGeom prst="line">
-            <a:avLst/>
-          </a:prstGeom>
-          <a:ln>
-            <a:solidFill>
-              <a:schemeClr val="accent3">
-                <a:lumMod val="60000"/>
-                <a:lumOff val="40000"/>
-              </a:schemeClr>
-            </a:solidFill>
-          </a:ln>
-        </p:spPr>
-        <p:style>
-          <a:lnRef idx="1">
-            <a:schemeClr val="accent1"/>
-          </a:lnRef>
-          <a:fillRef idx="0">
-            <a:schemeClr val="accent1"/>
-          </a:fillRef>
-          <a:effectRef idx="0">
-            <a:schemeClr val="accent1"/>
-          </a:effectRef>
-          <a:fontRef idx="minor">
-            <a:schemeClr val="tx1"/>
-          </a:fontRef>
-        </p:style>
-      </p:cxnSp>
-      <p:cxnSp>
-        <p:nvCxnSpPr>
-          <p:cNvPr id="16" name="Straight Connector 15">
-            <a:extLst>
-              <a:ext uri="{FF2B5EF4-FFF2-40B4-BE49-F238E27FC236}">
-                <a16:creationId xmlns:a16="http://schemas.microsoft.com/office/drawing/2014/main" id="{2E784507-2A90-41F4-914A-2E0D3C25F17F}"/>
-              </a:ext>
-            </a:extLst>
-          </p:cNvPr>
-          <p:cNvCxnSpPr>
-            <a:cxnSpLocks/>
-          </p:cNvCxnSpPr>
-          <p:nvPr/>
-        </p:nvCxnSpPr>
-        <p:spPr>
-          <a:xfrm flipV="1">
-            <a:off x="973031" y="3357677"/>
-            <a:ext cx="2601615" cy="24582"/>
-          </a:xfrm>
-          <a:prstGeom prst="line">
-            <a:avLst/>
-          </a:prstGeom>
-          <a:ln>
-            <a:solidFill>
-              <a:schemeClr val="accent3">
-                <a:lumMod val="60000"/>
-                <a:lumOff val="40000"/>
-              </a:schemeClr>
-            </a:solidFill>
-          </a:ln>
-        </p:spPr>
-        <p:style>
-          <a:lnRef idx="1">
-            <a:schemeClr val="accent1"/>
-          </a:lnRef>
-          <a:fillRef idx="0">
-            <a:schemeClr val="accent1"/>
-          </a:fillRef>
-          <a:effectRef idx="0">
-            <a:schemeClr val="accent1"/>
-          </a:effectRef>
-          <a:fontRef idx="minor">
-            <a:schemeClr val="tx1"/>
-          </a:fontRef>
-        </p:style>
-      </p:cxnSp>
       <p:sp>
         <p:nvSpPr>
           <p:cNvPr id="2" name="Title 1">
             <a:extLst>
               <a:ext uri="{FF2B5EF4-FFF2-40B4-BE49-F238E27FC236}">
-                <a16:creationId xmlns:a16="http://schemas.microsoft.com/office/drawing/2014/main" id="{E0F8078E-5BC4-41A6-B505-9FDF374A8BB5}"/>
+                <a16:creationId xmlns:a16="http://schemas.microsoft.com/office/drawing/2014/main" id="{7C49461A-2F85-4C60-86E6-44DF52CB756B}"/>
               </a:ext>
             </a:extLst>
           </p:cNvPr>
@@ -6040,145 +6406,116 @@
               <a:rPr lang="en-US" dirty="0">
                 <a:latin typeface="Yeseva One" panose="00000500000000000000" pitchFamily="2" charset="0"/>
               </a:rPr>
-              <a:t>Our Team</a:t>
+              <a:t>Our Product</a:t>
             </a:r>
             <a:endParaRPr lang="en-CA" dirty="0"/>
+          </a:p>
+        </p:txBody>
+      </p:sp>
+      <p:sp>
+        <p:nvSpPr>
+          <p:cNvPr id="3" name="Content Placeholder 2">
+            <a:extLst>
+              <a:ext uri="{FF2B5EF4-FFF2-40B4-BE49-F238E27FC236}">
+                <a16:creationId xmlns:a16="http://schemas.microsoft.com/office/drawing/2014/main" id="{0573CEC2-DD9B-499A-BAF7-A21F1825FB61}"/>
+              </a:ext>
+            </a:extLst>
+          </p:cNvPr>
+          <p:cNvSpPr>
+            <a:spLocks noGrp="1"/>
+          </p:cNvSpPr>
+          <p:nvPr>
+            <p:ph idx="1"/>
+          </p:nvPr>
+        </p:nvSpPr>
+        <p:spPr>
+          <a:xfrm>
+            <a:off x="914892" y="1852397"/>
+            <a:ext cx="8140618" cy="4324566"/>
+          </a:xfrm>
+        </p:spPr>
+        <p:txBody>
+          <a:bodyPr>
+            <a:normAutofit fontScale="85000" lnSpcReduction="20000"/>
+          </a:bodyPr>
+          <a:lstStyle/>
+          <a:p>
+            <a:r>
+              <a:rPr lang="en-US" dirty="0"/>
+              <a:t>$NUDE token.</a:t>
+            </a:r>
+          </a:p>
+          <a:p>
+            <a:r>
+              <a:rPr lang="en-US" dirty="0"/>
+              <a:t>NFTs.</a:t>
+            </a:r>
+          </a:p>
+          <a:p>
+            <a:r>
+              <a:rPr lang="en-US" dirty="0"/>
+              <a:t>Auction House.</a:t>
+            </a:r>
+          </a:p>
+          <a:p>
+            <a:r>
+              <a:rPr lang="en-US" dirty="0"/>
+              <a:t>Candy shop.</a:t>
+            </a:r>
+          </a:p>
+          <a:p>
+            <a:r>
+              <a:rPr lang="en-US" dirty="0"/>
+              <a:t>Gumball machine.</a:t>
+            </a:r>
+          </a:p>
+          <a:p>
+            <a:r>
+              <a:rPr lang="en-US" dirty="0"/>
+              <a:t>Profiles.</a:t>
+            </a:r>
+          </a:p>
+          <a:p>
+            <a:r>
+              <a:rPr lang="en-US" dirty="0"/>
+              <a:t>Subscriptions.</a:t>
+            </a:r>
+          </a:p>
+          <a:p>
+            <a:r>
+              <a:rPr lang="en-US" dirty="0"/>
+              <a:t>Followers / Likes.</a:t>
+            </a:r>
+          </a:p>
+          <a:p>
+            <a:r>
+              <a:rPr lang="en-US" dirty="0"/>
+              <a:t>Timeline.</a:t>
+            </a:r>
+          </a:p>
+          <a:p>
+            <a:r>
+              <a:rPr lang="en-US" dirty="0"/>
+              <a:t>Featured creators.</a:t>
+            </a:r>
+          </a:p>
+          <a:p>
+            <a:r>
+              <a:rPr lang="en-US" dirty="0"/>
+              <a:t>Hidden / encrypted NFTs.</a:t>
+            </a:r>
+          </a:p>
+          <a:p>
+            <a:endParaRPr lang="en-US" dirty="0"/>
           </a:p>
         </p:txBody>
       </p:sp>
       <p:pic>
         <p:nvPicPr>
-          <p:cNvPr id="5" name="Content Placeholder 4">
-            <a:extLst>
-              <a:ext uri="{FF2B5EF4-FFF2-40B4-BE49-F238E27FC236}">
-                <a16:creationId xmlns:a16="http://schemas.microsoft.com/office/drawing/2014/main" id="{E8B79BEB-C0A3-4987-83FF-C0BD91A1E4E2}"/>
-              </a:ext>
-            </a:extLst>
-          </p:cNvPr>
-          <p:cNvPicPr>
-            <a:picLocks noGrp="1" noChangeAspect="1"/>
-          </p:cNvPicPr>
-          <p:nvPr>
-            <p:ph idx="1"/>
-          </p:nvPr>
-        </p:nvPicPr>
-        <p:blipFill>
-          <a:blip r:embed="rId2">
-            <a:extLst>
-              <a:ext uri="{28A0092B-C50C-407E-A947-70E740481C1C}">
-                <a14:useLocalDpi xmlns:a14="http://schemas.microsoft.com/office/drawing/2010/main" val="0"/>
-              </a:ext>
-            </a:extLst>
-          </a:blip>
-          <a:stretch>
-            <a:fillRect/>
-          </a:stretch>
-        </p:blipFill>
-        <p:spPr>
-          <a:xfrm>
-            <a:off x="11353800" y="308455"/>
-            <a:ext cx="483207" cy="483207"/>
-          </a:xfrm>
-        </p:spPr>
-      </p:pic>
-      <p:cxnSp>
-        <p:nvCxnSpPr>
-          <p:cNvPr id="14" name="Straight Connector 13">
-            <a:extLst>
-              <a:ext uri="{FF2B5EF4-FFF2-40B4-BE49-F238E27FC236}">
-                <a16:creationId xmlns:a16="http://schemas.microsoft.com/office/drawing/2014/main" id="{CF0A6EC9-05A2-41D5-A4D9-F813EF56724A}"/>
-              </a:ext>
-            </a:extLst>
-          </p:cNvPr>
-          <p:cNvCxnSpPr>
-            <a:cxnSpLocks/>
-          </p:cNvCxnSpPr>
-          <p:nvPr/>
-        </p:nvCxnSpPr>
-        <p:spPr>
-          <a:xfrm>
-            <a:off x="725259" y="3094763"/>
-            <a:ext cx="3126658" cy="0"/>
-          </a:xfrm>
-          <a:prstGeom prst="line">
-            <a:avLst/>
-          </a:prstGeom>
-          <a:ln>
-            <a:solidFill>
-              <a:srgbClr val="FFC000"/>
-            </a:solidFill>
-          </a:ln>
-        </p:spPr>
-        <p:style>
-          <a:lnRef idx="2">
-            <a:schemeClr val="accent3"/>
-          </a:lnRef>
-          <a:fillRef idx="0">
-            <a:schemeClr val="accent3"/>
-          </a:fillRef>
-          <a:effectRef idx="1">
-            <a:schemeClr val="accent3"/>
-          </a:effectRef>
-          <a:fontRef idx="minor">
-            <a:schemeClr val="tx1"/>
-          </a:fontRef>
-        </p:style>
-      </p:cxnSp>
-      <p:sp>
-        <p:nvSpPr>
-          <p:cNvPr id="15" name="Oval 14">
-            <a:extLst>
-              <a:ext uri="{FF2B5EF4-FFF2-40B4-BE49-F238E27FC236}">
-                <a16:creationId xmlns:a16="http://schemas.microsoft.com/office/drawing/2014/main" id="{4153D177-BF84-432C-99CC-F8159E5284AA}"/>
-              </a:ext>
-            </a:extLst>
-          </p:cNvPr>
-          <p:cNvSpPr/>
-          <p:nvPr/>
-        </p:nvSpPr>
-        <p:spPr>
-          <a:xfrm>
-            <a:off x="1188358" y="2091267"/>
-            <a:ext cx="2170962" cy="2006993"/>
-          </a:xfrm>
-          <a:prstGeom prst="ellipse">
-            <a:avLst/>
-          </a:prstGeom>
-          <a:solidFill>
-            <a:schemeClr val="accent2"/>
-          </a:solidFill>
-        </p:spPr>
-        <p:style>
-          <a:lnRef idx="2">
-            <a:schemeClr val="accent1">
-              <a:shade val="50000"/>
-            </a:schemeClr>
-          </a:lnRef>
-          <a:fillRef idx="1">
-            <a:schemeClr val="accent1"/>
-          </a:fillRef>
-          <a:effectRef idx="0">
-            <a:schemeClr val="accent1"/>
-          </a:effectRef>
-          <a:fontRef idx="minor">
-            <a:schemeClr val="lt1"/>
-          </a:fontRef>
-        </p:style>
-        <p:txBody>
-          <a:bodyPr rtlCol="0" anchor="ctr"/>
-          <a:lstStyle/>
-          <a:p>
-            <a:pPr algn="ctr"/>
-            <a:endParaRPr lang="en-CA"/>
-          </a:p>
-        </p:txBody>
-      </p:sp>
-      <p:pic>
-        <p:nvPicPr>
-          <p:cNvPr id="23" name="Picture 22">
-            <a:extLst>
-              <a:ext uri="{FF2B5EF4-FFF2-40B4-BE49-F238E27FC236}">
-                <a16:creationId xmlns:a16="http://schemas.microsoft.com/office/drawing/2014/main" id="{42B44C66-2A8C-4C22-819F-CBD75B0DDCD6}"/>
+          <p:cNvPr id="5" name="Picture 4">
+            <a:extLst>
+              <a:ext uri="{FF2B5EF4-FFF2-40B4-BE49-F238E27FC236}">
+                <a16:creationId xmlns:a16="http://schemas.microsoft.com/office/drawing/2014/main" id="{3CACCE57-4EF4-4D03-AC6F-B827C68B7BDF}"/>
               </a:ext>
             </a:extLst>
           </p:cNvPr>
@@ -6188,7 +6525,7 @@
           <p:nvPr/>
         </p:nvPicPr>
         <p:blipFill>
-          <a:blip r:embed="rId3">
+          <a:blip r:embed="rId2">
             <a:extLst>
               <a:ext uri="{28A0092B-C50C-407E-A947-70E740481C1C}">
                 <a14:useLocalDpi xmlns:a14="http://schemas.microsoft.com/office/drawing/2010/main" val="0"/>
@@ -6201,411 +6538,8 @@
         </p:blipFill>
         <p:spPr>
           <a:xfrm>
-            <a:off x="1268853" y="2136887"/>
-            <a:ext cx="2009969" cy="1915751"/>
-          </a:xfrm>
-          <a:prstGeom prst="rect">
-            <a:avLst/>
-          </a:prstGeom>
-        </p:spPr>
-      </p:pic>
-      <p:sp>
-        <p:nvSpPr>
-          <p:cNvPr id="24" name="TextBox 23">
-            <a:extLst>
-              <a:ext uri="{FF2B5EF4-FFF2-40B4-BE49-F238E27FC236}">
-                <a16:creationId xmlns:a16="http://schemas.microsoft.com/office/drawing/2014/main" id="{D5A321C3-FFC0-4C5F-AC4A-246C9A8E11BB}"/>
-              </a:ext>
-            </a:extLst>
-          </p:cNvPr>
-          <p:cNvSpPr txBox="1"/>
-          <p:nvPr/>
-        </p:nvSpPr>
-        <p:spPr>
-          <a:xfrm>
-            <a:off x="995772" y="4630139"/>
-            <a:ext cx="2688630" cy="276999"/>
-          </a:xfrm>
-          <a:prstGeom prst="rect">
-            <a:avLst/>
-          </a:prstGeom>
-          <a:noFill/>
-        </p:spPr>
-        <p:txBody>
-          <a:bodyPr wrap="square" rtlCol="0">
-            <a:spAutoFit/>
-          </a:bodyPr>
-          <a:lstStyle/>
-          <a:p>
-            <a:r>
-              <a:rPr lang="en-US" sz="1200" dirty="0">
-                <a:latin typeface="Poppins Medium" panose="00000600000000000000" pitchFamily="2" charset="0"/>
-                <a:cs typeface="Poppins Medium" panose="00000600000000000000" pitchFamily="2" charset="0"/>
-              </a:rPr>
-              <a:t>Founder / CEO / Lead Engineer</a:t>
-            </a:r>
-            <a:endParaRPr lang="en-CA" sz="1200" dirty="0">
-              <a:latin typeface="Poppins Medium" panose="00000600000000000000" pitchFamily="2" charset="0"/>
-              <a:cs typeface="Poppins Medium" panose="00000600000000000000" pitchFamily="2" charset="0"/>
-            </a:endParaRPr>
-          </a:p>
-        </p:txBody>
-      </p:sp>
-      <p:sp>
-        <p:nvSpPr>
-          <p:cNvPr id="26" name="TextBox 25">
-            <a:extLst>
-              <a:ext uri="{FF2B5EF4-FFF2-40B4-BE49-F238E27FC236}">
-                <a16:creationId xmlns:a16="http://schemas.microsoft.com/office/drawing/2014/main" id="{CDE202D1-9ACD-4802-A37B-54804F6CC221}"/>
-              </a:ext>
-            </a:extLst>
-          </p:cNvPr>
-          <p:cNvSpPr txBox="1"/>
-          <p:nvPr/>
-        </p:nvSpPr>
-        <p:spPr>
-          <a:xfrm>
-            <a:off x="973030" y="4199500"/>
-            <a:ext cx="2711371" cy="369332"/>
-          </a:xfrm>
-          <a:prstGeom prst="rect">
-            <a:avLst/>
-          </a:prstGeom>
-          <a:noFill/>
-        </p:spPr>
-        <p:txBody>
-          <a:bodyPr wrap="square">
-            <a:spAutoFit/>
-          </a:bodyPr>
-          <a:lstStyle/>
-          <a:p>
-            <a:r>
-              <a:rPr lang="en-US" dirty="0">
-                <a:latin typeface="Yeseva One" panose="00000500000000000000" pitchFamily="2" charset="0"/>
-                <a:cs typeface="Poppins Medium" panose="00000600000000000000" pitchFamily="2" charset="0"/>
-              </a:rPr>
-              <a:t>Christopher </a:t>
-            </a:r>
-            <a:r>
-              <a:rPr lang="en-US" dirty="0" err="1">
-                <a:latin typeface="Yeseva One" panose="00000500000000000000" pitchFamily="2" charset="0"/>
-                <a:cs typeface="Poppins Medium" panose="00000600000000000000" pitchFamily="2" charset="0"/>
-              </a:rPr>
-              <a:t>Trimboli</a:t>
-            </a:r>
-            <a:endParaRPr lang="en-CA" dirty="0">
-              <a:latin typeface="Yeseva One" panose="00000500000000000000" pitchFamily="2" charset="0"/>
-              <a:cs typeface="Poppins Medium" panose="00000600000000000000" pitchFamily="2" charset="0"/>
-            </a:endParaRPr>
-          </a:p>
-        </p:txBody>
-      </p:sp>
-      <p:cxnSp>
-        <p:nvCxnSpPr>
-          <p:cNvPr id="42" name="Straight Connector 41">
-            <a:extLst>
-              <a:ext uri="{FF2B5EF4-FFF2-40B4-BE49-F238E27FC236}">
-                <a16:creationId xmlns:a16="http://schemas.microsoft.com/office/drawing/2014/main" id="{C7FEB43B-6C76-41DC-8609-A6E9B07F2357}"/>
-              </a:ext>
-            </a:extLst>
-          </p:cNvPr>
-          <p:cNvCxnSpPr>
-            <a:cxnSpLocks/>
-          </p:cNvCxnSpPr>
-          <p:nvPr/>
-        </p:nvCxnSpPr>
-        <p:spPr>
-          <a:xfrm flipV="1">
-            <a:off x="4795191" y="2799795"/>
-            <a:ext cx="2601615" cy="24582"/>
-          </a:xfrm>
-          <a:prstGeom prst="line">
-            <a:avLst/>
-          </a:prstGeom>
-          <a:ln>
-            <a:solidFill>
-              <a:schemeClr val="accent3">
-                <a:lumMod val="60000"/>
-                <a:lumOff val="40000"/>
-              </a:schemeClr>
-            </a:solidFill>
-          </a:ln>
-        </p:spPr>
-        <p:style>
-          <a:lnRef idx="1">
-            <a:schemeClr val="accent1"/>
-          </a:lnRef>
-          <a:fillRef idx="0">
-            <a:schemeClr val="accent1"/>
-          </a:fillRef>
-          <a:effectRef idx="0">
-            <a:schemeClr val="accent1"/>
-          </a:effectRef>
-          <a:fontRef idx="minor">
-            <a:schemeClr val="tx1"/>
-          </a:fontRef>
-        </p:style>
-      </p:cxnSp>
-      <p:cxnSp>
-        <p:nvCxnSpPr>
-          <p:cNvPr id="43" name="Straight Connector 42">
-            <a:extLst>
-              <a:ext uri="{FF2B5EF4-FFF2-40B4-BE49-F238E27FC236}">
-                <a16:creationId xmlns:a16="http://schemas.microsoft.com/office/drawing/2014/main" id="{8A0CA6D1-065B-4201-9574-0BDA1EEC0952}"/>
-              </a:ext>
-            </a:extLst>
-          </p:cNvPr>
-          <p:cNvCxnSpPr>
-            <a:cxnSpLocks/>
-          </p:cNvCxnSpPr>
-          <p:nvPr/>
-        </p:nvCxnSpPr>
-        <p:spPr>
-          <a:xfrm flipV="1">
-            <a:off x="4795193" y="3357677"/>
-            <a:ext cx="2601615" cy="24582"/>
-          </a:xfrm>
-          <a:prstGeom prst="line">
-            <a:avLst/>
-          </a:prstGeom>
-          <a:ln>
-            <a:solidFill>
-              <a:schemeClr val="accent3">
-                <a:lumMod val="60000"/>
-                <a:lumOff val="40000"/>
-              </a:schemeClr>
-            </a:solidFill>
-          </a:ln>
-        </p:spPr>
-        <p:style>
-          <a:lnRef idx="1">
-            <a:schemeClr val="accent1"/>
-          </a:lnRef>
-          <a:fillRef idx="0">
-            <a:schemeClr val="accent1"/>
-          </a:fillRef>
-          <a:effectRef idx="0">
-            <a:schemeClr val="accent1"/>
-          </a:effectRef>
-          <a:fontRef idx="minor">
-            <a:schemeClr val="tx1"/>
-          </a:fontRef>
-        </p:style>
-      </p:cxnSp>
-      <p:cxnSp>
-        <p:nvCxnSpPr>
-          <p:cNvPr id="44" name="Straight Connector 43">
-            <a:extLst>
-              <a:ext uri="{FF2B5EF4-FFF2-40B4-BE49-F238E27FC236}">
-                <a16:creationId xmlns:a16="http://schemas.microsoft.com/office/drawing/2014/main" id="{55D905D5-597F-4FCB-AD16-B031C1764589}"/>
-              </a:ext>
-            </a:extLst>
-          </p:cNvPr>
-          <p:cNvCxnSpPr>
-            <a:cxnSpLocks/>
-          </p:cNvCxnSpPr>
-          <p:nvPr/>
-        </p:nvCxnSpPr>
-        <p:spPr>
-          <a:xfrm>
-            <a:off x="4547421" y="3094763"/>
-            <a:ext cx="3126658" cy="0"/>
-          </a:xfrm>
-          <a:prstGeom prst="line">
-            <a:avLst/>
-          </a:prstGeom>
-          <a:ln>
-            <a:solidFill>
-              <a:srgbClr val="FB74FE"/>
-            </a:solidFill>
-          </a:ln>
-        </p:spPr>
-        <p:style>
-          <a:lnRef idx="2">
-            <a:schemeClr val="accent3"/>
-          </a:lnRef>
-          <a:fillRef idx="0">
-            <a:schemeClr val="accent3"/>
-          </a:fillRef>
-          <a:effectRef idx="1">
-            <a:schemeClr val="accent3"/>
-          </a:effectRef>
-          <a:fontRef idx="minor">
-            <a:schemeClr val="tx1"/>
-          </a:fontRef>
-        </p:style>
-      </p:cxnSp>
-      <p:sp>
-        <p:nvSpPr>
-          <p:cNvPr id="45" name="Oval 44">
-            <a:extLst>
-              <a:ext uri="{FF2B5EF4-FFF2-40B4-BE49-F238E27FC236}">
-                <a16:creationId xmlns:a16="http://schemas.microsoft.com/office/drawing/2014/main" id="{7E1B78C5-F887-491D-8D3F-1315B786C1C8}"/>
-              </a:ext>
-            </a:extLst>
-          </p:cNvPr>
-          <p:cNvSpPr/>
-          <p:nvPr/>
-        </p:nvSpPr>
-        <p:spPr>
-          <a:xfrm>
-            <a:off x="5010520" y="2091267"/>
-            <a:ext cx="2170962" cy="2006993"/>
-          </a:xfrm>
-          <a:prstGeom prst="ellipse">
-            <a:avLst/>
-          </a:prstGeom>
-          <a:solidFill>
-            <a:srgbClr val="FB74FE"/>
-          </a:solidFill>
-        </p:spPr>
-        <p:style>
-          <a:lnRef idx="2">
-            <a:schemeClr val="accent1">
-              <a:shade val="50000"/>
-            </a:schemeClr>
-          </a:lnRef>
-          <a:fillRef idx="1">
-            <a:schemeClr val="accent1"/>
-          </a:fillRef>
-          <a:effectRef idx="0">
-            <a:schemeClr val="accent1"/>
-          </a:effectRef>
-          <a:fontRef idx="minor">
-            <a:schemeClr val="lt1"/>
-          </a:fontRef>
-        </p:style>
-        <p:txBody>
-          <a:bodyPr rtlCol="0" anchor="ctr"/>
-          <a:lstStyle/>
-          <a:p>
-            <a:pPr algn="ctr"/>
-            <a:endParaRPr lang="en-CA"/>
-          </a:p>
-        </p:txBody>
-      </p:sp>
-      <p:sp>
-        <p:nvSpPr>
-          <p:cNvPr id="47" name="TextBox 46">
-            <a:extLst>
-              <a:ext uri="{FF2B5EF4-FFF2-40B4-BE49-F238E27FC236}">
-                <a16:creationId xmlns:a16="http://schemas.microsoft.com/office/drawing/2014/main" id="{B1E60453-717B-4F8A-92F4-81315775A76D}"/>
-              </a:ext>
-            </a:extLst>
-          </p:cNvPr>
-          <p:cNvSpPr txBox="1"/>
-          <p:nvPr/>
-        </p:nvSpPr>
-        <p:spPr>
-          <a:xfrm>
-            <a:off x="5010520" y="4622666"/>
-            <a:ext cx="2780435" cy="276999"/>
-          </a:xfrm>
-          <a:prstGeom prst="rect">
-            <a:avLst/>
-          </a:prstGeom>
-          <a:noFill/>
-        </p:spPr>
-        <p:txBody>
-          <a:bodyPr wrap="square" rtlCol="0">
-            <a:spAutoFit/>
-          </a:bodyPr>
-          <a:lstStyle/>
-          <a:p>
-            <a:r>
-              <a:rPr lang="en-US" sz="1200" dirty="0">
-                <a:latin typeface="Poppins Medium" panose="00000600000000000000" pitchFamily="2" charset="0"/>
-                <a:cs typeface="Poppins Medium" panose="00000600000000000000" pitchFamily="2" charset="0"/>
-              </a:rPr>
-              <a:t>Lead Designer / Digital Artist</a:t>
-            </a:r>
-            <a:endParaRPr lang="en-CA" sz="1200" dirty="0">
-              <a:latin typeface="Poppins Medium" panose="00000600000000000000" pitchFamily="2" charset="0"/>
-              <a:cs typeface="Poppins Medium" panose="00000600000000000000" pitchFamily="2" charset="0"/>
-            </a:endParaRPr>
-          </a:p>
-        </p:txBody>
-      </p:sp>
-      <p:sp>
-        <p:nvSpPr>
-          <p:cNvPr id="48" name="TextBox 47">
-            <a:extLst>
-              <a:ext uri="{FF2B5EF4-FFF2-40B4-BE49-F238E27FC236}">
-                <a16:creationId xmlns:a16="http://schemas.microsoft.com/office/drawing/2014/main" id="{50A24164-1B87-458B-B9BF-66EF8DE0310D}"/>
-              </a:ext>
-            </a:extLst>
-          </p:cNvPr>
-          <p:cNvSpPr txBox="1"/>
-          <p:nvPr/>
-        </p:nvSpPr>
-        <p:spPr>
-          <a:xfrm>
-            <a:off x="4795192" y="4199500"/>
-            <a:ext cx="2711371" cy="369332"/>
-          </a:xfrm>
-          <a:prstGeom prst="rect">
-            <a:avLst/>
-          </a:prstGeom>
-          <a:noFill/>
-        </p:spPr>
-        <p:txBody>
-          <a:bodyPr wrap="square">
-            <a:spAutoFit/>
-          </a:bodyPr>
-          <a:lstStyle/>
-          <a:p>
-            <a:pPr algn="ctr"/>
-            <a:r>
-              <a:rPr lang="en-US" dirty="0">
-                <a:latin typeface="Yeseva One" panose="00000500000000000000" pitchFamily="2" charset="0"/>
-                <a:cs typeface="Poppins Medium" panose="00000600000000000000" pitchFamily="2" charset="0"/>
-              </a:rPr>
-              <a:t>Sylvia </a:t>
-            </a:r>
-            <a:r>
-              <a:rPr lang="en-US" dirty="0" err="1">
-                <a:latin typeface="Yeseva One" panose="00000500000000000000" pitchFamily="2" charset="0"/>
-                <a:cs typeface="Poppins Medium" panose="00000600000000000000" pitchFamily="2" charset="0"/>
-              </a:rPr>
-              <a:t>Makuch</a:t>
-            </a:r>
-            <a:endParaRPr lang="en-CA" dirty="0">
-              <a:latin typeface="Yeseva One" panose="00000500000000000000" pitchFamily="2" charset="0"/>
-              <a:cs typeface="Poppins Medium" panose="00000600000000000000" pitchFamily="2" charset="0"/>
-            </a:endParaRPr>
-          </a:p>
-        </p:txBody>
-      </p:sp>
-      <p:pic>
-        <p:nvPicPr>
-          <p:cNvPr id="4" name="Picture 3">
-            <a:extLst>
-              <a:ext uri="{FF2B5EF4-FFF2-40B4-BE49-F238E27FC236}">
-                <a16:creationId xmlns:a16="http://schemas.microsoft.com/office/drawing/2014/main" id="{0A812C7D-57E2-4A7C-AF75-550ADB94F130}"/>
-              </a:ext>
-            </a:extLst>
-          </p:cNvPr>
-          <p:cNvPicPr>
-            <a:picLocks noChangeAspect="1"/>
-          </p:cNvPicPr>
-          <p:nvPr/>
-        </p:nvPicPr>
-        <p:blipFill>
-          <a:blip r:embed="rId4">
-            <a:extLst>
-              <a:ext uri="{28A0092B-C50C-407E-A947-70E740481C1C}">
-                <a14:useLocalDpi xmlns:a14="http://schemas.microsoft.com/office/drawing/2010/main" val="0"/>
-              </a:ext>
-            </a:extLst>
-          </a:blip>
-          <a:stretch>
-            <a:fillRect/>
-          </a:stretch>
-        </p:blipFill>
-        <p:spPr>
-          <a:xfrm>
-            <a:off x="5102975" y="2163003"/>
-            <a:ext cx="1986045" cy="1889635"/>
+            <a:off x="11311870" y="297775"/>
+            <a:ext cx="534034" cy="534034"/>
           </a:xfrm>
           <a:prstGeom prst="rect">
             <a:avLst/>
@@ -6615,7 +6549,7 @@
     </p:spTree>
     <p:extLst>
       <p:ext uri="{BB962C8B-B14F-4D97-AF65-F5344CB8AC3E}">
-        <p14:creationId xmlns:p14="http://schemas.microsoft.com/office/powerpoint/2010/main" val="4070166939"/>
+        <p14:creationId xmlns:p14="http://schemas.microsoft.com/office/powerpoint/2010/main" val="3048307854"/>
       </p:ext>
     </p:extLst>
   </p:cSld>
@@ -6647,7 +6581,7 @@
           <p:cNvPr id="2" name="Title 1">
             <a:extLst>
               <a:ext uri="{FF2B5EF4-FFF2-40B4-BE49-F238E27FC236}">
-                <a16:creationId xmlns:a16="http://schemas.microsoft.com/office/drawing/2014/main" id="{51946F17-B9A7-44C3-AA12-1D71D446F010}"/>
+                <a16:creationId xmlns:a16="http://schemas.microsoft.com/office/drawing/2014/main" id="{B1CA3D10-1EDE-4448-8FB1-98C0966E40A7}"/>
               </a:ext>
             </a:extLst>
           </p:cNvPr>
@@ -6667,7 +6601,7 @@
               <a:rPr lang="en-US" dirty="0">
                 <a:latin typeface="Yeseva One" panose="00000500000000000000" pitchFamily="2" charset="0"/>
               </a:rPr>
-              <a:t>Why we need investment?</a:t>
+              <a:t>Our Progress</a:t>
             </a:r>
             <a:endParaRPr lang="en-CA" dirty="0"/>
           </a:p>
@@ -6678,7 +6612,7 @@
           <p:cNvPr id="3" name="Content Placeholder 2">
             <a:extLst>
               <a:ext uri="{FF2B5EF4-FFF2-40B4-BE49-F238E27FC236}">
-                <a16:creationId xmlns:a16="http://schemas.microsoft.com/office/drawing/2014/main" id="{BED8E52F-06EC-423A-B182-0E4F00189AC1}"/>
+                <a16:creationId xmlns:a16="http://schemas.microsoft.com/office/drawing/2014/main" id="{B3AAF731-D3EC-418E-8A97-636521124C74}"/>
               </a:ext>
             </a:extLst>
           </p:cNvPr>
@@ -6689,224 +6623,66 @@
             <p:ph idx="1"/>
           </p:nvPr>
         </p:nvSpPr>
-        <p:spPr>
-          <a:xfrm>
-            <a:off x="838200" y="1825625"/>
-            <a:ext cx="6860458" cy="4351338"/>
-          </a:xfrm>
-        </p:spPr>
-        <p:txBody>
-          <a:bodyPr>
-            <a:normAutofit fontScale="92500" lnSpcReduction="20000"/>
-          </a:bodyPr>
-          <a:lstStyle/>
-          <a:p>
-            <a:pPr>
-              <a:lnSpc>
-                <a:spcPct val="110000"/>
-              </a:lnSpc>
-            </a:pPr>
-            <a:r>
-              <a:rPr lang="en-US" dirty="0">
-                <a:latin typeface="Poppins Light" panose="00000400000000000000" pitchFamily="2" charset="0"/>
-                <a:cs typeface="Poppins Light" panose="00000400000000000000" pitchFamily="2" charset="0"/>
-              </a:rPr>
-              <a:t>Influencer promotions.</a:t>
-            </a:r>
-          </a:p>
-          <a:p>
-            <a:pPr>
-              <a:lnSpc>
-                <a:spcPct val="110000"/>
-              </a:lnSpc>
-            </a:pPr>
-            <a:r>
-              <a:rPr lang="en-US" dirty="0">
-                <a:latin typeface="Poppins Light" panose="00000400000000000000" pitchFamily="2" charset="0"/>
-                <a:cs typeface="Poppins Light" panose="00000400000000000000" pitchFamily="2" charset="0"/>
-              </a:rPr>
-              <a:t>Advertisement / Marketing.</a:t>
-            </a:r>
-          </a:p>
-          <a:p>
-            <a:pPr>
-              <a:lnSpc>
-                <a:spcPct val="110000"/>
-              </a:lnSpc>
-            </a:pPr>
-            <a:r>
-              <a:rPr lang="en-US" dirty="0">
-                <a:latin typeface="Poppins Light" panose="00000400000000000000" pitchFamily="2" charset="0"/>
-                <a:cs typeface="Poppins Light" panose="00000400000000000000" pitchFamily="2" charset="0"/>
-              </a:rPr>
-              <a:t>Third party security audits.</a:t>
-            </a:r>
-          </a:p>
-          <a:p>
-            <a:pPr>
-              <a:lnSpc>
-                <a:spcPct val="110000"/>
-              </a:lnSpc>
-            </a:pPr>
-            <a:r>
-              <a:rPr lang="en-US" dirty="0">
-                <a:latin typeface="Poppins Light" panose="00000400000000000000" pitchFamily="2" charset="0"/>
-                <a:cs typeface="Poppins Light" panose="00000400000000000000" pitchFamily="2" charset="0"/>
-              </a:rPr>
-              <a:t>Software developers.</a:t>
-            </a:r>
-          </a:p>
-          <a:p>
-            <a:pPr>
-              <a:lnSpc>
-                <a:spcPct val="110000"/>
-              </a:lnSpc>
-            </a:pPr>
-            <a:r>
-              <a:rPr lang="en-US" dirty="0">
-                <a:latin typeface="Poppins Light" panose="00000400000000000000" pitchFamily="2" charset="0"/>
-                <a:cs typeface="Poppins Light" panose="00000400000000000000" pitchFamily="2" charset="0"/>
-              </a:rPr>
-              <a:t>ID verification / moderation team.</a:t>
-            </a:r>
-          </a:p>
-          <a:p>
-            <a:pPr>
-              <a:lnSpc>
-                <a:spcPct val="110000"/>
-              </a:lnSpc>
-            </a:pPr>
-            <a:r>
-              <a:rPr lang="en-US" dirty="0">
-                <a:latin typeface="Poppins Light" panose="00000400000000000000" pitchFamily="2" charset="0"/>
-                <a:cs typeface="Poppins Light" panose="00000400000000000000" pitchFamily="2" charset="0"/>
-              </a:rPr>
-              <a:t>Infrastructure costs.</a:t>
-            </a:r>
-          </a:p>
-          <a:p>
-            <a:pPr>
-              <a:lnSpc>
-                <a:spcPct val="110000"/>
-              </a:lnSpc>
-            </a:pPr>
-            <a:r>
-              <a:rPr lang="en-US" dirty="0">
-                <a:latin typeface="Poppins Light" panose="00000400000000000000" pitchFamily="2" charset="0"/>
-                <a:cs typeface="Poppins Light" panose="00000400000000000000" pitchFamily="2" charset="0"/>
-              </a:rPr>
-              <a:t>Legal costs.</a:t>
-            </a:r>
-          </a:p>
-          <a:p>
-            <a:pPr>
-              <a:lnSpc>
-                <a:spcPct val="110000"/>
-              </a:lnSpc>
-            </a:pPr>
-            <a:r>
-              <a:rPr lang="en-US" dirty="0">
-                <a:latin typeface="Poppins Light" panose="00000400000000000000" pitchFamily="2" charset="0"/>
-                <a:cs typeface="Poppins Light" panose="00000400000000000000" pitchFamily="2" charset="0"/>
-              </a:rPr>
-              <a:t>Content creation / video production.</a:t>
-            </a:r>
-          </a:p>
-          <a:p>
-            <a:pPr>
-              <a:lnSpc>
-                <a:spcPct val="110000"/>
-              </a:lnSpc>
-            </a:pPr>
-            <a:r>
-              <a:rPr lang="en-US" dirty="0">
-                <a:latin typeface="Poppins Light" panose="00000400000000000000" pitchFamily="2" charset="0"/>
-                <a:cs typeface="Poppins Light" panose="00000400000000000000" pitchFamily="2" charset="0"/>
-              </a:rPr>
-              <a:t>Compete with competition.</a:t>
-            </a:r>
-          </a:p>
-          <a:p>
+        <p:spPr/>
+        <p:txBody>
+          <a:bodyPr/>
+          <a:lstStyle/>
+          <a:p>
+            <a:r>
+              <a:rPr lang="en-US" dirty="0" err="1"/>
+              <a:t>Figmas</a:t>
+            </a:r>
+            <a:endParaRPr lang="en-US" dirty="0"/>
+          </a:p>
+          <a:p>
+            <a:r>
+              <a:rPr lang="en-US" dirty="0"/>
+              <a:t>Web app frontend</a:t>
+            </a:r>
+          </a:p>
+          <a:p>
+            <a:r>
+              <a:rPr lang="en-US" dirty="0"/>
+              <a:t>Server backend</a:t>
+            </a:r>
+          </a:p>
+          <a:p>
+            <a:r>
+              <a:rPr lang="en-US" dirty="0"/>
+              <a:t>Smart contracts, $NUDE.</a:t>
+            </a:r>
+          </a:p>
+          <a:p>
+            <a:r>
+              <a:rPr lang="en-US" dirty="0"/>
+              <a:t>Social media</a:t>
+            </a:r>
+          </a:p>
+          <a:p>
+            <a:r>
+              <a:rPr lang="en-US" dirty="0"/>
+              <a:t>Custom art</a:t>
+            </a:r>
+          </a:p>
+          <a:p>
+            <a:r>
+              <a:rPr lang="en-US" dirty="0"/>
+              <a:t>Pitch deck</a:t>
+            </a:r>
+          </a:p>
+          <a:p>
+            <a:r>
+              <a:rPr lang="en-US" dirty="0"/>
+              <a:t>Twitch streaming</a:t>
+            </a:r>
             <a:endParaRPr lang="en-CA" dirty="0"/>
           </a:p>
         </p:txBody>
       </p:sp>
-      <p:pic>
-        <p:nvPicPr>
-          <p:cNvPr id="5" name="Picture 4">
-            <a:extLst>
-              <a:ext uri="{FF2B5EF4-FFF2-40B4-BE49-F238E27FC236}">
-                <a16:creationId xmlns:a16="http://schemas.microsoft.com/office/drawing/2014/main" id="{B20C5808-1A2C-4FF1-9B30-424D73E4B3A8}"/>
-              </a:ext>
-            </a:extLst>
-          </p:cNvPr>
-          <p:cNvPicPr>
-            <a:picLocks noChangeAspect="1"/>
-          </p:cNvPicPr>
-          <p:nvPr/>
-        </p:nvPicPr>
-        <p:blipFill>
-          <a:blip r:embed="rId2">
-            <a:extLst>
-              <a:ext uri="{28A0092B-C50C-407E-A947-70E740481C1C}">
-                <a14:useLocalDpi xmlns:a14="http://schemas.microsoft.com/office/drawing/2010/main" val="0"/>
-              </a:ext>
-            </a:extLst>
-          </a:blip>
-          <a:stretch>
-            <a:fillRect/>
-          </a:stretch>
-        </p:blipFill>
-        <p:spPr>
-          <a:xfrm>
-            <a:off x="11353800" y="365125"/>
-            <a:ext cx="439688" cy="439688"/>
-          </a:xfrm>
-          <a:prstGeom prst="rect">
-            <a:avLst/>
-          </a:prstGeom>
-        </p:spPr>
-      </p:pic>
-      <p:pic>
-        <p:nvPicPr>
-          <p:cNvPr id="6" name="Picture 5">
-            <a:extLst>
-              <a:ext uri="{FF2B5EF4-FFF2-40B4-BE49-F238E27FC236}">
-                <a16:creationId xmlns:a16="http://schemas.microsoft.com/office/drawing/2014/main" id="{A01BB6D9-F76D-4D97-90F0-B363F2E3288B}"/>
-              </a:ext>
-            </a:extLst>
-          </p:cNvPr>
-          <p:cNvPicPr>
-            <a:picLocks noChangeAspect="1"/>
-          </p:cNvPicPr>
-          <p:nvPr/>
-        </p:nvPicPr>
-        <p:blipFill>
-          <a:blip r:embed="rId3">
-            <a:extLst>
-              <a:ext uri="{28A0092B-C50C-407E-A947-70E740481C1C}">
-                <a14:useLocalDpi xmlns:a14="http://schemas.microsoft.com/office/drawing/2010/main" val="0"/>
-              </a:ext>
-            </a:extLst>
-          </a:blip>
-          <a:stretch>
-            <a:fillRect/>
-          </a:stretch>
-        </p:blipFill>
-        <p:spPr>
-          <a:xfrm>
-            <a:off x="8023428" y="2050549"/>
-            <a:ext cx="3080973" cy="3080973"/>
-          </a:xfrm>
-          <a:prstGeom prst="rect">
-            <a:avLst/>
-          </a:prstGeom>
-        </p:spPr>
-      </p:pic>
     </p:spTree>
     <p:extLst>
       <p:ext uri="{BB962C8B-B14F-4D97-AF65-F5344CB8AC3E}">
-        <p14:creationId xmlns:p14="http://schemas.microsoft.com/office/powerpoint/2010/main" val="1145575828"/>
+        <p14:creationId xmlns:p14="http://schemas.microsoft.com/office/powerpoint/2010/main" val="1446048498"/>
       </p:ext>
     </p:extLst>
   </p:cSld>
@@ -6933,12 +6709,104 @@
           <a:chExt cx="0" cy="0"/>
         </a:xfrm>
       </p:grpSpPr>
+      <p:cxnSp>
+        <p:nvCxnSpPr>
+          <p:cNvPr id="27" name="Straight Connector 26">
+            <a:extLst>
+              <a:ext uri="{FF2B5EF4-FFF2-40B4-BE49-F238E27FC236}">
+                <a16:creationId xmlns:a16="http://schemas.microsoft.com/office/drawing/2014/main" id="{5E824EAC-ADEC-43E9-BD94-ADFF2DFD5F85}"/>
+              </a:ext>
+            </a:extLst>
+          </p:cNvPr>
+          <p:cNvCxnSpPr>
+            <a:cxnSpLocks/>
+          </p:cNvCxnSpPr>
+          <p:nvPr/>
+        </p:nvCxnSpPr>
+        <p:spPr>
+          <a:xfrm flipV="1">
+            <a:off x="973029" y="2799795"/>
+            <a:ext cx="2601615" cy="24582"/>
+          </a:xfrm>
+          <a:prstGeom prst="line">
+            <a:avLst/>
+          </a:prstGeom>
+          <a:ln>
+            <a:solidFill>
+              <a:schemeClr val="accent3">
+                <a:lumMod val="60000"/>
+                <a:lumOff val="40000"/>
+              </a:schemeClr>
+            </a:solidFill>
+          </a:ln>
+        </p:spPr>
+        <p:style>
+          <a:lnRef idx="1">
+            <a:schemeClr val="accent1"/>
+          </a:lnRef>
+          <a:fillRef idx="0">
+            <a:schemeClr val="accent1"/>
+          </a:fillRef>
+          <a:effectRef idx="0">
+            <a:schemeClr val="accent1"/>
+          </a:effectRef>
+          <a:fontRef idx="minor">
+            <a:schemeClr val="tx1"/>
+          </a:fontRef>
+        </p:style>
+      </p:cxnSp>
+      <p:cxnSp>
+        <p:nvCxnSpPr>
+          <p:cNvPr id="16" name="Straight Connector 15">
+            <a:extLst>
+              <a:ext uri="{FF2B5EF4-FFF2-40B4-BE49-F238E27FC236}">
+                <a16:creationId xmlns:a16="http://schemas.microsoft.com/office/drawing/2014/main" id="{2E784507-2A90-41F4-914A-2E0D3C25F17F}"/>
+              </a:ext>
+            </a:extLst>
+          </p:cNvPr>
+          <p:cNvCxnSpPr>
+            <a:cxnSpLocks/>
+          </p:cNvCxnSpPr>
+          <p:nvPr/>
+        </p:nvCxnSpPr>
+        <p:spPr>
+          <a:xfrm flipV="1">
+            <a:off x="973031" y="3357677"/>
+            <a:ext cx="2601615" cy="24582"/>
+          </a:xfrm>
+          <a:prstGeom prst="line">
+            <a:avLst/>
+          </a:prstGeom>
+          <a:ln>
+            <a:solidFill>
+              <a:schemeClr val="accent3">
+                <a:lumMod val="60000"/>
+                <a:lumOff val="40000"/>
+              </a:schemeClr>
+            </a:solidFill>
+          </a:ln>
+        </p:spPr>
+        <p:style>
+          <a:lnRef idx="1">
+            <a:schemeClr val="accent1"/>
+          </a:lnRef>
+          <a:fillRef idx="0">
+            <a:schemeClr val="accent1"/>
+          </a:fillRef>
+          <a:effectRef idx="0">
+            <a:schemeClr val="accent1"/>
+          </a:effectRef>
+          <a:fontRef idx="minor">
+            <a:schemeClr val="tx1"/>
+          </a:fontRef>
+        </p:style>
+      </p:cxnSp>
       <p:sp>
         <p:nvSpPr>
           <p:cNvPr id="2" name="Title 1">
             <a:extLst>
               <a:ext uri="{FF2B5EF4-FFF2-40B4-BE49-F238E27FC236}">
-                <a16:creationId xmlns:a16="http://schemas.microsoft.com/office/drawing/2014/main" id="{73C4E103-203C-4E4F-97B0-23C6EF7FD9F2}"/>
+                <a16:creationId xmlns:a16="http://schemas.microsoft.com/office/drawing/2014/main" id="{E0F8078E-5BC4-41A6-B505-9FDF374A8BB5}"/>
               </a:ext>
             </a:extLst>
           </p:cNvPr>
@@ -6958,109 +6826,27 @@
               <a:rPr lang="en-US" dirty="0">
                 <a:latin typeface="Yeseva One" panose="00000500000000000000" pitchFamily="2" charset="0"/>
               </a:rPr>
-              <a:t>How do we make money?</a:t>
-            </a:r>
-            <a:endParaRPr lang="en-CA" dirty="0"/>
-          </a:p>
-        </p:txBody>
-      </p:sp>
-      <p:sp>
-        <p:nvSpPr>
-          <p:cNvPr id="3" name="Content Placeholder 2">
-            <a:extLst>
-              <a:ext uri="{FF2B5EF4-FFF2-40B4-BE49-F238E27FC236}">
-                <a16:creationId xmlns:a16="http://schemas.microsoft.com/office/drawing/2014/main" id="{599A44D3-BED2-4D82-BD38-AC3F2CE02450}"/>
-              </a:ext>
-            </a:extLst>
-          </p:cNvPr>
-          <p:cNvSpPr>
-            <a:spLocks noGrp="1"/>
-          </p:cNvSpPr>
-          <p:nvPr>
-            <p:ph idx="1"/>
-          </p:nvPr>
-        </p:nvSpPr>
-        <p:spPr>
-          <a:xfrm>
-            <a:off x="838200" y="1825625"/>
-            <a:ext cx="5969655" cy="4351338"/>
-          </a:xfrm>
-        </p:spPr>
-        <p:txBody>
-          <a:bodyPr/>
-          <a:lstStyle/>
-          <a:p>
-            <a:r>
-              <a:rPr lang="en-US" dirty="0">
-                <a:latin typeface="Poppins Light" panose="00000400000000000000" pitchFamily="2" charset="0"/>
-                <a:cs typeface="Poppins Light" panose="00000400000000000000" pitchFamily="2" charset="0"/>
-              </a:rPr>
-              <a:t>10% cut on each transaction. </a:t>
-            </a:r>
-          </a:p>
-          <a:p>
-            <a:r>
-              <a:rPr lang="en-CA" dirty="0">
-                <a:latin typeface="Poppins Light" panose="00000400000000000000" pitchFamily="2" charset="0"/>
-                <a:cs typeface="Poppins Light" panose="00000400000000000000" pitchFamily="2" charset="0"/>
-              </a:rPr>
-              <a:t>Celebrity promotions. </a:t>
-            </a:r>
-          </a:p>
-          <a:p>
-            <a:r>
-              <a:rPr lang="en-CA" dirty="0">
-                <a:latin typeface="Poppins Light" panose="00000400000000000000" pitchFamily="2" charset="0"/>
-                <a:cs typeface="Poppins Light" panose="00000400000000000000" pitchFamily="2" charset="0"/>
-              </a:rPr>
-              <a:t>Company plugs.</a:t>
-            </a:r>
-          </a:p>
-          <a:p>
-            <a:r>
-              <a:rPr lang="en-CA" dirty="0">
-                <a:latin typeface="Poppins Light" panose="00000400000000000000" pitchFamily="2" charset="0"/>
-                <a:cs typeface="Poppins Light" panose="00000400000000000000" pitchFamily="2" charset="0"/>
-              </a:rPr>
-              <a:t>Advertisements.</a:t>
-            </a:r>
-          </a:p>
-          <a:p>
-            <a:r>
-              <a:rPr lang="en-CA" dirty="0">
-                <a:latin typeface="Poppins Light" panose="00000400000000000000" pitchFamily="2" charset="0"/>
-                <a:cs typeface="Poppins Light" panose="00000400000000000000" pitchFamily="2" charset="0"/>
-              </a:rPr>
-              <a:t>Merch.</a:t>
-            </a:r>
-          </a:p>
-          <a:p>
-            <a:r>
-              <a:rPr lang="en-CA" dirty="0">
-                <a:latin typeface="Poppins Light" panose="00000400000000000000" pitchFamily="2" charset="0"/>
-                <a:cs typeface="Poppins Light" panose="00000400000000000000" pitchFamily="2" charset="0"/>
-              </a:rPr>
-              <a:t>Crypto. $NUDE token.</a:t>
-            </a:r>
-          </a:p>
-          <a:p>
+              <a:t>Our Team</a:t>
+            </a:r>
             <a:endParaRPr lang="en-CA" dirty="0"/>
           </a:p>
         </p:txBody>
       </p:sp>
       <p:pic>
         <p:nvPicPr>
-          <p:cNvPr id="5" name="Picture 4">
-            <a:extLst>
-              <a:ext uri="{FF2B5EF4-FFF2-40B4-BE49-F238E27FC236}">
-                <a16:creationId xmlns:a16="http://schemas.microsoft.com/office/drawing/2014/main" id="{313110A8-4B4D-43E9-A94D-69FF1E4BE2BB}"/>
+          <p:cNvPr id="5" name="Content Placeholder 4">
+            <a:extLst>
+              <a:ext uri="{FF2B5EF4-FFF2-40B4-BE49-F238E27FC236}">
+                <a16:creationId xmlns:a16="http://schemas.microsoft.com/office/drawing/2014/main" id="{E8B79BEB-C0A3-4987-83FF-C0BD91A1E4E2}"/>
               </a:ext>
             </a:extLst>
           </p:cNvPr>
           <p:cNvPicPr>
-            <a:picLocks noChangeAspect="1"/>
+            <a:picLocks noGrp="1" noChangeAspect="1"/>
           </p:cNvPicPr>
-          <p:nvPr/>
+          <p:nvPr>
+            <p:ph idx="1"/>
+          </p:nvPr>
         </p:nvPicPr>
         <p:blipFill>
           <a:blip r:embed="rId2">
@@ -7076,20 +6862,109 @@
         </p:blipFill>
         <p:spPr>
           <a:xfrm>
-            <a:off x="11300819" y="312780"/>
-            <a:ext cx="519030" cy="519030"/>
-          </a:xfrm>
-          <a:prstGeom prst="rect">
+            <a:off x="11353800" y="308455"/>
+            <a:ext cx="483207" cy="483207"/>
+          </a:xfrm>
+        </p:spPr>
+      </p:pic>
+      <p:cxnSp>
+        <p:nvCxnSpPr>
+          <p:cNvPr id="14" name="Straight Connector 13">
+            <a:extLst>
+              <a:ext uri="{FF2B5EF4-FFF2-40B4-BE49-F238E27FC236}">
+                <a16:creationId xmlns:a16="http://schemas.microsoft.com/office/drawing/2014/main" id="{CF0A6EC9-05A2-41D5-A4D9-F813EF56724A}"/>
+              </a:ext>
+            </a:extLst>
+          </p:cNvPr>
+          <p:cNvCxnSpPr>
+            <a:cxnSpLocks/>
+          </p:cNvCxnSpPr>
+          <p:nvPr/>
+        </p:nvCxnSpPr>
+        <p:spPr>
+          <a:xfrm>
+            <a:off x="725259" y="3094763"/>
+            <a:ext cx="3126658" cy="0"/>
+          </a:xfrm>
+          <a:prstGeom prst="line">
             <a:avLst/>
           </a:prstGeom>
-        </p:spPr>
-      </p:pic>
+          <a:ln>
+            <a:solidFill>
+              <a:srgbClr val="FFC000"/>
+            </a:solidFill>
+          </a:ln>
+        </p:spPr>
+        <p:style>
+          <a:lnRef idx="2">
+            <a:schemeClr val="accent3"/>
+          </a:lnRef>
+          <a:fillRef idx="0">
+            <a:schemeClr val="accent3"/>
+          </a:fillRef>
+          <a:effectRef idx="1">
+            <a:schemeClr val="accent3"/>
+          </a:effectRef>
+          <a:fontRef idx="minor">
+            <a:schemeClr val="tx1"/>
+          </a:fontRef>
+        </p:style>
+      </p:cxnSp>
+      <p:sp>
+        <p:nvSpPr>
+          <p:cNvPr id="15" name="Oval 14">
+            <a:extLst>
+              <a:ext uri="{FF2B5EF4-FFF2-40B4-BE49-F238E27FC236}">
+                <a16:creationId xmlns:a16="http://schemas.microsoft.com/office/drawing/2014/main" id="{4153D177-BF84-432C-99CC-F8159E5284AA}"/>
+              </a:ext>
+            </a:extLst>
+          </p:cNvPr>
+          <p:cNvSpPr/>
+          <p:nvPr/>
+        </p:nvSpPr>
+        <p:spPr>
+          <a:xfrm>
+            <a:off x="1188358" y="2091267"/>
+            <a:ext cx="2170962" cy="2006993"/>
+          </a:xfrm>
+          <a:prstGeom prst="ellipse">
+            <a:avLst/>
+          </a:prstGeom>
+          <a:solidFill>
+            <a:schemeClr val="accent2"/>
+          </a:solidFill>
+        </p:spPr>
+        <p:style>
+          <a:lnRef idx="2">
+            <a:schemeClr val="accent1">
+              <a:shade val="50000"/>
+            </a:schemeClr>
+          </a:lnRef>
+          <a:fillRef idx="1">
+            <a:schemeClr val="accent1"/>
+          </a:fillRef>
+          <a:effectRef idx="0">
+            <a:schemeClr val="accent1"/>
+          </a:effectRef>
+          <a:fontRef idx="minor">
+            <a:schemeClr val="lt1"/>
+          </a:fontRef>
+        </p:style>
+        <p:txBody>
+          <a:bodyPr rtlCol="0" anchor="ctr"/>
+          <a:lstStyle/>
+          <a:p>
+            <a:pPr algn="ctr"/>
+            <a:endParaRPr lang="en-CA"/>
+          </a:p>
+        </p:txBody>
+      </p:sp>
       <p:pic>
         <p:nvPicPr>
-          <p:cNvPr id="6" name="Picture 5">
-            <a:extLst>
-              <a:ext uri="{FF2B5EF4-FFF2-40B4-BE49-F238E27FC236}">
-                <a16:creationId xmlns:a16="http://schemas.microsoft.com/office/drawing/2014/main" id="{45BCCCF6-BDD6-4B6E-8769-7B01C1160510}"/>
+          <p:cNvPr id="23" name="Picture 22">
+            <a:extLst>
+              <a:ext uri="{FF2B5EF4-FFF2-40B4-BE49-F238E27FC236}">
+                <a16:creationId xmlns:a16="http://schemas.microsoft.com/office/drawing/2014/main" id="{42B44C66-2A8C-4C22-819F-CBD75B0DDCD6}"/>
               </a:ext>
             </a:extLst>
           </p:cNvPr>
@@ -7112,8 +6987,411 @@
         </p:blipFill>
         <p:spPr>
           <a:xfrm>
-            <a:off x="7505945" y="3002772"/>
-            <a:ext cx="2796442" cy="2796442"/>
+            <a:off x="1268853" y="2136887"/>
+            <a:ext cx="2009969" cy="1915751"/>
+          </a:xfrm>
+          <a:prstGeom prst="rect">
+            <a:avLst/>
+          </a:prstGeom>
+        </p:spPr>
+      </p:pic>
+      <p:sp>
+        <p:nvSpPr>
+          <p:cNvPr id="24" name="TextBox 23">
+            <a:extLst>
+              <a:ext uri="{FF2B5EF4-FFF2-40B4-BE49-F238E27FC236}">
+                <a16:creationId xmlns:a16="http://schemas.microsoft.com/office/drawing/2014/main" id="{D5A321C3-FFC0-4C5F-AC4A-246C9A8E11BB}"/>
+              </a:ext>
+            </a:extLst>
+          </p:cNvPr>
+          <p:cNvSpPr txBox="1"/>
+          <p:nvPr/>
+        </p:nvSpPr>
+        <p:spPr>
+          <a:xfrm>
+            <a:off x="995772" y="4630139"/>
+            <a:ext cx="2688630" cy="276999"/>
+          </a:xfrm>
+          <a:prstGeom prst="rect">
+            <a:avLst/>
+          </a:prstGeom>
+          <a:noFill/>
+        </p:spPr>
+        <p:txBody>
+          <a:bodyPr wrap="square" rtlCol="0">
+            <a:spAutoFit/>
+          </a:bodyPr>
+          <a:lstStyle/>
+          <a:p>
+            <a:r>
+              <a:rPr lang="en-US" sz="1200" dirty="0">
+                <a:latin typeface="Poppins Medium" panose="00000600000000000000" pitchFamily="2" charset="0"/>
+                <a:cs typeface="Poppins Medium" panose="00000600000000000000" pitchFamily="2" charset="0"/>
+              </a:rPr>
+              <a:t>Founder / CEO / Lead Engineer</a:t>
+            </a:r>
+            <a:endParaRPr lang="en-CA" sz="1200" dirty="0">
+              <a:latin typeface="Poppins Medium" panose="00000600000000000000" pitchFamily="2" charset="0"/>
+              <a:cs typeface="Poppins Medium" panose="00000600000000000000" pitchFamily="2" charset="0"/>
+            </a:endParaRPr>
+          </a:p>
+        </p:txBody>
+      </p:sp>
+      <p:sp>
+        <p:nvSpPr>
+          <p:cNvPr id="26" name="TextBox 25">
+            <a:extLst>
+              <a:ext uri="{FF2B5EF4-FFF2-40B4-BE49-F238E27FC236}">
+                <a16:creationId xmlns:a16="http://schemas.microsoft.com/office/drawing/2014/main" id="{CDE202D1-9ACD-4802-A37B-54804F6CC221}"/>
+              </a:ext>
+            </a:extLst>
+          </p:cNvPr>
+          <p:cNvSpPr txBox="1"/>
+          <p:nvPr/>
+        </p:nvSpPr>
+        <p:spPr>
+          <a:xfrm>
+            <a:off x="973030" y="4199500"/>
+            <a:ext cx="2711371" cy="369332"/>
+          </a:xfrm>
+          <a:prstGeom prst="rect">
+            <a:avLst/>
+          </a:prstGeom>
+          <a:noFill/>
+        </p:spPr>
+        <p:txBody>
+          <a:bodyPr wrap="square">
+            <a:spAutoFit/>
+          </a:bodyPr>
+          <a:lstStyle/>
+          <a:p>
+            <a:r>
+              <a:rPr lang="en-US" dirty="0">
+                <a:latin typeface="Yeseva One" panose="00000500000000000000" pitchFamily="2" charset="0"/>
+                <a:cs typeface="Poppins Medium" panose="00000600000000000000" pitchFamily="2" charset="0"/>
+              </a:rPr>
+              <a:t>Christopher </a:t>
+            </a:r>
+            <a:r>
+              <a:rPr lang="en-US" dirty="0" err="1">
+                <a:latin typeface="Yeseva One" panose="00000500000000000000" pitchFamily="2" charset="0"/>
+                <a:cs typeface="Poppins Medium" panose="00000600000000000000" pitchFamily="2" charset="0"/>
+              </a:rPr>
+              <a:t>Trimboli</a:t>
+            </a:r>
+            <a:endParaRPr lang="en-CA" dirty="0">
+              <a:latin typeface="Yeseva One" panose="00000500000000000000" pitchFamily="2" charset="0"/>
+              <a:cs typeface="Poppins Medium" panose="00000600000000000000" pitchFamily="2" charset="0"/>
+            </a:endParaRPr>
+          </a:p>
+        </p:txBody>
+      </p:sp>
+      <p:cxnSp>
+        <p:nvCxnSpPr>
+          <p:cNvPr id="42" name="Straight Connector 41">
+            <a:extLst>
+              <a:ext uri="{FF2B5EF4-FFF2-40B4-BE49-F238E27FC236}">
+                <a16:creationId xmlns:a16="http://schemas.microsoft.com/office/drawing/2014/main" id="{C7FEB43B-6C76-41DC-8609-A6E9B07F2357}"/>
+              </a:ext>
+            </a:extLst>
+          </p:cNvPr>
+          <p:cNvCxnSpPr>
+            <a:cxnSpLocks/>
+          </p:cNvCxnSpPr>
+          <p:nvPr/>
+        </p:nvCxnSpPr>
+        <p:spPr>
+          <a:xfrm flipV="1">
+            <a:off x="4795191" y="2799795"/>
+            <a:ext cx="2601615" cy="24582"/>
+          </a:xfrm>
+          <a:prstGeom prst="line">
+            <a:avLst/>
+          </a:prstGeom>
+          <a:ln>
+            <a:solidFill>
+              <a:schemeClr val="accent3">
+                <a:lumMod val="60000"/>
+                <a:lumOff val="40000"/>
+              </a:schemeClr>
+            </a:solidFill>
+          </a:ln>
+        </p:spPr>
+        <p:style>
+          <a:lnRef idx="1">
+            <a:schemeClr val="accent1"/>
+          </a:lnRef>
+          <a:fillRef idx="0">
+            <a:schemeClr val="accent1"/>
+          </a:fillRef>
+          <a:effectRef idx="0">
+            <a:schemeClr val="accent1"/>
+          </a:effectRef>
+          <a:fontRef idx="minor">
+            <a:schemeClr val="tx1"/>
+          </a:fontRef>
+        </p:style>
+      </p:cxnSp>
+      <p:cxnSp>
+        <p:nvCxnSpPr>
+          <p:cNvPr id="43" name="Straight Connector 42">
+            <a:extLst>
+              <a:ext uri="{FF2B5EF4-FFF2-40B4-BE49-F238E27FC236}">
+                <a16:creationId xmlns:a16="http://schemas.microsoft.com/office/drawing/2014/main" id="{8A0CA6D1-065B-4201-9574-0BDA1EEC0952}"/>
+              </a:ext>
+            </a:extLst>
+          </p:cNvPr>
+          <p:cNvCxnSpPr>
+            <a:cxnSpLocks/>
+          </p:cNvCxnSpPr>
+          <p:nvPr/>
+        </p:nvCxnSpPr>
+        <p:spPr>
+          <a:xfrm flipV="1">
+            <a:off x="4795193" y="3357677"/>
+            <a:ext cx="2601615" cy="24582"/>
+          </a:xfrm>
+          <a:prstGeom prst="line">
+            <a:avLst/>
+          </a:prstGeom>
+          <a:ln>
+            <a:solidFill>
+              <a:schemeClr val="accent3">
+                <a:lumMod val="60000"/>
+                <a:lumOff val="40000"/>
+              </a:schemeClr>
+            </a:solidFill>
+          </a:ln>
+        </p:spPr>
+        <p:style>
+          <a:lnRef idx="1">
+            <a:schemeClr val="accent1"/>
+          </a:lnRef>
+          <a:fillRef idx="0">
+            <a:schemeClr val="accent1"/>
+          </a:fillRef>
+          <a:effectRef idx="0">
+            <a:schemeClr val="accent1"/>
+          </a:effectRef>
+          <a:fontRef idx="minor">
+            <a:schemeClr val="tx1"/>
+          </a:fontRef>
+        </p:style>
+      </p:cxnSp>
+      <p:cxnSp>
+        <p:nvCxnSpPr>
+          <p:cNvPr id="44" name="Straight Connector 43">
+            <a:extLst>
+              <a:ext uri="{FF2B5EF4-FFF2-40B4-BE49-F238E27FC236}">
+                <a16:creationId xmlns:a16="http://schemas.microsoft.com/office/drawing/2014/main" id="{55D905D5-597F-4FCB-AD16-B031C1764589}"/>
+              </a:ext>
+            </a:extLst>
+          </p:cNvPr>
+          <p:cNvCxnSpPr>
+            <a:cxnSpLocks/>
+          </p:cNvCxnSpPr>
+          <p:nvPr/>
+        </p:nvCxnSpPr>
+        <p:spPr>
+          <a:xfrm>
+            <a:off x="4547421" y="3094763"/>
+            <a:ext cx="3126658" cy="0"/>
+          </a:xfrm>
+          <a:prstGeom prst="line">
+            <a:avLst/>
+          </a:prstGeom>
+          <a:ln>
+            <a:solidFill>
+              <a:srgbClr val="FB74FE"/>
+            </a:solidFill>
+          </a:ln>
+        </p:spPr>
+        <p:style>
+          <a:lnRef idx="2">
+            <a:schemeClr val="accent3"/>
+          </a:lnRef>
+          <a:fillRef idx="0">
+            <a:schemeClr val="accent3"/>
+          </a:fillRef>
+          <a:effectRef idx="1">
+            <a:schemeClr val="accent3"/>
+          </a:effectRef>
+          <a:fontRef idx="minor">
+            <a:schemeClr val="tx1"/>
+          </a:fontRef>
+        </p:style>
+      </p:cxnSp>
+      <p:sp>
+        <p:nvSpPr>
+          <p:cNvPr id="45" name="Oval 44">
+            <a:extLst>
+              <a:ext uri="{FF2B5EF4-FFF2-40B4-BE49-F238E27FC236}">
+                <a16:creationId xmlns:a16="http://schemas.microsoft.com/office/drawing/2014/main" id="{7E1B78C5-F887-491D-8D3F-1315B786C1C8}"/>
+              </a:ext>
+            </a:extLst>
+          </p:cNvPr>
+          <p:cNvSpPr/>
+          <p:nvPr/>
+        </p:nvSpPr>
+        <p:spPr>
+          <a:xfrm>
+            <a:off x="5010520" y="2091267"/>
+            <a:ext cx="2170962" cy="2006993"/>
+          </a:xfrm>
+          <a:prstGeom prst="ellipse">
+            <a:avLst/>
+          </a:prstGeom>
+          <a:solidFill>
+            <a:srgbClr val="FB74FE"/>
+          </a:solidFill>
+        </p:spPr>
+        <p:style>
+          <a:lnRef idx="2">
+            <a:schemeClr val="accent1">
+              <a:shade val="50000"/>
+            </a:schemeClr>
+          </a:lnRef>
+          <a:fillRef idx="1">
+            <a:schemeClr val="accent1"/>
+          </a:fillRef>
+          <a:effectRef idx="0">
+            <a:schemeClr val="accent1"/>
+          </a:effectRef>
+          <a:fontRef idx="minor">
+            <a:schemeClr val="lt1"/>
+          </a:fontRef>
+        </p:style>
+        <p:txBody>
+          <a:bodyPr rtlCol="0" anchor="ctr"/>
+          <a:lstStyle/>
+          <a:p>
+            <a:pPr algn="ctr"/>
+            <a:endParaRPr lang="en-CA"/>
+          </a:p>
+        </p:txBody>
+      </p:sp>
+      <p:sp>
+        <p:nvSpPr>
+          <p:cNvPr id="47" name="TextBox 46">
+            <a:extLst>
+              <a:ext uri="{FF2B5EF4-FFF2-40B4-BE49-F238E27FC236}">
+                <a16:creationId xmlns:a16="http://schemas.microsoft.com/office/drawing/2014/main" id="{B1E60453-717B-4F8A-92F4-81315775A76D}"/>
+              </a:ext>
+            </a:extLst>
+          </p:cNvPr>
+          <p:cNvSpPr txBox="1"/>
+          <p:nvPr/>
+        </p:nvSpPr>
+        <p:spPr>
+          <a:xfrm>
+            <a:off x="5010520" y="4622666"/>
+            <a:ext cx="2780435" cy="276999"/>
+          </a:xfrm>
+          <a:prstGeom prst="rect">
+            <a:avLst/>
+          </a:prstGeom>
+          <a:noFill/>
+        </p:spPr>
+        <p:txBody>
+          <a:bodyPr wrap="square" rtlCol="0">
+            <a:spAutoFit/>
+          </a:bodyPr>
+          <a:lstStyle/>
+          <a:p>
+            <a:r>
+              <a:rPr lang="en-US" sz="1200" dirty="0">
+                <a:latin typeface="Poppins Medium" panose="00000600000000000000" pitchFamily="2" charset="0"/>
+                <a:cs typeface="Poppins Medium" panose="00000600000000000000" pitchFamily="2" charset="0"/>
+              </a:rPr>
+              <a:t>Lead Designer / Digital Artist</a:t>
+            </a:r>
+            <a:endParaRPr lang="en-CA" sz="1200" dirty="0">
+              <a:latin typeface="Poppins Medium" panose="00000600000000000000" pitchFamily="2" charset="0"/>
+              <a:cs typeface="Poppins Medium" panose="00000600000000000000" pitchFamily="2" charset="0"/>
+            </a:endParaRPr>
+          </a:p>
+        </p:txBody>
+      </p:sp>
+      <p:sp>
+        <p:nvSpPr>
+          <p:cNvPr id="48" name="TextBox 47">
+            <a:extLst>
+              <a:ext uri="{FF2B5EF4-FFF2-40B4-BE49-F238E27FC236}">
+                <a16:creationId xmlns:a16="http://schemas.microsoft.com/office/drawing/2014/main" id="{50A24164-1B87-458B-B9BF-66EF8DE0310D}"/>
+              </a:ext>
+            </a:extLst>
+          </p:cNvPr>
+          <p:cNvSpPr txBox="1"/>
+          <p:nvPr/>
+        </p:nvSpPr>
+        <p:spPr>
+          <a:xfrm>
+            <a:off x="4795192" y="4199500"/>
+            <a:ext cx="2711371" cy="369332"/>
+          </a:xfrm>
+          <a:prstGeom prst="rect">
+            <a:avLst/>
+          </a:prstGeom>
+          <a:noFill/>
+        </p:spPr>
+        <p:txBody>
+          <a:bodyPr wrap="square">
+            <a:spAutoFit/>
+          </a:bodyPr>
+          <a:lstStyle/>
+          <a:p>
+            <a:pPr algn="ctr"/>
+            <a:r>
+              <a:rPr lang="en-US" dirty="0">
+                <a:latin typeface="Yeseva One" panose="00000500000000000000" pitchFamily="2" charset="0"/>
+                <a:cs typeface="Poppins Medium" panose="00000600000000000000" pitchFamily="2" charset="0"/>
+              </a:rPr>
+              <a:t>Sylvia </a:t>
+            </a:r>
+            <a:r>
+              <a:rPr lang="en-US" dirty="0" err="1">
+                <a:latin typeface="Yeseva One" panose="00000500000000000000" pitchFamily="2" charset="0"/>
+                <a:cs typeface="Poppins Medium" panose="00000600000000000000" pitchFamily="2" charset="0"/>
+              </a:rPr>
+              <a:t>Makuch</a:t>
+            </a:r>
+            <a:endParaRPr lang="en-CA" dirty="0">
+              <a:latin typeface="Yeseva One" panose="00000500000000000000" pitchFamily="2" charset="0"/>
+              <a:cs typeface="Poppins Medium" panose="00000600000000000000" pitchFamily="2" charset="0"/>
+            </a:endParaRPr>
+          </a:p>
+        </p:txBody>
+      </p:sp>
+      <p:pic>
+        <p:nvPicPr>
+          <p:cNvPr id="4" name="Picture 3">
+            <a:extLst>
+              <a:ext uri="{FF2B5EF4-FFF2-40B4-BE49-F238E27FC236}">
+                <a16:creationId xmlns:a16="http://schemas.microsoft.com/office/drawing/2014/main" id="{0A812C7D-57E2-4A7C-AF75-550ADB94F130}"/>
+              </a:ext>
+            </a:extLst>
+          </p:cNvPr>
+          <p:cNvPicPr>
+            <a:picLocks noChangeAspect="1"/>
+          </p:cNvPicPr>
+          <p:nvPr/>
+        </p:nvPicPr>
+        <p:blipFill>
+          <a:blip r:embed="rId4">
+            <a:extLst>
+              <a:ext uri="{28A0092B-C50C-407E-A947-70E740481C1C}">
+                <a14:useLocalDpi xmlns:a14="http://schemas.microsoft.com/office/drawing/2010/main" val="0"/>
+              </a:ext>
+            </a:extLst>
+          </a:blip>
+          <a:stretch>
+            <a:fillRect/>
+          </a:stretch>
+        </p:blipFill>
+        <p:spPr>
+          <a:xfrm>
+            <a:off x="5102975" y="2163003"/>
+            <a:ext cx="1986045" cy="1889635"/>
           </a:xfrm>
           <a:prstGeom prst="rect">
             <a:avLst/>
@@ -7123,7 +7401,7 @@
     </p:spTree>
     <p:extLst>
       <p:ext uri="{BB962C8B-B14F-4D97-AF65-F5344CB8AC3E}">
-        <p14:creationId xmlns:p14="http://schemas.microsoft.com/office/powerpoint/2010/main" val="625031941"/>
+        <p14:creationId xmlns:p14="http://schemas.microsoft.com/office/powerpoint/2010/main" val="4070166939"/>
       </p:ext>
     </p:extLst>
   </p:cSld>
@@ -7155,7 +7433,7 @@
           <p:cNvPr id="2" name="Title 1">
             <a:extLst>
               <a:ext uri="{FF2B5EF4-FFF2-40B4-BE49-F238E27FC236}">
-                <a16:creationId xmlns:a16="http://schemas.microsoft.com/office/drawing/2014/main" id="{5A7D9E14-614B-4A34-A711-812427B03D19}"/>
+                <a16:creationId xmlns:a16="http://schemas.microsoft.com/office/drawing/2014/main" id="{51946F17-B9A7-44C3-AA12-1D71D446F010}"/>
               </a:ext>
             </a:extLst>
           </p:cNvPr>
@@ -7175,8 +7453,166 @@
               <a:rPr lang="en-US" dirty="0">
                 <a:latin typeface="Yeseva One" panose="00000500000000000000" pitchFamily="2" charset="0"/>
               </a:rPr>
-              <a:t>Our Competition</a:t>
-            </a:r>
+              <a:t>Why we need investment?</a:t>
+            </a:r>
+            <a:endParaRPr lang="en-CA" dirty="0"/>
+          </a:p>
+        </p:txBody>
+      </p:sp>
+      <p:sp>
+        <p:nvSpPr>
+          <p:cNvPr id="3" name="Content Placeholder 2">
+            <a:extLst>
+              <a:ext uri="{FF2B5EF4-FFF2-40B4-BE49-F238E27FC236}">
+                <a16:creationId xmlns:a16="http://schemas.microsoft.com/office/drawing/2014/main" id="{BED8E52F-06EC-423A-B182-0E4F00189AC1}"/>
+              </a:ext>
+            </a:extLst>
+          </p:cNvPr>
+          <p:cNvSpPr>
+            <a:spLocks noGrp="1"/>
+          </p:cNvSpPr>
+          <p:nvPr>
+            <p:ph idx="1"/>
+          </p:nvPr>
+        </p:nvSpPr>
+        <p:spPr>
+          <a:xfrm>
+            <a:off x="838200" y="1825625"/>
+            <a:ext cx="6860458" cy="4351338"/>
+          </a:xfrm>
+        </p:spPr>
+        <p:txBody>
+          <a:bodyPr>
+            <a:normAutofit fontScale="92500" lnSpcReduction="20000"/>
+          </a:bodyPr>
+          <a:lstStyle/>
+          <a:p>
+            <a:pPr>
+              <a:lnSpc>
+                <a:spcPct val="110000"/>
+              </a:lnSpc>
+            </a:pPr>
+            <a:r>
+              <a:rPr lang="en-US" dirty="0">
+                <a:latin typeface="Poppins Light" panose="00000400000000000000" pitchFamily="2" charset="0"/>
+                <a:cs typeface="Poppins Light" panose="00000400000000000000" pitchFamily="2" charset="0"/>
+              </a:rPr>
+              <a:t>Influencer promotions.</a:t>
+            </a:r>
+          </a:p>
+          <a:p>
+            <a:pPr>
+              <a:lnSpc>
+                <a:spcPct val="110000"/>
+              </a:lnSpc>
+            </a:pPr>
+            <a:r>
+              <a:rPr lang="en-US" dirty="0">
+                <a:latin typeface="Poppins Light" panose="00000400000000000000" pitchFamily="2" charset="0"/>
+                <a:cs typeface="Poppins Light" panose="00000400000000000000" pitchFamily="2" charset="0"/>
+              </a:rPr>
+              <a:t>Advertisement / Marketing.</a:t>
+            </a:r>
+          </a:p>
+          <a:p>
+            <a:pPr>
+              <a:lnSpc>
+                <a:spcPct val="110000"/>
+              </a:lnSpc>
+            </a:pPr>
+            <a:r>
+              <a:rPr lang="en-US" dirty="0">
+                <a:latin typeface="Poppins Light" panose="00000400000000000000" pitchFamily="2" charset="0"/>
+                <a:cs typeface="Poppins Light" panose="00000400000000000000" pitchFamily="2" charset="0"/>
+              </a:rPr>
+              <a:t>Third party security audits.</a:t>
+            </a:r>
+          </a:p>
+          <a:p>
+            <a:pPr>
+              <a:lnSpc>
+                <a:spcPct val="110000"/>
+              </a:lnSpc>
+            </a:pPr>
+            <a:r>
+              <a:rPr lang="en-US" dirty="0">
+                <a:latin typeface="Poppins Light" panose="00000400000000000000" pitchFamily="2" charset="0"/>
+                <a:cs typeface="Poppins Light" panose="00000400000000000000" pitchFamily="2" charset="0"/>
+              </a:rPr>
+              <a:t>Software developers.</a:t>
+            </a:r>
+          </a:p>
+          <a:p>
+            <a:pPr>
+              <a:lnSpc>
+                <a:spcPct val="110000"/>
+              </a:lnSpc>
+            </a:pPr>
+            <a:r>
+              <a:rPr lang="en-US" dirty="0">
+                <a:latin typeface="Poppins Light" panose="00000400000000000000" pitchFamily="2" charset="0"/>
+                <a:cs typeface="Poppins Light" panose="00000400000000000000" pitchFamily="2" charset="0"/>
+              </a:rPr>
+              <a:t>ID verification / moderation team.</a:t>
+            </a:r>
+          </a:p>
+          <a:p>
+            <a:pPr>
+              <a:lnSpc>
+                <a:spcPct val="110000"/>
+              </a:lnSpc>
+            </a:pPr>
+            <a:r>
+              <a:rPr lang="en-US" dirty="0">
+                <a:latin typeface="Poppins Light" panose="00000400000000000000" pitchFamily="2" charset="0"/>
+                <a:cs typeface="Poppins Light" panose="00000400000000000000" pitchFamily="2" charset="0"/>
+              </a:rPr>
+              <a:t>Infrastructure costs.</a:t>
+            </a:r>
+          </a:p>
+          <a:p>
+            <a:pPr>
+              <a:lnSpc>
+                <a:spcPct val="110000"/>
+              </a:lnSpc>
+            </a:pPr>
+            <a:r>
+              <a:rPr lang="en-US" dirty="0">
+                <a:latin typeface="Poppins Light" panose="00000400000000000000" pitchFamily="2" charset="0"/>
+                <a:cs typeface="Poppins Light" panose="00000400000000000000" pitchFamily="2" charset="0"/>
+              </a:rPr>
+              <a:t>Legal costs.</a:t>
+            </a:r>
+          </a:p>
+          <a:p>
+            <a:pPr>
+              <a:lnSpc>
+                <a:spcPct val="110000"/>
+              </a:lnSpc>
+            </a:pPr>
+            <a:r>
+              <a:rPr lang="en-US" dirty="0">
+                <a:latin typeface="Poppins Light" panose="00000400000000000000" pitchFamily="2" charset="0"/>
+                <a:cs typeface="Poppins Light" panose="00000400000000000000" pitchFamily="2" charset="0"/>
+              </a:rPr>
+              <a:t>Content creation / video production.</a:t>
+            </a:r>
+          </a:p>
+          <a:p>
+            <a:pPr>
+              <a:lnSpc>
+                <a:spcPct val="110000"/>
+              </a:lnSpc>
+            </a:pPr>
+            <a:r>
+              <a:rPr lang="en-US" dirty="0">
+                <a:latin typeface="Poppins Light" panose="00000400000000000000" pitchFamily="2" charset="0"/>
+                <a:cs typeface="Poppins Light" panose="00000400000000000000" pitchFamily="2" charset="0"/>
+              </a:rPr>
+              <a:t>Compete with funded competition.</a:t>
+            </a:r>
+          </a:p>
+          <a:p>
             <a:endParaRPr lang="en-CA" dirty="0"/>
           </a:p>
         </p:txBody>
@@ -7186,7 +7622,7 @@
           <p:cNvPr id="5" name="Picture 4">
             <a:extLst>
               <a:ext uri="{FF2B5EF4-FFF2-40B4-BE49-F238E27FC236}">
-                <a16:creationId xmlns:a16="http://schemas.microsoft.com/office/drawing/2014/main" id="{0D8AA00E-2FA8-436C-93AF-81D3B677D479}"/>
+                <a16:creationId xmlns:a16="http://schemas.microsoft.com/office/drawing/2014/main" id="{B20C5808-1A2C-4FF1-9B30-424D73E4B3A8}"/>
               </a:ext>
             </a:extLst>
           </p:cNvPr>
@@ -7209,8 +7645,8 @@
         </p:blipFill>
         <p:spPr>
           <a:xfrm>
-            <a:off x="7145747" y="1714589"/>
-            <a:ext cx="2600325" cy="638175"/>
+            <a:off x="11353800" y="365125"/>
+            <a:ext cx="439688" cy="439688"/>
           </a:xfrm>
           <a:prstGeom prst="rect">
             <a:avLst/>
@@ -7219,10 +7655,10 @@
       </p:pic>
       <p:pic>
         <p:nvPicPr>
-          <p:cNvPr id="7" name="Picture 6">
-            <a:extLst>
-              <a:ext uri="{FF2B5EF4-FFF2-40B4-BE49-F238E27FC236}">
-                <a16:creationId xmlns:a16="http://schemas.microsoft.com/office/drawing/2014/main" id="{95D5B2F7-E7EA-4F59-9EBB-DBD901D8A269}"/>
+          <p:cNvPr id="6" name="Picture 5">
+            <a:extLst>
+              <a:ext uri="{FF2B5EF4-FFF2-40B4-BE49-F238E27FC236}">
+                <a16:creationId xmlns:a16="http://schemas.microsoft.com/office/drawing/2014/main" id="{A01BB6D9-F76D-4D97-90F0-B363F2E3288B}"/>
               </a:ext>
             </a:extLst>
           </p:cNvPr>
@@ -7245,186 +7681,18 @@
         </p:blipFill>
         <p:spPr>
           <a:xfrm>
-            <a:off x="1911391" y="1855117"/>
-            <a:ext cx="2438400" cy="609600"/>
+            <a:off x="8023428" y="2050549"/>
+            <a:ext cx="3080973" cy="3080973"/>
           </a:xfrm>
           <a:prstGeom prst="rect">
             <a:avLst/>
           </a:prstGeom>
         </p:spPr>
       </p:pic>
-      <p:pic>
-        <p:nvPicPr>
-          <p:cNvPr id="9" name="Picture 8">
-            <a:extLst>
-              <a:ext uri="{FF2B5EF4-FFF2-40B4-BE49-F238E27FC236}">
-                <a16:creationId xmlns:a16="http://schemas.microsoft.com/office/drawing/2014/main" id="{30C5F91F-6535-4CAC-83CB-8DFD72912499}"/>
-              </a:ext>
-            </a:extLst>
-          </p:cNvPr>
-          <p:cNvPicPr>
-            <a:picLocks noChangeAspect="1"/>
-          </p:cNvPicPr>
-          <p:nvPr/>
-        </p:nvPicPr>
-        <p:blipFill>
-          <a:blip r:embed="rId4">
-            <a:extLst>
-              <a:ext uri="{28A0092B-C50C-407E-A947-70E740481C1C}">
-                <a14:useLocalDpi xmlns:a14="http://schemas.microsoft.com/office/drawing/2010/main" val="0"/>
-              </a:ext>
-            </a:extLst>
-          </a:blip>
-          <a:stretch>
-            <a:fillRect/>
-          </a:stretch>
-        </p:blipFill>
-        <p:spPr>
-          <a:xfrm>
-            <a:off x="1628222" y="4282774"/>
-            <a:ext cx="2456096" cy="559333"/>
-          </a:xfrm>
-          <a:prstGeom prst="rect">
-            <a:avLst/>
-          </a:prstGeom>
-        </p:spPr>
-      </p:pic>
-      <p:sp>
-        <p:nvSpPr>
-          <p:cNvPr id="12" name="TextBox 11">
-            <a:extLst>
-              <a:ext uri="{FF2B5EF4-FFF2-40B4-BE49-F238E27FC236}">
-                <a16:creationId xmlns:a16="http://schemas.microsoft.com/office/drawing/2014/main" id="{1C3F524C-586F-47FA-AC6B-343DD406BACC}"/>
-              </a:ext>
-            </a:extLst>
-          </p:cNvPr>
-          <p:cNvSpPr txBox="1"/>
-          <p:nvPr/>
-        </p:nvSpPr>
-        <p:spPr>
-          <a:xfrm>
-            <a:off x="1575128" y="2721371"/>
-            <a:ext cx="3516016" cy="1200329"/>
-          </a:xfrm>
-          <a:prstGeom prst="rect">
-            <a:avLst/>
-          </a:prstGeom>
-          <a:noFill/>
-        </p:spPr>
-        <p:txBody>
-          <a:bodyPr wrap="square" rtlCol="0">
-            <a:spAutoFit/>
-          </a:bodyPr>
-          <a:lstStyle/>
-          <a:p>
-            <a:r>
-              <a:rPr lang="en-US" dirty="0" err="1"/>
-              <a:t>OnyFans</a:t>
-            </a:r>
-            <a:r>
-              <a:rPr lang="en-US" dirty="0"/>
-              <a:t> suffers majorly by using traditional banking solutions. We are using the blockchain and do not have the same concerns.</a:t>
-            </a:r>
-            <a:endParaRPr lang="en-CA" dirty="0"/>
-          </a:p>
-        </p:txBody>
-      </p:sp>
-      <p:sp>
-        <p:nvSpPr>
-          <p:cNvPr id="13" name="TextBox 12">
-            <a:extLst>
-              <a:ext uri="{FF2B5EF4-FFF2-40B4-BE49-F238E27FC236}">
-                <a16:creationId xmlns:a16="http://schemas.microsoft.com/office/drawing/2014/main" id="{AE78E4DA-87B6-444E-8B28-3D20637E3824}"/>
-              </a:ext>
-            </a:extLst>
-          </p:cNvPr>
-          <p:cNvSpPr txBox="1"/>
-          <p:nvPr/>
-        </p:nvSpPr>
-        <p:spPr>
-          <a:xfrm>
-            <a:off x="6764593" y="2556324"/>
-            <a:ext cx="3516016" cy="1477328"/>
-          </a:xfrm>
-          <a:prstGeom prst="rect">
-            <a:avLst/>
-          </a:prstGeom>
-          <a:noFill/>
-        </p:spPr>
-        <p:txBody>
-          <a:bodyPr wrap="square" rtlCol="0">
-            <a:spAutoFit/>
-          </a:bodyPr>
-          <a:lstStyle/>
-          <a:p>
-            <a:r>
-              <a:rPr lang="en-US" dirty="0" err="1"/>
-              <a:t>Nafter</a:t>
-            </a:r>
-            <a:r>
-              <a:rPr lang="en-US" dirty="0"/>
-              <a:t> is using the </a:t>
-            </a:r>
-            <a:r>
-              <a:rPr lang="en-US" dirty="0" err="1"/>
-              <a:t>Binance</a:t>
-            </a:r>
-            <a:r>
-              <a:rPr lang="en-US" dirty="0"/>
-              <a:t> smart chain for their tokens. </a:t>
-            </a:r>
-            <a:r>
-              <a:rPr lang="en-US" dirty="0" err="1"/>
-              <a:t>Binance</a:t>
-            </a:r>
-            <a:r>
-              <a:rPr lang="en-US" dirty="0"/>
-              <a:t> has many centralized concerns and is in deep with controversial Tether. We just use regular Ethereum.</a:t>
-            </a:r>
-            <a:endParaRPr lang="en-CA" dirty="0"/>
-          </a:p>
-        </p:txBody>
-      </p:sp>
-      <p:sp>
-        <p:nvSpPr>
-          <p:cNvPr id="14" name="TextBox 13">
-            <a:extLst>
-              <a:ext uri="{FF2B5EF4-FFF2-40B4-BE49-F238E27FC236}">
-                <a16:creationId xmlns:a16="http://schemas.microsoft.com/office/drawing/2014/main" id="{E242F2EA-3E63-4B2A-B9DA-0E6BF3894027}"/>
-              </a:ext>
-            </a:extLst>
-          </p:cNvPr>
-          <p:cNvSpPr txBox="1"/>
-          <p:nvPr/>
-        </p:nvSpPr>
-        <p:spPr>
-          <a:xfrm>
-            <a:off x="1522033" y="5043949"/>
-            <a:ext cx="3516016" cy="369332"/>
-          </a:xfrm>
-          <a:prstGeom prst="rect">
-            <a:avLst/>
-          </a:prstGeom>
-          <a:noFill/>
-        </p:spPr>
-        <p:txBody>
-          <a:bodyPr wrap="square" rtlCol="0">
-            <a:spAutoFit/>
-          </a:bodyPr>
-          <a:lstStyle/>
-          <a:p>
-            <a:r>
-              <a:rPr lang="en-US" dirty="0"/>
-              <a:t>…</a:t>
-            </a:r>
-            <a:endParaRPr lang="en-CA" dirty="0"/>
-          </a:p>
-        </p:txBody>
-      </p:sp>
     </p:spTree>
     <p:extLst>
       <p:ext uri="{BB962C8B-B14F-4D97-AF65-F5344CB8AC3E}">
-        <p14:creationId xmlns:p14="http://schemas.microsoft.com/office/powerpoint/2010/main" val="1638852775"/>
+        <p14:creationId xmlns:p14="http://schemas.microsoft.com/office/powerpoint/2010/main" val="1145575828"/>
       </p:ext>
     </p:extLst>
   </p:cSld>

</xml_diff>

<commit_message>
update cover and opportunity pages
</commit_message>
<xml_diff>
--- a/own-me-pitch.pptx
+++ b/own-me-pitch.pptx
@@ -272,7 +272,7 @@
           <a:p>
             <a:fld id="{6F0444B0-A3CD-4285-B1AE-FEC941C62C7C}" type="datetimeFigureOut">
               <a:rPr lang="en-CA" smtClean="0"/>
-              <a:t>2021-10-03</a:t>
+              <a:t>2022-06-11</a:t>
             </a:fld>
             <a:endParaRPr lang="en-CA"/>
           </a:p>
@@ -472,7 +472,7 @@
           <a:p>
             <a:fld id="{6F0444B0-A3CD-4285-B1AE-FEC941C62C7C}" type="datetimeFigureOut">
               <a:rPr lang="en-CA" smtClean="0"/>
-              <a:t>2021-10-03</a:t>
+              <a:t>2022-06-11</a:t>
             </a:fld>
             <a:endParaRPr lang="en-CA"/>
           </a:p>
@@ -682,7 +682,7 @@
           <a:p>
             <a:fld id="{6F0444B0-A3CD-4285-B1AE-FEC941C62C7C}" type="datetimeFigureOut">
               <a:rPr lang="en-CA" smtClean="0"/>
-              <a:t>2021-10-03</a:t>
+              <a:t>2022-06-11</a:t>
             </a:fld>
             <a:endParaRPr lang="en-CA"/>
           </a:p>
@@ -882,7 +882,7 @@
           <a:p>
             <a:fld id="{6F0444B0-A3CD-4285-B1AE-FEC941C62C7C}" type="datetimeFigureOut">
               <a:rPr lang="en-CA" smtClean="0"/>
-              <a:t>2021-10-03</a:t>
+              <a:t>2022-06-11</a:t>
             </a:fld>
             <a:endParaRPr lang="en-CA"/>
           </a:p>
@@ -1158,7 +1158,7 @@
           <a:p>
             <a:fld id="{6F0444B0-A3CD-4285-B1AE-FEC941C62C7C}" type="datetimeFigureOut">
               <a:rPr lang="en-CA" smtClean="0"/>
-              <a:t>2021-10-03</a:t>
+              <a:t>2022-06-11</a:t>
             </a:fld>
             <a:endParaRPr lang="en-CA"/>
           </a:p>
@@ -1426,7 +1426,7 @@
           <a:p>
             <a:fld id="{6F0444B0-A3CD-4285-B1AE-FEC941C62C7C}" type="datetimeFigureOut">
               <a:rPr lang="en-CA" smtClean="0"/>
-              <a:t>2021-10-03</a:t>
+              <a:t>2022-06-11</a:t>
             </a:fld>
             <a:endParaRPr lang="en-CA"/>
           </a:p>
@@ -1841,7 +1841,7 @@
           <a:p>
             <a:fld id="{6F0444B0-A3CD-4285-B1AE-FEC941C62C7C}" type="datetimeFigureOut">
               <a:rPr lang="en-CA" smtClean="0"/>
-              <a:t>2021-10-03</a:t>
+              <a:t>2022-06-11</a:t>
             </a:fld>
             <a:endParaRPr lang="en-CA"/>
           </a:p>
@@ -1983,7 +1983,7 @@
           <a:p>
             <a:fld id="{6F0444B0-A3CD-4285-B1AE-FEC941C62C7C}" type="datetimeFigureOut">
               <a:rPr lang="en-CA" smtClean="0"/>
-              <a:t>2021-10-03</a:t>
+              <a:t>2022-06-11</a:t>
             </a:fld>
             <a:endParaRPr lang="en-CA"/>
           </a:p>
@@ -2096,7 +2096,7 @@
           <a:p>
             <a:fld id="{6F0444B0-A3CD-4285-B1AE-FEC941C62C7C}" type="datetimeFigureOut">
               <a:rPr lang="en-CA" smtClean="0"/>
-              <a:t>2021-10-03</a:t>
+              <a:t>2022-06-11</a:t>
             </a:fld>
             <a:endParaRPr lang="en-CA"/>
           </a:p>
@@ -2409,7 +2409,7 @@
           <a:p>
             <a:fld id="{6F0444B0-A3CD-4285-B1AE-FEC941C62C7C}" type="datetimeFigureOut">
               <a:rPr lang="en-CA" smtClean="0"/>
-              <a:t>2021-10-03</a:t>
+              <a:t>2022-06-11</a:t>
             </a:fld>
             <a:endParaRPr lang="en-CA"/>
           </a:p>
@@ -2698,7 +2698,7 @@
           <a:p>
             <a:fld id="{6F0444B0-A3CD-4285-B1AE-FEC941C62C7C}" type="datetimeFigureOut">
               <a:rPr lang="en-CA" smtClean="0"/>
-              <a:t>2021-10-03</a:t>
+              <a:t>2022-06-11</a:t>
             </a:fld>
             <a:endParaRPr lang="en-CA"/>
           </a:p>
@@ -2941,7 +2941,7 @@
           <a:p>
             <a:fld id="{6F0444B0-A3CD-4285-B1AE-FEC941C62C7C}" type="datetimeFigureOut">
               <a:rPr lang="en-CA" smtClean="0"/>
-              <a:t>2021-10-03</a:t>
+              <a:t>2022-06-11</a:t>
             </a:fld>
             <a:endParaRPr lang="en-CA"/>
           </a:p>
@@ -3523,9 +3523,9 @@
         <p:grpSpPr>
           <a:xfrm>
             <a:off x="5068561" y="2259542"/>
-            <a:ext cx="6469380" cy="2987308"/>
+            <a:ext cx="6469380" cy="3331218"/>
             <a:chOff x="5466126" y="2279420"/>
-            <a:chExt cx="6469380" cy="2987308"/>
+            <a:chExt cx="6469380" cy="3331218"/>
           </a:xfrm>
         </p:grpSpPr>
         <p:sp>
@@ -3678,8 +3678,8 @@
           </p:nvSpPr>
           <p:spPr>
             <a:xfrm>
-              <a:off x="5909001" y="4702786"/>
-              <a:ext cx="3486519" cy="377559"/>
+              <a:off x="5843486" y="4687308"/>
+              <a:ext cx="4715406" cy="923330"/>
             </a:xfrm>
             <a:prstGeom prst="rect">
               <a:avLst/>
@@ -3692,42 +3692,65 @@
             </a:bodyPr>
             <a:lstStyle/>
             <a:p>
+              <a:pPr algn="l"/>
               <a:r>
-                <a:rPr lang="en-US" dirty="0">
+                <a:rPr lang="en-US" b="0" i="0" dirty="0">
+                  <a:solidFill>
+                    <a:srgbClr val="2A2825"/>
+                  </a:solidFill>
+                  <a:effectLst/>
                   <a:latin typeface="Shadows Into Light" panose="02000000000000000000" pitchFamily="2" charset="0"/>
                 </a:rPr>
-                <a:t>Promiscuous </a:t>
+                <a:t>Our home for </a:t>
               </a:r>
               <a:r>
-                <a:rPr lang="en-US" dirty="0">
+                <a:rPr lang="en-US" b="0" i="0" dirty="0">
                   <a:solidFill>
                     <a:srgbClr val="FB74FE"/>
                   </a:solidFill>
+                  <a:effectLst/>
                   <a:latin typeface="Shadows Into Light" panose="02000000000000000000" pitchFamily="2" charset="0"/>
                 </a:rPr>
-                <a:t>*</a:t>
+                <a:t>adult content </a:t>
               </a:r>
               <a:r>
-                <a:rPr lang="en-US" dirty="0">
+                <a:rPr lang="en-US" b="0" i="0" dirty="0">
+                  <a:solidFill>
+                    <a:srgbClr val="2A2825"/>
+                  </a:solidFill>
+                  <a:effectLst/>
                   <a:latin typeface="Shadows Into Light" panose="02000000000000000000" pitchFamily="2" charset="0"/>
                 </a:rPr>
-                <a:t> Dangerous </a:t>
+                <a:t>in the </a:t>
               </a:r>
               <a:r>
-                <a:rPr lang="en-US" dirty="0">
+                <a:rPr lang="en-US" b="0" i="0" dirty="0">
                   <a:solidFill>
-                    <a:srgbClr val="FB74FE"/>
+                    <a:srgbClr val="4B48FD"/>
                   </a:solidFill>
+                  <a:effectLst/>
                   <a:latin typeface="Shadows Into Light" panose="02000000000000000000" pitchFamily="2" charset="0"/>
                 </a:rPr>
-                <a:t>*</a:t>
+                <a:t>web3 metaverse</a:t>
               </a:r>
-              <a:r>
-                <a:rPr lang="en-US" dirty="0">
-                  <a:latin typeface="Shadows Into Light" panose="02000000000000000000" pitchFamily="2" charset="0"/>
+              <a:endParaRPr lang="en-US" b="0" i="0" dirty="0">
+                <a:solidFill>
+                  <a:srgbClr val="2A2825"/>
+                </a:solidFill>
+                <a:effectLst/>
+                <a:latin typeface="Shadows Into Light" panose="02000000000000000000" pitchFamily="2" charset="0"/>
+              </a:endParaRPr>
+            </a:p>
+            <a:p>
+              <a:br>
+                <a:rPr lang="en-US" b="0" i="0" dirty="0">
+                  <a:solidFill>
+                    <a:srgbClr val="2A2825"/>
+                  </a:solidFill>
+                  <a:effectLst/>
+                  <a:latin typeface="Times New Roman" panose="02020603050405020304" pitchFamily="18" charset="0"/>
                 </a:rPr>
-                <a:t> Lucrative</a:t>
-              </a:r>
+              </a:br>
               <a:endParaRPr lang="en-CA" dirty="0">
                 <a:latin typeface="Shadows Into Light" panose="02000000000000000000" pitchFamily="2" charset="0"/>
               </a:endParaRPr>
@@ -4498,13 +4521,13 @@
         </p:nvSpPr>
         <p:spPr>
           <a:xfrm>
-            <a:off x="928284" y="1586415"/>
-            <a:ext cx="9761347" cy="1923702"/>
+            <a:off x="928284" y="1586414"/>
+            <a:ext cx="10796490" cy="3899985"/>
           </a:xfrm>
         </p:spPr>
         <p:txBody>
           <a:bodyPr>
-            <a:normAutofit fontScale="62500" lnSpcReduction="20000"/>
+            <a:normAutofit lnSpcReduction="10000"/>
           </a:bodyPr>
           <a:lstStyle/>
           <a:p>
@@ -4515,12 +4538,110 @@
               <a:buNone/>
             </a:pPr>
             <a:r>
-              <a:rPr lang="en-US" dirty="0">
+              <a:rPr lang="en-US" sz="1800" dirty="0">
                 <a:latin typeface="Poppins Light" panose="00000400000000000000" pitchFamily="2" charset="0"/>
                 <a:cs typeface="Poppins Light" panose="00000400000000000000" pitchFamily="2" charset="0"/>
               </a:rPr>
-              <a:t>Traditional payment processors are denying adult content creators.</a:t>
-            </a:r>
+              <a:t>Traditional web2 payment processors are denying adult content creators.</a:t>
+            </a:r>
+            <a:br>
+              <a:rPr lang="en-US" sz="1800" dirty="0">
+                <a:latin typeface="Poppins Light" panose="00000400000000000000" pitchFamily="2" charset="0"/>
+                <a:cs typeface="Poppins Light" panose="00000400000000000000" pitchFamily="2" charset="0"/>
+              </a:rPr>
+            </a:br>
+            <a:br>
+              <a:rPr lang="en-US" sz="1800" dirty="0">
+                <a:latin typeface="Poppins Light" panose="00000400000000000000" pitchFamily="2" charset="0"/>
+                <a:cs typeface="Poppins Light" panose="00000400000000000000" pitchFamily="2" charset="0"/>
+              </a:rPr>
+            </a:br>
+            <a:r>
+              <a:rPr lang="en-US" sz="1800" dirty="0">
+                <a:latin typeface="Poppins Light" panose="00000400000000000000" pitchFamily="2" charset="0"/>
+                <a:cs typeface="Poppins Light" panose="00000400000000000000" pitchFamily="2" charset="0"/>
+              </a:rPr>
+              <a:t>People love porn and adult content. Demand is biological.</a:t>
+            </a:r>
+            <a:br>
+              <a:rPr lang="en-US" sz="1800" dirty="0">
+                <a:latin typeface="Poppins Light" panose="00000400000000000000" pitchFamily="2" charset="0"/>
+                <a:cs typeface="Poppins Light" panose="00000400000000000000" pitchFamily="2" charset="0"/>
+              </a:rPr>
+            </a:br>
+            <a:br>
+              <a:rPr lang="en-US" sz="1800" dirty="0">
+                <a:latin typeface="Poppins Light" panose="00000400000000000000" pitchFamily="2" charset="0"/>
+                <a:cs typeface="Poppins Light" panose="00000400000000000000" pitchFamily="2" charset="0"/>
+              </a:rPr>
+            </a:br>
+            <a:r>
+              <a:rPr lang="en-US" sz="1800" dirty="0">
+                <a:latin typeface="Poppins Light" panose="00000400000000000000" pitchFamily="2" charset="0"/>
+                <a:cs typeface="Poppins Light" panose="00000400000000000000" pitchFamily="2" charset="0"/>
+              </a:rPr>
+              <a:t>Current companies charge users high fees. (5-20%).</a:t>
+            </a:r>
+            <a:br>
+              <a:rPr lang="en-US" sz="1800" dirty="0">
+                <a:latin typeface="Poppins Light" panose="00000400000000000000" pitchFamily="2" charset="0"/>
+                <a:cs typeface="Poppins Light" panose="00000400000000000000" pitchFamily="2" charset="0"/>
+              </a:rPr>
+            </a:br>
+            <a:br>
+              <a:rPr lang="en-US" sz="1800" dirty="0">
+                <a:latin typeface="Poppins Light" panose="00000400000000000000" pitchFamily="2" charset="0"/>
+                <a:cs typeface="Poppins Light" panose="00000400000000000000" pitchFamily="2" charset="0"/>
+              </a:rPr>
+            </a:br>
+            <a:r>
+              <a:rPr lang="en-US" sz="1800" dirty="0">
+                <a:latin typeface="Poppins Light" panose="00000400000000000000" pitchFamily="2" charset="0"/>
+                <a:cs typeface="Poppins Light" panose="00000400000000000000" pitchFamily="2" charset="0"/>
+              </a:rPr>
+              <a:t>Old Google ad revenue style business models need to die in porn industry.</a:t>
+            </a:r>
+            <a:br>
+              <a:rPr lang="en-US" sz="1800" dirty="0">
+                <a:latin typeface="Poppins Light" panose="00000400000000000000" pitchFamily="2" charset="0"/>
+                <a:cs typeface="Poppins Light" panose="00000400000000000000" pitchFamily="2" charset="0"/>
+              </a:rPr>
+            </a:br>
+            <a:br>
+              <a:rPr lang="en-US" sz="1800" dirty="0">
+                <a:latin typeface="Poppins Light" panose="00000400000000000000" pitchFamily="2" charset="0"/>
+                <a:cs typeface="Poppins Light" panose="00000400000000000000" pitchFamily="2" charset="0"/>
+              </a:rPr>
+            </a:br>
+            <a:r>
+              <a:rPr lang="en-US" sz="1800" dirty="0">
+                <a:latin typeface="Poppins Light" panose="00000400000000000000" pitchFamily="2" charset="0"/>
+                <a:cs typeface="Poppins Light" panose="00000400000000000000" pitchFamily="2" charset="0"/>
+              </a:rPr>
+              <a:t>Web3 is here. Adult content in the blockchain is an obvious progression.</a:t>
+            </a:r>
+            <a:br>
+              <a:rPr lang="en-US" sz="1800" dirty="0">
+                <a:latin typeface="Poppins Light" panose="00000400000000000000" pitchFamily="2" charset="0"/>
+                <a:cs typeface="Poppins Light" panose="00000400000000000000" pitchFamily="2" charset="0"/>
+              </a:rPr>
+            </a:br>
+            <a:br>
+              <a:rPr lang="en-US" sz="1800" dirty="0">
+                <a:latin typeface="Poppins Light" panose="00000400000000000000" pitchFamily="2" charset="0"/>
+                <a:cs typeface="Poppins Light" panose="00000400000000000000" pitchFamily="2" charset="0"/>
+              </a:rPr>
+            </a:br>
+            <a:br>
+              <a:rPr lang="en-US" sz="1800" dirty="0">
+                <a:latin typeface="Poppins Light" panose="00000400000000000000" pitchFamily="2" charset="0"/>
+                <a:cs typeface="Poppins Light" panose="00000400000000000000" pitchFamily="2" charset="0"/>
+              </a:rPr>
+            </a:br>
+            <a:endParaRPr lang="en-US" sz="1800" dirty="0">
+              <a:latin typeface="Poppins Light" panose="00000400000000000000" pitchFamily="2" charset="0"/>
+              <a:cs typeface="Poppins Light" panose="00000400000000000000" pitchFamily="2" charset="0"/>
+            </a:endParaRPr>
           </a:p>
           <a:p>
             <a:pPr marL="0" indent="0">
@@ -4529,13 +4650,10 @@
               </a:lnSpc>
               <a:buNone/>
             </a:pPr>
-            <a:r>
-              <a:rPr lang="en-US" dirty="0">
-                <a:latin typeface="Poppins Light" panose="00000400000000000000" pitchFamily="2" charset="0"/>
-                <a:cs typeface="Poppins Light" panose="00000400000000000000" pitchFamily="2" charset="0"/>
-              </a:rPr>
-              <a:t>Demand has not disappeared. Creators and consumers are looking for alternatives.</a:t>
-            </a:r>
+            <a:endParaRPr lang="en-US" dirty="0">
+              <a:latin typeface="Poppins Light" panose="00000400000000000000" pitchFamily="2" charset="0"/>
+              <a:cs typeface="Poppins Light" panose="00000400000000000000" pitchFamily="2" charset="0"/>
+            </a:endParaRPr>
           </a:p>
           <a:p>
             <a:pPr marL="0" indent="0">
@@ -4544,28 +4662,10 @@
               </a:lnSpc>
               <a:buNone/>
             </a:pPr>
-            <a:r>
-              <a:rPr lang="en-US" dirty="0">
-                <a:latin typeface="Poppins Light" panose="00000400000000000000" pitchFamily="2" charset="0"/>
-                <a:cs typeface="Poppins Light" panose="00000400000000000000" pitchFamily="2" charset="0"/>
-              </a:rPr>
-              <a:t>NFTs and Crypto are continuing to explode and grow market capital.</a:t>
-            </a:r>
-          </a:p>
-          <a:p>
-            <a:pPr marL="0" indent="0">
-              <a:lnSpc>
-                <a:spcPct val="120000"/>
-              </a:lnSpc>
-              <a:buNone/>
-            </a:pPr>
-            <a:r>
-              <a:rPr lang="en-CA" dirty="0">
-                <a:latin typeface="Poppins Light" panose="00000400000000000000" pitchFamily="2" charset="0"/>
-                <a:cs typeface="Poppins Light" panose="00000400000000000000" pitchFamily="2" charset="0"/>
-              </a:rPr>
-              <a:t>Adult content is always in demand. Covid-19 has changed the game.</a:t>
-            </a:r>
+            <a:endParaRPr lang="en-US" dirty="0">
+              <a:latin typeface="Poppins Light" panose="00000400000000000000" pitchFamily="2" charset="0"/>
+              <a:cs typeface="Poppins Light" panose="00000400000000000000" pitchFamily="2" charset="0"/>
+            </a:endParaRPr>
           </a:p>
         </p:txBody>
       </p:sp>
@@ -4597,7 +4697,7 @@
         </p:blipFill>
         <p:spPr>
           <a:xfrm>
-            <a:off x="678663" y="3637605"/>
+            <a:off x="928284" y="4798482"/>
             <a:ext cx="3222480" cy="1327795"/>
           </a:xfrm>
           <a:prstGeom prst="rect">
@@ -4633,8 +4733,8 @@
         </p:blipFill>
         <p:spPr>
           <a:xfrm>
-            <a:off x="667118" y="5069556"/>
-            <a:ext cx="3751853" cy="1200723"/>
+            <a:off x="8041238" y="4858463"/>
+            <a:ext cx="3632105" cy="1162400"/>
           </a:xfrm>
           <a:prstGeom prst="rect">
             <a:avLst/>
@@ -4669,7 +4769,7 @@
         </p:blipFill>
         <p:spPr>
           <a:xfrm>
-            <a:off x="11291364" y="317930"/>
+            <a:off x="11161379" y="618720"/>
             <a:ext cx="563395" cy="563395"/>
           </a:xfrm>
           <a:prstGeom prst="rect">
@@ -4679,10 +4779,10 @@
       </p:pic>
       <p:pic>
         <p:nvPicPr>
-          <p:cNvPr id="5" name="Picture 4">
-            <a:extLst>
-              <a:ext uri="{FF2B5EF4-FFF2-40B4-BE49-F238E27FC236}">
-                <a16:creationId xmlns:a16="http://schemas.microsoft.com/office/drawing/2014/main" id="{70D0B9DD-CB9F-4676-AC9E-4B5394B3C48B}"/>
+          <p:cNvPr id="9" name="Picture 8">
+            <a:extLst>
+              <a:ext uri="{FF2B5EF4-FFF2-40B4-BE49-F238E27FC236}">
+                <a16:creationId xmlns:a16="http://schemas.microsoft.com/office/drawing/2014/main" id="{7C95C04D-F67B-4645-8865-48941DB2B323}"/>
               </a:ext>
             </a:extLst>
           </p:cNvPr>
@@ -4705,116 +4805,8 @@
         </p:blipFill>
         <p:spPr>
           <a:xfrm>
-            <a:off x="4013109" y="3701141"/>
-            <a:ext cx="3618507" cy="1200724"/>
-          </a:xfrm>
-          <a:prstGeom prst="rect">
-            <a:avLst/>
-          </a:prstGeom>
-        </p:spPr>
-      </p:pic>
-      <p:pic>
-        <p:nvPicPr>
-          <p:cNvPr id="9" name="Picture 8">
-            <a:extLst>
-              <a:ext uri="{FF2B5EF4-FFF2-40B4-BE49-F238E27FC236}">
-                <a16:creationId xmlns:a16="http://schemas.microsoft.com/office/drawing/2014/main" id="{7C95C04D-F67B-4645-8865-48941DB2B323}"/>
-              </a:ext>
-            </a:extLst>
-          </p:cNvPr>
-          <p:cNvPicPr>
-            <a:picLocks noChangeAspect="1"/>
-          </p:cNvPicPr>
-          <p:nvPr/>
-        </p:nvPicPr>
-        <p:blipFill>
-          <a:blip r:embed="rId6">
-            <a:extLst>
-              <a:ext uri="{28A0092B-C50C-407E-A947-70E740481C1C}">
-                <a14:useLocalDpi xmlns:a14="http://schemas.microsoft.com/office/drawing/2010/main" val="0"/>
-              </a:ext>
-            </a:extLst>
-          </a:blip>
-          <a:stretch>
-            <a:fillRect/>
-          </a:stretch>
-        </p:blipFill>
-        <p:spPr>
-          <a:xfrm>
-            <a:off x="4552819" y="5007135"/>
-            <a:ext cx="4735344" cy="1325563"/>
-          </a:xfrm>
-          <a:prstGeom prst="rect">
-            <a:avLst/>
-          </a:prstGeom>
-        </p:spPr>
-      </p:pic>
-      <p:pic>
-        <p:nvPicPr>
-          <p:cNvPr id="13" name="Picture 12">
-            <a:extLst>
-              <a:ext uri="{FF2B5EF4-FFF2-40B4-BE49-F238E27FC236}">
-                <a16:creationId xmlns:a16="http://schemas.microsoft.com/office/drawing/2014/main" id="{6E2431DE-B3A9-4479-943C-118DE352D0AC}"/>
-              </a:ext>
-            </a:extLst>
-          </p:cNvPr>
-          <p:cNvPicPr>
-            <a:picLocks noChangeAspect="1"/>
-          </p:cNvPicPr>
-          <p:nvPr/>
-        </p:nvPicPr>
-        <p:blipFill>
-          <a:blip r:embed="rId7">
-            <a:extLst>
-              <a:ext uri="{28A0092B-C50C-407E-A947-70E740481C1C}">
-                <a14:useLocalDpi xmlns:a14="http://schemas.microsoft.com/office/drawing/2010/main" val="0"/>
-              </a:ext>
-            </a:extLst>
-          </a:blip>
-          <a:stretch>
-            <a:fillRect/>
-          </a:stretch>
-        </p:blipFill>
-        <p:spPr>
-          <a:xfrm>
-            <a:off x="9150059" y="5294918"/>
-            <a:ext cx="2559398" cy="779970"/>
-          </a:xfrm>
-          <a:prstGeom prst="rect">
-            <a:avLst/>
-          </a:prstGeom>
-        </p:spPr>
-      </p:pic>
-      <p:pic>
-        <p:nvPicPr>
-          <p:cNvPr id="16" name="Picture 15">
-            <a:extLst>
-              <a:ext uri="{FF2B5EF4-FFF2-40B4-BE49-F238E27FC236}">
-                <a16:creationId xmlns:a16="http://schemas.microsoft.com/office/drawing/2014/main" id="{4FD47F44-DEC4-4710-AF5D-924D52571079}"/>
-              </a:ext>
-            </a:extLst>
-          </p:cNvPr>
-          <p:cNvPicPr>
-            <a:picLocks noChangeAspect="1"/>
-          </p:cNvPicPr>
-          <p:nvPr/>
-        </p:nvPicPr>
-        <p:blipFill>
-          <a:blip r:embed="rId8">
-            <a:extLst>
-              <a:ext uri="{28A0092B-C50C-407E-A947-70E740481C1C}">
-                <a14:useLocalDpi xmlns:a14="http://schemas.microsoft.com/office/drawing/2010/main" val="0"/>
-              </a:ext>
-            </a:extLst>
-          </a:blip>
-          <a:stretch>
-            <a:fillRect/>
-          </a:stretch>
-        </p:blipFill>
-        <p:spPr>
-          <a:xfrm>
-            <a:off x="7743582" y="3510117"/>
-            <a:ext cx="3684086" cy="1520352"/>
+            <a:off x="4082574" y="4798482"/>
+            <a:ext cx="4152473" cy="1162400"/>
           </a:xfrm>
           <a:prstGeom prst="rect">
             <a:avLst/>
@@ -4897,7 +4889,7 @@
         <p:spPr>
           <a:xfrm>
             <a:off x="838200" y="4362209"/>
-            <a:ext cx="2689614" cy="1508105"/>
+            <a:ext cx="2644942" cy="1508105"/>
           </a:xfrm>
           <a:prstGeom prst="rect">
             <a:avLst/>
@@ -4922,7 +4914,7 @@
                 <a:latin typeface="Poppins Light" panose="00000400000000000000" pitchFamily="2" charset="0"/>
                 <a:cs typeface="Poppins Light" panose="00000400000000000000" pitchFamily="2" charset="0"/>
               </a:rPr>
-              <a:t>Use the Ethereum blockchain instead of traditional banking solutions. Create the $NUDE token.</a:t>
+              <a:t>Use the Ethereum blockchain instead of traditional banking solutions. Launch the $NUDE token.</a:t>
             </a:r>
             <a:endParaRPr lang="en-CA" sz="2000" dirty="0">
               <a:latin typeface="Poppins Light" panose="00000400000000000000" pitchFamily="2" charset="0"/>
@@ -4946,7 +4938,7 @@
         <p:spPr>
           <a:xfrm>
             <a:off x="4487532" y="4362210"/>
-            <a:ext cx="2775372" cy="1231106"/>
+            <a:ext cx="2996110" cy="1508105"/>
           </a:xfrm>
           <a:prstGeom prst="rect">
             <a:avLst/>
@@ -4971,7 +4963,7 @@
                 <a:latin typeface="Poppins Light" panose="00000400000000000000" pitchFamily="2" charset="0"/>
                 <a:cs typeface="Poppins Light" panose="00000400000000000000" pitchFamily="2" charset="0"/>
               </a:rPr>
-              <a:t>Use decentralized blockchain NFT technology to store adult creators content.</a:t>
+              <a:t>Use decentralized NFT technology to store adult creators content. Give ownership back to creators.</a:t>
             </a:r>
             <a:endParaRPr lang="en-CA" dirty="0">
               <a:latin typeface="Poppins Light" panose="00000400000000000000" pitchFamily="2" charset="0"/>
@@ -4995,7 +4987,7 @@
         <p:spPr>
           <a:xfrm>
             <a:off x="8416994" y="4362209"/>
-            <a:ext cx="3171157" cy="1508105"/>
+            <a:ext cx="3171157" cy="1231106"/>
           </a:xfrm>
           <a:prstGeom prst="rect">
             <a:avLst/>
@@ -5020,7 +5012,7 @@
                 <a:latin typeface="Poppins Light" panose="00000400000000000000" pitchFamily="2" charset="0"/>
                 <a:cs typeface="Poppins Light" panose="00000400000000000000" pitchFamily="2" charset="0"/>
               </a:rPr>
-              <a:t>Create a trendy designed social app experience tailored specifically for the adult content industry.</a:t>
+              <a:t>Create a trendy social d-app experience tailored specifically for the adult content industry.</a:t>
             </a:r>
             <a:endParaRPr lang="en-CA" sz="2000" dirty="0">
               <a:latin typeface="Poppins Light" panose="00000400000000000000" pitchFamily="2" charset="0"/>
@@ -6562,7 +6554,9 @@
         </p:nvSpPr>
         <p:spPr/>
         <p:txBody>
-          <a:bodyPr/>
+          <a:bodyPr>
+            <a:normAutofit lnSpcReduction="10000"/>
+          </a:bodyPr>
           <a:lstStyle/>
           <a:p>
             <a:r>
@@ -6612,7 +6606,12 @@
               <a:rPr lang="en-US" dirty="0"/>
               <a:t>Twitch streaming</a:t>
             </a:r>
-            <a:endParaRPr lang="en-CA" dirty="0"/>
+          </a:p>
+          <a:p>
+            <a:r>
+              <a:rPr lang="en-CA" dirty="0"/>
+              <a:t>$NUDE, NUDE_NFT, NUDE_DEX, NUDE_DAO</a:t>
+            </a:r>
           </a:p>
         </p:txBody>
       </p:sp>

</xml_diff>

<commit_message>
add Wei, christopher bio
</commit_message>
<xml_diff>
--- a/own-me-pitch.pptx
+++ b/own-me-pitch.pptx
@@ -6645,98 +6645,6 @@
           <a:chExt cx="0" cy="0"/>
         </a:xfrm>
       </p:grpSpPr>
-      <p:cxnSp>
-        <p:nvCxnSpPr>
-          <p:cNvPr id="27" name="Straight Connector 26">
-            <a:extLst>
-              <a:ext uri="{FF2B5EF4-FFF2-40B4-BE49-F238E27FC236}">
-                <a16:creationId xmlns:a16="http://schemas.microsoft.com/office/drawing/2014/main" id="{5E824EAC-ADEC-43E9-BD94-ADFF2DFD5F85}"/>
-              </a:ext>
-            </a:extLst>
-          </p:cNvPr>
-          <p:cNvCxnSpPr>
-            <a:cxnSpLocks/>
-          </p:cNvCxnSpPr>
-          <p:nvPr/>
-        </p:nvCxnSpPr>
-        <p:spPr>
-          <a:xfrm flipV="1">
-            <a:off x="973029" y="2799795"/>
-            <a:ext cx="2601615" cy="24582"/>
-          </a:xfrm>
-          <a:prstGeom prst="line">
-            <a:avLst/>
-          </a:prstGeom>
-          <a:ln>
-            <a:solidFill>
-              <a:schemeClr val="accent3">
-                <a:lumMod val="60000"/>
-                <a:lumOff val="40000"/>
-              </a:schemeClr>
-            </a:solidFill>
-          </a:ln>
-        </p:spPr>
-        <p:style>
-          <a:lnRef idx="1">
-            <a:schemeClr val="accent1"/>
-          </a:lnRef>
-          <a:fillRef idx="0">
-            <a:schemeClr val="accent1"/>
-          </a:fillRef>
-          <a:effectRef idx="0">
-            <a:schemeClr val="accent1"/>
-          </a:effectRef>
-          <a:fontRef idx="minor">
-            <a:schemeClr val="tx1"/>
-          </a:fontRef>
-        </p:style>
-      </p:cxnSp>
-      <p:cxnSp>
-        <p:nvCxnSpPr>
-          <p:cNvPr id="16" name="Straight Connector 15">
-            <a:extLst>
-              <a:ext uri="{FF2B5EF4-FFF2-40B4-BE49-F238E27FC236}">
-                <a16:creationId xmlns:a16="http://schemas.microsoft.com/office/drawing/2014/main" id="{2E784507-2A90-41F4-914A-2E0D3C25F17F}"/>
-              </a:ext>
-            </a:extLst>
-          </p:cNvPr>
-          <p:cNvCxnSpPr>
-            <a:cxnSpLocks/>
-          </p:cNvCxnSpPr>
-          <p:nvPr/>
-        </p:nvCxnSpPr>
-        <p:spPr>
-          <a:xfrm flipV="1">
-            <a:off x="973031" y="3357677"/>
-            <a:ext cx="2601615" cy="24582"/>
-          </a:xfrm>
-          <a:prstGeom prst="line">
-            <a:avLst/>
-          </a:prstGeom>
-          <a:ln>
-            <a:solidFill>
-              <a:schemeClr val="accent3">
-                <a:lumMod val="60000"/>
-                <a:lumOff val="40000"/>
-              </a:schemeClr>
-            </a:solidFill>
-          </a:ln>
-        </p:spPr>
-        <p:style>
-          <a:lnRef idx="1">
-            <a:schemeClr val="accent1"/>
-          </a:lnRef>
-          <a:fillRef idx="0">
-            <a:schemeClr val="accent1"/>
-          </a:fillRef>
-          <a:effectRef idx="0">
-            <a:schemeClr val="accent1"/>
-          </a:effectRef>
-          <a:fontRef idx="minor">
-            <a:schemeClr val="tx1"/>
-          </a:fontRef>
-        </p:style>
-      </p:cxnSp>
       <p:sp>
         <p:nvSpPr>
           <p:cNvPr id="2" name="Title 1">
@@ -6768,185 +6676,262 @@
           </a:p>
         </p:txBody>
       </p:sp>
-      <p:pic>
-        <p:nvPicPr>
-          <p:cNvPr id="5" name="Content Placeholder 4">
-            <a:extLst>
-              <a:ext uri="{FF2B5EF4-FFF2-40B4-BE49-F238E27FC236}">
-                <a16:creationId xmlns:a16="http://schemas.microsoft.com/office/drawing/2014/main" id="{E8B79BEB-C0A3-4987-83FF-C0BD91A1E4E2}"/>
-              </a:ext>
-            </a:extLst>
-          </p:cNvPr>
-          <p:cNvPicPr>
-            <a:picLocks noGrp="1" noChangeAspect="1"/>
-          </p:cNvPicPr>
-          <p:nvPr>
-            <p:ph idx="1"/>
-          </p:nvPr>
-        </p:nvPicPr>
-        <p:blipFill>
-          <a:blip r:embed="rId2">
-            <a:extLst>
-              <a:ext uri="{28A0092B-C50C-407E-A947-70E740481C1C}">
-                <a14:useLocalDpi xmlns:a14="http://schemas.microsoft.com/office/drawing/2010/main" val="0"/>
-              </a:ext>
-            </a:extLst>
-          </a:blip>
-          <a:stretch>
-            <a:fillRect/>
-          </a:stretch>
-        </p:blipFill>
+      <p:grpSp>
+        <p:nvGrpSpPr>
+          <p:cNvPr id="13" name="Group 12">
+            <a:extLst>
+              <a:ext uri="{FF2B5EF4-FFF2-40B4-BE49-F238E27FC236}">
+                <a16:creationId xmlns:a16="http://schemas.microsoft.com/office/drawing/2014/main" id="{FFE68998-39FA-DADE-A6FA-5844F4059C93}"/>
+              </a:ext>
+            </a:extLst>
+          </p:cNvPr>
+          <p:cNvGrpSpPr/>
+          <p:nvPr/>
+        </p:nvGrpSpPr>
+        <p:grpSpPr>
+          <a:xfrm>
+            <a:off x="1325547" y="2091267"/>
+            <a:ext cx="2126225" cy="1370201"/>
+            <a:chOff x="725259" y="2091267"/>
+            <a:chExt cx="3126658" cy="2006993"/>
+          </a:xfrm>
+        </p:grpSpPr>
+        <p:cxnSp>
+          <p:nvCxnSpPr>
+            <p:cNvPr id="27" name="Straight Connector 26">
+              <a:extLst>
+                <a:ext uri="{FF2B5EF4-FFF2-40B4-BE49-F238E27FC236}">
+                  <a16:creationId xmlns:a16="http://schemas.microsoft.com/office/drawing/2014/main" id="{5E824EAC-ADEC-43E9-BD94-ADFF2DFD5F85}"/>
+                </a:ext>
+              </a:extLst>
+            </p:cNvPr>
+            <p:cNvCxnSpPr>
+              <a:cxnSpLocks/>
+            </p:cNvCxnSpPr>
+            <p:nvPr/>
+          </p:nvCxnSpPr>
+          <p:spPr>
+            <a:xfrm flipV="1">
+              <a:off x="973029" y="2799795"/>
+              <a:ext cx="2601615" cy="24582"/>
+            </a:xfrm>
+            <a:prstGeom prst="line">
+              <a:avLst/>
+            </a:prstGeom>
+            <a:ln>
+              <a:solidFill>
+                <a:schemeClr val="accent3">
+                  <a:lumMod val="60000"/>
+                  <a:lumOff val="40000"/>
+                </a:schemeClr>
+              </a:solidFill>
+            </a:ln>
+          </p:spPr>
+          <p:style>
+            <a:lnRef idx="1">
+              <a:schemeClr val="accent1"/>
+            </a:lnRef>
+            <a:fillRef idx="0">
+              <a:schemeClr val="accent1"/>
+            </a:fillRef>
+            <a:effectRef idx="0">
+              <a:schemeClr val="accent1"/>
+            </a:effectRef>
+            <a:fontRef idx="minor">
+              <a:schemeClr val="tx1"/>
+            </a:fontRef>
+          </p:style>
+        </p:cxnSp>
+        <p:cxnSp>
+          <p:nvCxnSpPr>
+            <p:cNvPr id="16" name="Straight Connector 15">
+              <a:extLst>
+                <a:ext uri="{FF2B5EF4-FFF2-40B4-BE49-F238E27FC236}">
+                  <a16:creationId xmlns:a16="http://schemas.microsoft.com/office/drawing/2014/main" id="{2E784507-2A90-41F4-914A-2E0D3C25F17F}"/>
+                </a:ext>
+              </a:extLst>
+            </p:cNvPr>
+            <p:cNvCxnSpPr>
+              <a:cxnSpLocks/>
+            </p:cNvCxnSpPr>
+            <p:nvPr/>
+          </p:nvCxnSpPr>
+          <p:spPr>
+            <a:xfrm flipV="1">
+              <a:off x="973031" y="3357677"/>
+              <a:ext cx="2601615" cy="24582"/>
+            </a:xfrm>
+            <a:prstGeom prst="line">
+              <a:avLst/>
+            </a:prstGeom>
+            <a:ln>
+              <a:solidFill>
+                <a:schemeClr val="accent3">
+                  <a:lumMod val="60000"/>
+                  <a:lumOff val="40000"/>
+                </a:schemeClr>
+              </a:solidFill>
+            </a:ln>
+          </p:spPr>
+          <p:style>
+            <a:lnRef idx="1">
+              <a:schemeClr val="accent1"/>
+            </a:lnRef>
+            <a:fillRef idx="0">
+              <a:schemeClr val="accent1"/>
+            </a:fillRef>
+            <a:effectRef idx="0">
+              <a:schemeClr val="accent1"/>
+            </a:effectRef>
+            <a:fontRef idx="minor">
+              <a:schemeClr val="tx1"/>
+            </a:fontRef>
+          </p:style>
+        </p:cxnSp>
+        <p:cxnSp>
+          <p:nvCxnSpPr>
+            <p:cNvPr id="14" name="Straight Connector 13">
+              <a:extLst>
+                <a:ext uri="{FF2B5EF4-FFF2-40B4-BE49-F238E27FC236}">
+                  <a16:creationId xmlns:a16="http://schemas.microsoft.com/office/drawing/2014/main" id="{CF0A6EC9-05A2-41D5-A4D9-F813EF56724A}"/>
+                </a:ext>
+              </a:extLst>
+            </p:cNvPr>
+            <p:cNvCxnSpPr>
+              <a:cxnSpLocks/>
+            </p:cNvCxnSpPr>
+            <p:nvPr/>
+          </p:nvCxnSpPr>
+          <p:spPr>
+            <a:xfrm>
+              <a:off x="725259" y="3094763"/>
+              <a:ext cx="3126658" cy="0"/>
+            </a:xfrm>
+            <a:prstGeom prst="line">
+              <a:avLst/>
+            </a:prstGeom>
+            <a:ln>
+              <a:solidFill>
+                <a:srgbClr val="FFC000"/>
+              </a:solidFill>
+            </a:ln>
+          </p:spPr>
+          <p:style>
+            <a:lnRef idx="2">
+              <a:schemeClr val="accent3"/>
+            </a:lnRef>
+            <a:fillRef idx="0">
+              <a:schemeClr val="accent3"/>
+            </a:fillRef>
+            <a:effectRef idx="1">
+              <a:schemeClr val="accent3"/>
+            </a:effectRef>
+            <a:fontRef idx="minor">
+              <a:schemeClr val="tx1"/>
+            </a:fontRef>
+          </p:style>
+        </p:cxnSp>
+        <p:sp>
+          <p:nvSpPr>
+            <p:cNvPr id="15" name="Oval 14">
+              <a:extLst>
+                <a:ext uri="{FF2B5EF4-FFF2-40B4-BE49-F238E27FC236}">
+                  <a16:creationId xmlns:a16="http://schemas.microsoft.com/office/drawing/2014/main" id="{4153D177-BF84-432C-99CC-F8159E5284AA}"/>
+                </a:ext>
+              </a:extLst>
+            </p:cNvPr>
+            <p:cNvSpPr/>
+            <p:nvPr/>
+          </p:nvSpPr>
+          <p:spPr>
+            <a:xfrm>
+              <a:off x="1188358" y="2091267"/>
+              <a:ext cx="2170962" cy="2006993"/>
+            </a:xfrm>
+            <a:prstGeom prst="ellipse">
+              <a:avLst/>
+            </a:prstGeom>
+            <a:solidFill>
+              <a:schemeClr val="accent2"/>
+            </a:solidFill>
+          </p:spPr>
+          <p:style>
+            <a:lnRef idx="2">
+              <a:schemeClr val="accent1">
+                <a:shade val="50000"/>
+              </a:schemeClr>
+            </a:lnRef>
+            <a:fillRef idx="1">
+              <a:schemeClr val="accent1"/>
+            </a:fillRef>
+            <a:effectRef idx="0">
+              <a:schemeClr val="accent1"/>
+            </a:effectRef>
+            <a:fontRef idx="minor">
+              <a:schemeClr val="lt1"/>
+            </a:fontRef>
+          </p:style>
+          <p:txBody>
+            <a:bodyPr rtlCol="0" anchor="ctr"/>
+            <a:lstStyle/>
+            <a:p>
+              <a:pPr algn="ctr"/>
+              <a:endParaRPr lang="en-CA"/>
+            </a:p>
+          </p:txBody>
+        </p:sp>
+        <p:pic>
+          <p:nvPicPr>
+            <p:cNvPr id="23" name="Picture 22">
+              <a:extLst>
+                <a:ext uri="{FF2B5EF4-FFF2-40B4-BE49-F238E27FC236}">
+                  <a16:creationId xmlns:a16="http://schemas.microsoft.com/office/drawing/2014/main" id="{42B44C66-2A8C-4C22-819F-CBD75B0DDCD6}"/>
+                </a:ext>
+              </a:extLst>
+            </p:cNvPr>
+            <p:cNvPicPr>
+              <a:picLocks noChangeAspect="1"/>
+            </p:cNvPicPr>
+            <p:nvPr/>
+          </p:nvPicPr>
+          <p:blipFill>
+            <a:blip r:embed="rId2">
+              <a:extLst>
+                <a:ext uri="{28A0092B-C50C-407E-A947-70E740481C1C}">
+                  <a14:useLocalDpi xmlns:a14="http://schemas.microsoft.com/office/drawing/2010/main" val="0"/>
+                </a:ext>
+              </a:extLst>
+            </a:blip>
+            <a:srcRect/>
+            <a:stretch/>
+          </p:blipFill>
+          <p:spPr>
+            <a:xfrm>
+              <a:off x="1315962" y="2136887"/>
+              <a:ext cx="1915751" cy="1915751"/>
+            </a:xfrm>
+            <a:prstGeom prst="flowChartConnector">
+              <a:avLst/>
+            </a:prstGeom>
+          </p:spPr>
+        </p:pic>
+      </p:grpSp>
+      <p:sp>
+        <p:nvSpPr>
+          <p:cNvPr id="24" name="TextBox 23">
+            <a:extLst>
+              <a:ext uri="{FF2B5EF4-FFF2-40B4-BE49-F238E27FC236}">
+                <a16:creationId xmlns:a16="http://schemas.microsoft.com/office/drawing/2014/main" id="{D5A321C3-FFC0-4C5F-AC4A-246C9A8E11BB}"/>
+              </a:ext>
+            </a:extLst>
+          </p:cNvPr>
+          <p:cNvSpPr txBox="1"/>
+          <p:nvPr/>
+        </p:nvSpPr>
         <p:spPr>
           <a:xfrm>
-            <a:off x="11353800" y="308455"/>
-            <a:ext cx="483207" cy="483207"/>
-          </a:xfrm>
-        </p:spPr>
-      </p:pic>
-      <p:cxnSp>
-        <p:nvCxnSpPr>
-          <p:cNvPr id="14" name="Straight Connector 13">
-            <a:extLst>
-              <a:ext uri="{FF2B5EF4-FFF2-40B4-BE49-F238E27FC236}">
-                <a16:creationId xmlns:a16="http://schemas.microsoft.com/office/drawing/2014/main" id="{CF0A6EC9-05A2-41D5-A4D9-F813EF56724A}"/>
-              </a:ext>
-            </a:extLst>
-          </p:cNvPr>
-          <p:cNvCxnSpPr>
-            <a:cxnSpLocks/>
-          </p:cNvCxnSpPr>
-          <p:nvPr/>
-        </p:nvCxnSpPr>
-        <p:spPr>
-          <a:xfrm>
-            <a:off x="725259" y="3094763"/>
-            <a:ext cx="3126658" cy="0"/>
-          </a:xfrm>
-          <a:prstGeom prst="line">
-            <a:avLst/>
-          </a:prstGeom>
-          <a:ln>
-            <a:solidFill>
-              <a:srgbClr val="FFC000"/>
-            </a:solidFill>
-          </a:ln>
-        </p:spPr>
-        <p:style>
-          <a:lnRef idx="2">
-            <a:schemeClr val="accent3"/>
-          </a:lnRef>
-          <a:fillRef idx="0">
-            <a:schemeClr val="accent3"/>
-          </a:fillRef>
-          <a:effectRef idx="1">
-            <a:schemeClr val="accent3"/>
-          </a:effectRef>
-          <a:fontRef idx="minor">
-            <a:schemeClr val="tx1"/>
-          </a:fontRef>
-        </p:style>
-      </p:cxnSp>
-      <p:sp>
-        <p:nvSpPr>
-          <p:cNvPr id="15" name="Oval 14">
-            <a:extLst>
-              <a:ext uri="{FF2B5EF4-FFF2-40B4-BE49-F238E27FC236}">
-                <a16:creationId xmlns:a16="http://schemas.microsoft.com/office/drawing/2014/main" id="{4153D177-BF84-432C-99CC-F8159E5284AA}"/>
-              </a:ext>
-            </a:extLst>
-          </p:cNvPr>
-          <p:cNvSpPr/>
-          <p:nvPr/>
-        </p:nvSpPr>
-        <p:spPr>
-          <a:xfrm>
-            <a:off x="1188358" y="2091267"/>
-            <a:ext cx="2170962" cy="2006993"/>
-          </a:xfrm>
-          <a:prstGeom prst="ellipse">
-            <a:avLst/>
-          </a:prstGeom>
-          <a:solidFill>
-            <a:schemeClr val="accent2"/>
-          </a:solidFill>
-        </p:spPr>
-        <p:style>
-          <a:lnRef idx="2">
-            <a:schemeClr val="accent1">
-              <a:shade val="50000"/>
-            </a:schemeClr>
-          </a:lnRef>
-          <a:fillRef idx="1">
-            <a:schemeClr val="accent1"/>
-          </a:fillRef>
-          <a:effectRef idx="0">
-            <a:schemeClr val="accent1"/>
-          </a:effectRef>
-          <a:fontRef idx="minor">
-            <a:schemeClr val="lt1"/>
-          </a:fontRef>
-        </p:style>
-        <p:txBody>
-          <a:bodyPr rtlCol="0" anchor="ctr"/>
-          <a:lstStyle/>
-          <a:p>
-            <a:pPr algn="ctr"/>
-            <a:endParaRPr lang="en-CA"/>
-          </a:p>
-        </p:txBody>
-      </p:sp>
-      <p:pic>
-        <p:nvPicPr>
-          <p:cNvPr id="23" name="Picture 22">
-            <a:extLst>
-              <a:ext uri="{FF2B5EF4-FFF2-40B4-BE49-F238E27FC236}">
-                <a16:creationId xmlns:a16="http://schemas.microsoft.com/office/drawing/2014/main" id="{42B44C66-2A8C-4C22-819F-CBD75B0DDCD6}"/>
-              </a:ext>
-            </a:extLst>
-          </p:cNvPr>
-          <p:cNvPicPr>
-            <a:picLocks noChangeAspect="1"/>
-          </p:cNvPicPr>
-          <p:nvPr/>
-        </p:nvPicPr>
-        <p:blipFill>
-          <a:blip r:embed="rId3">
-            <a:extLst>
-              <a:ext uri="{28A0092B-C50C-407E-A947-70E740481C1C}">
-                <a14:useLocalDpi xmlns:a14="http://schemas.microsoft.com/office/drawing/2010/main" val="0"/>
-              </a:ext>
-            </a:extLst>
-          </a:blip>
-          <a:stretch>
-            <a:fillRect/>
-          </a:stretch>
-        </p:blipFill>
-        <p:spPr>
-          <a:xfrm>
-            <a:off x="1268853" y="2136887"/>
-            <a:ext cx="2009969" cy="1915751"/>
-          </a:xfrm>
-          <a:prstGeom prst="rect">
-            <a:avLst/>
-          </a:prstGeom>
-        </p:spPr>
-      </p:pic>
-      <p:sp>
-        <p:nvSpPr>
-          <p:cNvPr id="24" name="TextBox 23">
-            <a:extLst>
-              <a:ext uri="{FF2B5EF4-FFF2-40B4-BE49-F238E27FC236}">
-                <a16:creationId xmlns:a16="http://schemas.microsoft.com/office/drawing/2014/main" id="{D5A321C3-FFC0-4C5F-AC4A-246C9A8E11BB}"/>
-              </a:ext>
-            </a:extLst>
-          </p:cNvPr>
-          <p:cNvSpPr txBox="1"/>
-          <p:nvPr/>
-        </p:nvSpPr>
-        <p:spPr>
-          <a:xfrm>
-            <a:off x="995772" y="4630139"/>
-            <a:ext cx="2688630" cy="276999"/>
+            <a:off x="1325547" y="3862047"/>
+            <a:ext cx="2688630" cy="261610"/>
           </a:xfrm>
           <a:prstGeom prst="rect">
             <a:avLst/>
@@ -6960,13 +6945,13 @@
           <a:lstStyle/>
           <a:p>
             <a:r>
-              <a:rPr lang="en-US" sz="1200" dirty="0">
+              <a:rPr lang="en-US" sz="1100" dirty="0">
                 <a:latin typeface="Poppins Medium" panose="00000600000000000000" pitchFamily="2" charset="0"/>
                 <a:cs typeface="Poppins Medium" panose="00000600000000000000" pitchFamily="2" charset="0"/>
               </a:rPr>
-              <a:t>Founder / CEO / Lead Engineer</a:t>
-            </a:r>
-            <a:endParaRPr lang="en-CA" sz="1200" dirty="0">
+              <a:t>Founder | Lead Web3 Engineer</a:t>
+            </a:r>
+            <a:endParaRPr lang="en-CA" sz="1100" dirty="0">
               <a:latin typeface="Poppins Medium" panose="00000600000000000000" pitchFamily="2" charset="0"/>
               <a:cs typeface="Poppins Medium" panose="00000600000000000000" pitchFamily="2" charset="0"/>
             </a:endParaRPr>
@@ -6987,8 +6972,8 @@
         </p:nvSpPr>
         <p:spPr>
           <a:xfrm>
-            <a:off x="973030" y="4199500"/>
-            <a:ext cx="2711371" cy="369332"/>
+            <a:off x="1387905" y="3566643"/>
+            <a:ext cx="2711371" cy="307777"/>
           </a:xfrm>
           <a:prstGeom prst="rect">
             <a:avLst/>
@@ -7002,226 +6987,42 @@
           <a:lstStyle/>
           <a:p>
             <a:r>
-              <a:rPr lang="en-US" dirty="0">
+              <a:rPr lang="en-US" sz="1400" dirty="0">
                 <a:latin typeface="Yeseva One" panose="00000500000000000000" pitchFamily="2" charset="0"/>
                 <a:cs typeface="Poppins Medium" panose="00000600000000000000" pitchFamily="2" charset="0"/>
               </a:rPr>
               <a:t>Christopher </a:t>
             </a:r>
             <a:r>
-              <a:rPr lang="en-US" dirty="0" err="1">
+              <a:rPr lang="en-US" sz="1400" dirty="0" err="1">
                 <a:latin typeface="Yeseva One" panose="00000500000000000000" pitchFamily="2" charset="0"/>
                 <a:cs typeface="Poppins Medium" panose="00000600000000000000" pitchFamily="2" charset="0"/>
               </a:rPr>
               <a:t>Trimboli</a:t>
             </a:r>
-            <a:endParaRPr lang="en-CA" dirty="0">
+            <a:endParaRPr lang="en-CA" sz="1400" dirty="0">
               <a:latin typeface="Yeseva One" panose="00000500000000000000" pitchFamily="2" charset="0"/>
               <a:cs typeface="Poppins Medium" panose="00000600000000000000" pitchFamily="2" charset="0"/>
             </a:endParaRPr>
           </a:p>
         </p:txBody>
       </p:sp>
-      <p:cxnSp>
-        <p:nvCxnSpPr>
-          <p:cNvPr id="42" name="Straight Connector 41">
-            <a:extLst>
-              <a:ext uri="{FF2B5EF4-FFF2-40B4-BE49-F238E27FC236}">
-                <a16:creationId xmlns:a16="http://schemas.microsoft.com/office/drawing/2014/main" id="{C7FEB43B-6C76-41DC-8609-A6E9B07F2357}"/>
-              </a:ext>
-            </a:extLst>
-          </p:cNvPr>
-          <p:cNvCxnSpPr>
-            <a:cxnSpLocks/>
-          </p:cNvCxnSpPr>
+      <p:sp>
+        <p:nvSpPr>
+          <p:cNvPr id="47" name="TextBox 46">
+            <a:extLst>
+              <a:ext uri="{FF2B5EF4-FFF2-40B4-BE49-F238E27FC236}">
+                <a16:creationId xmlns:a16="http://schemas.microsoft.com/office/drawing/2014/main" id="{B1E60453-717B-4F8A-92F4-81315775A76D}"/>
+              </a:ext>
+            </a:extLst>
+          </p:cNvPr>
+          <p:cNvSpPr txBox="1"/>
           <p:nvPr/>
-        </p:nvCxnSpPr>
-        <p:spPr>
-          <a:xfrm flipV="1">
-            <a:off x="4795191" y="2799795"/>
-            <a:ext cx="2601615" cy="24582"/>
-          </a:xfrm>
-          <a:prstGeom prst="line">
-            <a:avLst/>
-          </a:prstGeom>
-          <a:ln>
-            <a:solidFill>
-              <a:schemeClr val="accent3">
-                <a:lumMod val="60000"/>
-                <a:lumOff val="40000"/>
-              </a:schemeClr>
-            </a:solidFill>
-          </a:ln>
-        </p:spPr>
-        <p:style>
-          <a:lnRef idx="1">
-            <a:schemeClr val="accent1"/>
-          </a:lnRef>
-          <a:fillRef idx="0">
-            <a:schemeClr val="accent1"/>
-          </a:fillRef>
-          <a:effectRef idx="0">
-            <a:schemeClr val="accent1"/>
-          </a:effectRef>
-          <a:fontRef idx="minor">
-            <a:schemeClr val="tx1"/>
-          </a:fontRef>
-        </p:style>
-      </p:cxnSp>
-      <p:cxnSp>
-        <p:nvCxnSpPr>
-          <p:cNvPr id="43" name="Straight Connector 42">
-            <a:extLst>
-              <a:ext uri="{FF2B5EF4-FFF2-40B4-BE49-F238E27FC236}">
-                <a16:creationId xmlns:a16="http://schemas.microsoft.com/office/drawing/2014/main" id="{8A0CA6D1-065B-4201-9574-0BDA1EEC0952}"/>
-              </a:ext>
-            </a:extLst>
-          </p:cNvPr>
-          <p:cNvCxnSpPr>
-            <a:cxnSpLocks/>
-          </p:cNvCxnSpPr>
-          <p:nvPr/>
-        </p:nvCxnSpPr>
-        <p:spPr>
-          <a:xfrm flipV="1">
-            <a:off x="4795193" y="3357677"/>
-            <a:ext cx="2601615" cy="24582"/>
-          </a:xfrm>
-          <a:prstGeom prst="line">
-            <a:avLst/>
-          </a:prstGeom>
-          <a:ln>
-            <a:solidFill>
-              <a:schemeClr val="accent3">
-                <a:lumMod val="60000"/>
-                <a:lumOff val="40000"/>
-              </a:schemeClr>
-            </a:solidFill>
-          </a:ln>
-        </p:spPr>
-        <p:style>
-          <a:lnRef idx="1">
-            <a:schemeClr val="accent1"/>
-          </a:lnRef>
-          <a:fillRef idx="0">
-            <a:schemeClr val="accent1"/>
-          </a:fillRef>
-          <a:effectRef idx="0">
-            <a:schemeClr val="accent1"/>
-          </a:effectRef>
-          <a:fontRef idx="minor">
-            <a:schemeClr val="tx1"/>
-          </a:fontRef>
-        </p:style>
-      </p:cxnSp>
-      <p:cxnSp>
-        <p:nvCxnSpPr>
-          <p:cNvPr id="44" name="Straight Connector 43">
-            <a:extLst>
-              <a:ext uri="{FF2B5EF4-FFF2-40B4-BE49-F238E27FC236}">
-                <a16:creationId xmlns:a16="http://schemas.microsoft.com/office/drawing/2014/main" id="{55D905D5-597F-4FCB-AD16-B031C1764589}"/>
-              </a:ext>
-            </a:extLst>
-          </p:cNvPr>
-          <p:cNvCxnSpPr>
-            <a:cxnSpLocks/>
-          </p:cNvCxnSpPr>
-          <p:nvPr/>
-        </p:nvCxnSpPr>
+        </p:nvSpPr>
         <p:spPr>
           <a:xfrm>
-            <a:off x="4547421" y="3094763"/>
-            <a:ext cx="3126658" cy="0"/>
-          </a:xfrm>
-          <a:prstGeom prst="line">
-            <a:avLst/>
-          </a:prstGeom>
-          <a:ln>
-            <a:solidFill>
-              <a:srgbClr val="FB74FE"/>
-            </a:solidFill>
-          </a:ln>
-        </p:spPr>
-        <p:style>
-          <a:lnRef idx="2">
-            <a:schemeClr val="accent3"/>
-          </a:lnRef>
-          <a:fillRef idx="0">
-            <a:schemeClr val="accent3"/>
-          </a:fillRef>
-          <a:effectRef idx="1">
-            <a:schemeClr val="accent3"/>
-          </a:effectRef>
-          <a:fontRef idx="minor">
-            <a:schemeClr val="tx1"/>
-          </a:fontRef>
-        </p:style>
-      </p:cxnSp>
-      <p:sp>
-        <p:nvSpPr>
-          <p:cNvPr id="45" name="Oval 44">
-            <a:extLst>
-              <a:ext uri="{FF2B5EF4-FFF2-40B4-BE49-F238E27FC236}">
-                <a16:creationId xmlns:a16="http://schemas.microsoft.com/office/drawing/2014/main" id="{7E1B78C5-F887-491D-8D3F-1315B786C1C8}"/>
-              </a:ext>
-            </a:extLst>
-          </p:cNvPr>
-          <p:cNvSpPr/>
-          <p:nvPr/>
-        </p:nvSpPr>
-        <p:spPr>
-          <a:xfrm>
-            <a:off x="5010520" y="2091267"/>
-            <a:ext cx="2170962" cy="2006993"/>
-          </a:xfrm>
-          <a:prstGeom prst="ellipse">
-            <a:avLst/>
-          </a:prstGeom>
-          <a:solidFill>
-            <a:srgbClr val="FB74FE"/>
-          </a:solidFill>
-        </p:spPr>
-        <p:style>
-          <a:lnRef idx="2">
-            <a:schemeClr val="accent1">
-              <a:shade val="50000"/>
-            </a:schemeClr>
-          </a:lnRef>
-          <a:fillRef idx="1">
-            <a:schemeClr val="accent1"/>
-          </a:fillRef>
-          <a:effectRef idx="0">
-            <a:schemeClr val="accent1"/>
-          </a:effectRef>
-          <a:fontRef idx="minor">
-            <a:schemeClr val="lt1"/>
-          </a:fontRef>
-        </p:style>
-        <p:txBody>
-          <a:bodyPr rtlCol="0" anchor="ctr"/>
-          <a:lstStyle/>
-          <a:p>
-            <a:pPr algn="ctr"/>
-            <a:endParaRPr lang="en-CA"/>
-          </a:p>
-        </p:txBody>
-      </p:sp>
-      <p:sp>
-        <p:nvSpPr>
-          <p:cNvPr id="47" name="TextBox 46">
-            <a:extLst>
-              <a:ext uri="{FF2B5EF4-FFF2-40B4-BE49-F238E27FC236}">
-                <a16:creationId xmlns:a16="http://schemas.microsoft.com/office/drawing/2014/main" id="{B1E60453-717B-4F8A-92F4-81315775A76D}"/>
-              </a:ext>
-            </a:extLst>
-          </p:cNvPr>
-          <p:cNvSpPr txBox="1"/>
-          <p:nvPr/>
-        </p:nvSpPr>
-        <p:spPr>
-          <a:xfrm>
-            <a:off x="5010520" y="4622666"/>
-            <a:ext cx="2780435" cy="276999"/>
+            <a:off x="4736843" y="3858790"/>
+            <a:ext cx="3126658" cy="261610"/>
           </a:xfrm>
           <a:prstGeom prst="rect">
             <a:avLst/>
@@ -7235,13 +7036,13 @@
           <a:lstStyle/>
           <a:p>
             <a:r>
-              <a:rPr lang="en-US" sz="1200" dirty="0">
+              <a:rPr lang="en-US" sz="1100" dirty="0">
                 <a:latin typeface="Poppins Medium" panose="00000600000000000000" pitchFamily="2" charset="0"/>
                 <a:cs typeface="Poppins Medium" panose="00000600000000000000" pitchFamily="2" charset="0"/>
               </a:rPr>
-              <a:t>Lead Designer / Digital Artist</a:t>
-            </a:r>
-            <a:endParaRPr lang="en-CA" sz="1200" dirty="0">
+              <a:t>Digital Artist | Frontend Developer</a:t>
+            </a:r>
+            <a:endParaRPr lang="en-CA" sz="1100" dirty="0">
               <a:latin typeface="Poppins Medium" panose="00000600000000000000" pitchFamily="2" charset="0"/>
               <a:cs typeface="Poppins Medium" panose="00000600000000000000" pitchFamily="2" charset="0"/>
             </a:endParaRPr>
@@ -7262,8 +7063,8 @@
         </p:nvSpPr>
         <p:spPr>
           <a:xfrm>
-            <a:off x="4795192" y="4199500"/>
-            <a:ext cx="2711371" cy="369332"/>
+            <a:off x="4625703" y="3563706"/>
+            <a:ext cx="2711371" cy="307777"/>
           </a:xfrm>
           <a:prstGeom prst="rect">
             <a:avLst/>
@@ -7278,77 +7079,282 @@
           <a:p>
             <a:pPr algn="ctr"/>
             <a:r>
-              <a:rPr lang="en-US" dirty="0">
+              <a:rPr lang="en-US" sz="1400" dirty="0">
                 <a:latin typeface="Yeseva One" panose="00000500000000000000" pitchFamily="2" charset="0"/>
                 <a:cs typeface="Poppins Medium" panose="00000600000000000000" pitchFamily="2" charset="0"/>
               </a:rPr>
               <a:t>Sylvia </a:t>
             </a:r>
             <a:r>
-              <a:rPr lang="en-US" dirty="0" err="1">
+              <a:rPr lang="en-US" sz="1400" dirty="0" err="1">
                 <a:latin typeface="Yeseva One" panose="00000500000000000000" pitchFamily="2" charset="0"/>
                 <a:cs typeface="Poppins Medium" panose="00000600000000000000" pitchFamily="2" charset="0"/>
               </a:rPr>
               <a:t>Makuch</a:t>
             </a:r>
-            <a:endParaRPr lang="en-CA" dirty="0">
+            <a:endParaRPr lang="en-CA" sz="1400" dirty="0">
               <a:latin typeface="Yeseva One" panose="00000500000000000000" pitchFamily="2" charset="0"/>
               <a:cs typeface="Poppins Medium" panose="00000600000000000000" pitchFamily="2" charset="0"/>
             </a:endParaRPr>
           </a:p>
         </p:txBody>
       </p:sp>
-      <p:pic>
-        <p:nvPicPr>
-          <p:cNvPr id="4" name="Picture 3">
-            <a:extLst>
-              <a:ext uri="{FF2B5EF4-FFF2-40B4-BE49-F238E27FC236}">
-                <a16:creationId xmlns:a16="http://schemas.microsoft.com/office/drawing/2014/main" id="{0A812C7D-57E2-4A7C-AF75-550ADB94F130}"/>
-              </a:ext>
-            </a:extLst>
-          </p:cNvPr>
-          <p:cNvPicPr>
-            <a:picLocks noChangeAspect="1"/>
-          </p:cNvPicPr>
+      <p:grpSp>
+        <p:nvGrpSpPr>
+          <p:cNvPr id="17" name="Group 16">
+            <a:extLst>
+              <a:ext uri="{FF2B5EF4-FFF2-40B4-BE49-F238E27FC236}">
+                <a16:creationId xmlns:a16="http://schemas.microsoft.com/office/drawing/2014/main" id="{4E9BB54E-768D-322B-7F1D-603A142A6907}"/>
+              </a:ext>
+            </a:extLst>
+          </p:cNvPr>
+          <p:cNvGrpSpPr/>
           <p:nvPr/>
-        </p:nvPicPr>
-        <p:blipFill>
-          <a:blip r:embed="rId4">
-            <a:extLst>
-              <a:ext uri="{28A0092B-C50C-407E-A947-70E740481C1C}">
-                <a14:useLocalDpi xmlns:a14="http://schemas.microsoft.com/office/drawing/2010/main" val="0"/>
-              </a:ext>
-            </a:extLst>
-          </a:blip>
-          <a:stretch>
-            <a:fillRect/>
-          </a:stretch>
-        </p:blipFill>
+        </p:nvGrpSpPr>
+        <p:grpSpPr>
+          <a:xfrm>
+            <a:off x="4991534" y="2083302"/>
+            <a:ext cx="1979711" cy="1370201"/>
+            <a:chOff x="4547421" y="2091267"/>
+            <a:chExt cx="3126658" cy="2006993"/>
+          </a:xfrm>
+        </p:grpSpPr>
+        <p:cxnSp>
+          <p:nvCxnSpPr>
+            <p:cNvPr id="42" name="Straight Connector 41">
+              <a:extLst>
+                <a:ext uri="{FF2B5EF4-FFF2-40B4-BE49-F238E27FC236}">
+                  <a16:creationId xmlns:a16="http://schemas.microsoft.com/office/drawing/2014/main" id="{C7FEB43B-6C76-41DC-8609-A6E9B07F2357}"/>
+                </a:ext>
+              </a:extLst>
+            </p:cNvPr>
+            <p:cNvCxnSpPr>
+              <a:cxnSpLocks/>
+            </p:cNvCxnSpPr>
+            <p:nvPr/>
+          </p:nvCxnSpPr>
+          <p:spPr>
+            <a:xfrm flipV="1">
+              <a:off x="4795191" y="2799795"/>
+              <a:ext cx="2601615" cy="24582"/>
+            </a:xfrm>
+            <a:prstGeom prst="line">
+              <a:avLst/>
+            </a:prstGeom>
+            <a:ln>
+              <a:solidFill>
+                <a:schemeClr val="accent3">
+                  <a:lumMod val="60000"/>
+                  <a:lumOff val="40000"/>
+                </a:schemeClr>
+              </a:solidFill>
+            </a:ln>
+          </p:spPr>
+          <p:style>
+            <a:lnRef idx="1">
+              <a:schemeClr val="accent1"/>
+            </a:lnRef>
+            <a:fillRef idx="0">
+              <a:schemeClr val="accent1"/>
+            </a:fillRef>
+            <a:effectRef idx="0">
+              <a:schemeClr val="accent1"/>
+            </a:effectRef>
+            <a:fontRef idx="minor">
+              <a:schemeClr val="tx1"/>
+            </a:fontRef>
+          </p:style>
+        </p:cxnSp>
+        <p:cxnSp>
+          <p:nvCxnSpPr>
+            <p:cNvPr id="43" name="Straight Connector 42">
+              <a:extLst>
+                <a:ext uri="{FF2B5EF4-FFF2-40B4-BE49-F238E27FC236}">
+                  <a16:creationId xmlns:a16="http://schemas.microsoft.com/office/drawing/2014/main" id="{8A0CA6D1-065B-4201-9574-0BDA1EEC0952}"/>
+                </a:ext>
+              </a:extLst>
+            </p:cNvPr>
+            <p:cNvCxnSpPr>
+              <a:cxnSpLocks/>
+            </p:cNvCxnSpPr>
+            <p:nvPr/>
+          </p:nvCxnSpPr>
+          <p:spPr>
+            <a:xfrm flipV="1">
+              <a:off x="4795193" y="3357677"/>
+              <a:ext cx="2601615" cy="24582"/>
+            </a:xfrm>
+            <a:prstGeom prst="line">
+              <a:avLst/>
+            </a:prstGeom>
+            <a:ln>
+              <a:solidFill>
+                <a:schemeClr val="accent3">
+                  <a:lumMod val="60000"/>
+                  <a:lumOff val="40000"/>
+                </a:schemeClr>
+              </a:solidFill>
+            </a:ln>
+          </p:spPr>
+          <p:style>
+            <a:lnRef idx="1">
+              <a:schemeClr val="accent1"/>
+            </a:lnRef>
+            <a:fillRef idx="0">
+              <a:schemeClr val="accent1"/>
+            </a:fillRef>
+            <a:effectRef idx="0">
+              <a:schemeClr val="accent1"/>
+            </a:effectRef>
+            <a:fontRef idx="minor">
+              <a:schemeClr val="tx1"/>
+            </a:fontRef>
+          </p:style>
+        </p:cxnSp>
+        <p:cxnSp>
+          <p:nvCxnSpPr>
+            <p:cNvPr id="44" name="Straight Connector 43">
+              <a:extLst>
+                <a:ext uri="{FF2B5EF4-FFF2-40B4-BE49-F238E27FC236}">
+                  <a16:creationId xmlns:a16="http://schemas.microsoft.com/office/drawing/2014/main" id="{55D905D5-597F-4FCB-AD16-B031C1764589}"/>
+                </a:ext>
+              </a:extLst>
+            </p:cNvPr>
+            <p:cNvCxnSpPr>
+              <a:cxnSpLocks/>
+            </p:cNvCxnSpPr>
+            <p:nvPr/>
+          </p:nvCxnSpPr>
+          <p:spPr>
+            <a:xfrm>
+              <a:off x="4547421" y="3094763"/>
+              <a:ext cx="3126658" cy="0"/>
+            </a:xfrm>
+            <a:prstGeom prst="line">
+              <a:avLst/>
+            </a:prstGeom>
+            <a:ln>
+              <a:solidFill>
+                <a:srgbClr val="FB74FE"/>
+              </a:solidFill>
+            </a:ln>
+          </p:spPr>
+          <p:style>
+            <a:lnRef idx="2">
+              <a:schemeClr val="accent3"/>
+            </a:lnRef>
+            <a:fillRef idx="0">
+              <a:schemeClr val="accent3"/>
+            </a:fillRef>
+            <a:effectRef idx="1">
+              <a:schemeClr val="accent3"/>
+            </a:effectRef>
+            <a:fontRef idx="minor">
+              <a:schemeClr val="tx1"/>
+            </a:fontRef>
+          </p:style>
+        </p:cxnSp>
+        <p:sp>
+          <p:nvSpPr>
+            <p:cNvPr id="45" name="Oval 44">
+              <a:extLst>
+                <a:ext uri="{FF2B5EF4-FFF2-40B4-BE49-F238E27FC236}">
+                  <a16:creationId xmlns:a16="http://schemas.microsoft.com/office/drawing/2014/main" id="{7E1B78C5-F887-491D-8D3F-1315B786C1C8}"/>
+                </a:ext>
+              </a:extLst>
+            </p:cNvPr>
+            <p:cNvSpPr/>
+            <p:nvPr/>
+          </p:nvSpPr>
+          <p:spPr>
+            <a:xfrm>
+              <a:off x="5010520" y="2091267"/>
+              <a:ext cx="2170962" cy="2006993"/>
+            </a:xfrm>
+            <a:prstGeom prst="ellipse">
+              <a:avLst/>
+            </a:prstGeom>
+            <a:solidFill>
+              <a:srgbClr val="FB74FE"/>
+            </a:solidFill>
+          </p:spPr>
+          <p:style>
+            <a:lnRef idx="2">
+              <a:schemeClr val="accent1">
+                <a:shade val="50000"/>
+              </a:schemeClr>
+            </a:lnRef>
+            <a:fillRef idx="1">
+              <a:schemeClr val="accent1"/>
+            </a:fillRef>
+            <a:effectRef idx="0">
+              <a:schemeClr val="accent1"/>
+            </a:effectRef>
+            <a:fontRef idx="minor">
+              <a:schemeClr val="lt1"/>
+            </a:fontRef>
+          </p:style>
+          <p:txBody>
+            <a:bodyPr rtlCol="0" anchor="ctr"/>
+            <a:lstStyle/>
+            <a:p>
+              <a:pPr algn="ctr"/>
+              <a:endParaRPr lang="en-CA"/>
+            </a:p>
+          </p:txBody>
+        </p:sp>
+        <p:pic>
+          <p:nvPicPr>
+            <p:cNvPr id="4" name="Picture 3">
+              <a:extLst>
+                <a:ext uri="{FF2B5EF4-FFF2-40B4-BE49-F238E27FC236}">
+                  <a16:creationId xmlns:a16="http://schemas.microsoft.com/office/drawing/2014/main" id="{0A812C7D-57E2-4A7C-AF75-550ADB94F130}"/>
+                </a:ext>
+              </a:extLst>
+            </p:cNvPr>
+            <p:cNvPicPr>
+              <a:picLocks noChangeAspect="1"/>
+            </p:cNvPicPr>
+            <p:nvPr/>
+          </p:nvPicPr>
+          <p:blipFill>
+            <a:blip r:embed="rId3">
+              <a:extLst>
+                <a:ext uri="{28A0092B-C50C-407E-A947-70E740481C1C}">
+                  <a14:useLocalDpi xmlns:a14="http://schemas.microsoft.com/office/drawing/2010/main" val="0"/>
+                </a:ext>
+              </a:extLst>
+            </a:blip>
+            <a:stretch>
+              <a:fillRect/>
+            </a:stretch>
+          </p:blipFill>
+          <p:spPr>
+            <a:xfrm>
+              <a:off x="5102977" y="2163003"/>
+              <a:ext cx="1986045" cy="1889635"/>
+            </a:xfrm>
+            <a:prstGeom prst="rect">
+              <a:avLst/>
+            </a:prstGeom>
+          </p:spPr>
+        </p:pic>
+      </p:grpSp>
+      <p:sp>
+        <p:nvSpPr>
+          <p:cNvPr id="3" name="TextBox 2">
+            <a:extLst>
+              <a:ext uri="{FF2B5EF4-FFF2-40B4-BE49-F238E27FC236}">
+                <a16:creationId xmlns:a16="http://schemas.microsoft.com/office/drawing/2014/main" id="{0DA6CF2E-926C-4441-AE36-0B05CBDE694A}"/>
+              </a:ext>
+            </a:extLst>
+          </p:cNvPr>
+          <p:cNvSpPr txBox="1"/>
+          <p:nvPr/>
+        </p:nvSpPr>
         <p:spPr>
           <a:xfrm>
-            <a:off x="5102975" y="2163003"/>
-            <a:ext cx="1986045" cy="1889635"/>
-          </a:xfrm>
-          <a:prstGeom prst="rect">
-            <a:avLst/>
-          </a:prstGeom>
-        </p:spPr>
-      </p:pic>
-      <p:sp>
-        <p:nvSpPr>
-          <p:cNvPr id="3" name="TextBox 2">
-            <a:extLst>
-              <a:ext uri="{FF2B5EF4-FFF2-40B4-BE49-F238E27FC236}">
-                <a16:creationId xmlns:a16="http://schemas.microsoft.com/office/drawing/2014/main" id="{0DA6CF2E-926C-4441-AE36-0B05CBDE694A}"/>
-              </a:ext>
-            </a:extLst>
-          </p:cNvPr>
-          <p:cNvSpPr txBox="1"/>
-          <p:nvPr/>
-        </p:nvSpPr>
-        <p:spPr>
-          <a:xfrm>
-            <a:off x="9028044" y="4579794"/>
+            <a:off x="9607642" y="6110872"/>
             <a:ext cx="2325756" cy="377687"/>
           </a:xfrm>
           <a:prstGeom prst="rect">
@@ -7366,6 +7372,402 @@
               <a:rPr lang="en-CA" dirty="0"/>
               <a:t>Looking for more…</a:t>
             </a:r>
+          </a:p>
+        </p:txBody>
+      </p:sp>
+      <p:grpSp>
+        <p:nvGrpSpPr>
+          <p:cNvPr id="18" name="Group 17">
+            <a:extLst>
+              <a:ext uri="{FF2B5EF4-FFF2-40B4-BE49-F238E27FC236}">
+                <a16:creationId xmlns:a16="http://schemas.microsoft.com/office/drawing/2014/main" id="{82A1252A-85F7-23D9-698C-2FB505ED4AC2}"/>
+              </a:ext>
+            </a:extLst>
+          </p:cNvPr>
+          <p:cNvGrpSpPr/>
+          <p:nvPr/>
+        </p:nvGrpSpPr>
+        <p:grpSpPr>
+          <a:xfrm>
+            <a:off x="8824821" y="2082323"/>
+            <a:ext cx="2039953" cy="1370202"/>
+            <a:chOff x="8277126" y="2019531"/>
+            <a:chExt cx="3126658" cy="2006993"/>
+          </a:xfrm>
+        </p:grpSpPr>
+        <p:cxnSp>
+          <p:nvCxnSpPr>
+            <p:cNvPr id="19" name="Straight Connector 18">
+              <a:extLst>
+                <a:ext uri="{FF2B5EF4-FFF2-40B4-BE49-F238E27FC236}">
+                  <a16:creationId xmlns:a16="http://schemas.microsoft.com/office/drawing/2014/main" id="{19AAA280-F24B-CE9D-FB0C-2D80750CF19A}"/>
+                </a:ext>
+              </a:extLst>
+            </p:cNvPr>
+            <p:cNvCxnSpPr>
+              <a:cxnSpLocks/>
+            </p:cNvCxnSpPr>
+            <p:nvPr/>
+          </p:nvCxnSpPr>
+          <p:spPr>
+            <a:xfrm flipV="1">
+              <a:off x="8524896" y="2728059"/>
+              <a:ext cx="2601615" cy="24582"/>
+            </a:xfrm>
+            <a:prstGeom prst="line">
+              <a:avLst/>
+            </a:prstGeom>
+            <a:ln>
+              <a:solidFill>
+                <a:schemeClr val="accent3">
+                  <a:lumMod val="60000"/>
+                  <a:lumOff val="40000"/>
+                </a:schemeClr>
+              </a:solidFill>
+            </a:ln>
+          </p:spPr>
+          <p:style>
+            <a:lnRef idx="1">
+              <a:schemeClr val="accent1"/>
+            </a:lnRef>
+            <a:fillRef idx="0">
+              <a:schemeClr val="accent1"/>
+            </a:fillRef>
+            <a:effectRef idx="0">
+              <a:schemeClr val="accent1"/>
+            </a:effectRef>
+            <a:fontRef idx="minor">
+              <a:schemeClr val="tx1"/>
+            </a:fontRef>
+          </p:style>
+        </p:cxnSp>
+        <p:cxnSp>
+          <p:nvCxnSpPr>
+            <p:cNvPr id="20" name="Straight Connector 19">
+              <a:extLst>
+                <a:ext uri="{FF2B5EF4-FFF2-40B4-BE49-F238E27FC236}">
+                  <a16:creationId xmlns:a16="http://schemas.microsoft.com/office/drawing/2014/main" id="{26B09446-2979-8026-CA05-9CA4804E3088}"/>
+                </a:ext>
+              </a:extLst>
+            </p:cNvPr>
+            <p:cNvCxnSpPr>
+              <a:cxnSpLocks/>
+            </p:cNvCxnSpPr>
+            <p:nvPr/>
+          </p:nvCxnSpPr>
+          <p:spPr>
+            <a:xfrm flipV="1">
+              <a:off x="8524898" y="3285941"/>
+              <a:ext cx="2601615" cy="24582"/>
+            </a:xfrm>
+            <a:prstGeom prst="line">
+              <a:avLst/>
+            </a:prstGeom>
+            <a:ln>
+              <a:solidFill>
+                <a:schemeClr val="accent3">
+                  <a:lumMod val="60000"/>
+                  <a:lumOff val="40000"/>
+                </a:schemeClr>
+              </a:solidFill>
+            </a:ln>
+          </p:spPr>
+          <p:style>
+            <a:lnRef idx="1">
+              <a:schemeClr val="accent1"/>
+            </a:lnRef>
+            <a:fillRef idx="0">
+              <a:schemeClr val="accent1"/>
+            </a:fillRef>
+            <a:effectRef idx="0">
+              <a:schemeClr val="accent1"/>
+            </a:effectRef>
+            <a:fontRef idx="minor">
+              <a:schemeClr val="tx1"/>
+            </a:fontRef>
+          </p:style>
+        </p:cxnSp>
+        <p:cxnSp>
+          <p:nvCxnSpPr>
+            <p:cNvPr id="21" name="Straight Connector 20">
+              <a:extLst>
+                <a:ext uri="{FF2B5EF4-FFF2-40B4-BE49-F238E27FC236}">
+                  <a16:creationId xmlns:a16="http://schemas.microsoft.com/office/drawing/2014/main" id="{D28906BD-17DB-6D29-A15F-730C66CFC29E}"/>
+                </a:ext>
+              </a:extLst>
+            </p:cNvPr>
+            <p:cNvCxnSpPr>
+              <a:cxnSpLocks/>
+            </p:cNvCxnSpPr>
+            <p:nvPr/>
+          </p:nvCxnSpPr>
+          <p:spPr>
+            <a:xfrm>
+              <a:off x="8277126" y="3023027"/>
+              <a:ext cx="3126658" cy="0"/>
+            </a:xfrm>
+            <a:prstGeom prst="line">
+              <a:avLst/>
+            </a:prstGeom>
+            <a:ln>
+              <a:solidFill>
+                <a:srgbClr val="00B050"/>
+              </a:solidFill>
+            </a:ln>
+          </p:spPr>
+          <p:style>
+            <a:lnRef idx="2">
+              <a:schemeClr val="accent3"/>
+            </a:lnRef>
+            <a:fillRef idx="0">
+              <a:schemeClr val="accent3"/>
+            </a:fillRef>
+            <a:effectRef idx="1">
+              <a:schemeClr val="accent3"/>
+            </a:effectRef>
+            <a:fontRef idx="minor">
+              <a:schemeClr val="tx1"/>
+            </a:fontRef>
+          </p:style>
+        </p:cxnSp>
+        <p:sp>
+          <p:nvSpPr>
+            <p:cNvPr id="22" name="Oval 21">
+              <a:extLst>
+                <a:ext uri="{FF2B5EF4-FFF2-40B4-BE49-F238E27FC236}">
+                  <a16:creationId xmlns:a16="http://schemas.microsoft.com/office/drawing/2014/main" id="{B61FCAAD-AF7E-30C2-41B6-9EA0B9E30892}"/>
+                </a:ext>
+              </a:extLst>
+            </p:cNvPr>
+            <p:cNvSpPr/>
+            <p:nvPr/>
+          </p:nvSpPr>
+          <p:spPr>
+            <a:xfrm>
+              <a:off x="8740225" y="2019531"/>
+              <a:ext cx="2135813" cy="2006993"/>
+            </a:xfrm>
+            <a:prstGeom prst="ellipse">
+              <a:avLst/>
+            </a:prstGeom>
+            <a:solidFill>
+              <a:srgbClr val="92D050"/>
+            </a:solidFill>
+          </p:spPr>
+          <p:style>
+            <a:lnRef idx="2">
+              <a:schemeClr val="accent1">
+                <a:shade val="50000"/>
+              </a:schemeClr>
+            </a:lnRef>
+            <a:fillRef idx="1">
+              <a:schemeClr val="accent1"/>
+            </a:fillRef>
+            <a:effectRef idx="0">
+              <a:schemeClr val="accent1"/>
+            </a:effectRef>
+            <a:fontRef idx="minor">
+              <a:schemeClr val="lt1"/>
+            </a:fontRef>
+          </p:style>
+          <p:txBody>
+            <a:bodyPr rtlCol="0" anchor="ctr"/>
+            <a:lstStyle/>
+            <a:p>
+              <a:pPr algn="ctr"/>
+              <a:endParaRPr lang="en-CA"/>
+            </a:p>
+          </p:txBody>
+        </p:sp>
+        <p:pic>
+          <p:nvPicPr>
+            <p:cNvPr id="25" name="Picture 24">
+              <a:extLst>
+                <a:ext uri="{FF2B5EF4-FFF2-40B4-BE49-F238E27FC236}">
+                  <a16:creationId xmlns:a16="http://schemas.microsoft.com/office/drawing/2014/main" id="{D0ABB941-4581-4D2A-B727-BF8753685D11}"/>
+                </a:ext>
+              </a:extLst>
+            </p:cNvPr>
+            <p:cNvPicPr>
+              <a:picLocks noChangeAspect="1"/>
+            </p:cNvPicPr>
+            <p:nvPr/>
+          </p:nvPicPr>
+          <p:blipFill rotWithShape="1">
+            <a:blip r:embed="rId4">
+              <a:extLst>
+                <a:ext uri="{28A0092B-C50C-407E-A947-70E740481C1C}">
+                  <a14:useLocalDpi xmlns:a14="http://schemas.microsoft.com/office/drawing/2010/main" val="0"/>
+                </a:ext>
+              </a:extLst>
+            </a:blip>
+            <a:srcRect/>
+            <a:stretch/>
+          </p:blipFill>
+          <p:spPr>
+            <a:xfrm>
+              <a:off x="8846081" y="2060977"/>
+              <a:ext cx="1924099" cy="1924099"/>
+            </a:xfrm>
+            <a:prstGeom prst="flowChartConnector">
+              <a:avLst/>
+            </a:prstGeom>
+          </p:spPr>
+        </p:pic>
+      </p:grpSp>
+      <p:sp>
+        <p:nvSpPr>
+          <p:cNvPr id="28" name="TextBox 27">
+            <a:extLst>
+              <a:ext uri="{FF2B5EF4-FFF2-40B4-BE49-F238E27FC236}">
+                <a16:creationId xmlns:a16="http://schemas.microsoft.com/office/drawing/2014/main" id="{3131FE7C-02CA-9836-2704-BBF0641ABA0B}"/>
+              </a:ext>
+            </a:extLst>
+          </p:cNvPr>
+          <p:cNvSpPr txBox="1"/>
+          <p:nvPr/>
+        </p:nvSpPr>
+        <p:spPr>
+          <a:xfrm>
+            <a:off x="8898932" y="3871483"/>
+            <a:ext cx="2863922" cy="261610"/>
+          </a:xfrm>
+          <a:prstGeom prst="rect">
+            <a:avLst/>
+          </a:prstGeom>
+          <a:noFill/>
+        </p:spPr>
+        <p:txBody>
+          <a:bodyPr wrap="square" rtlCol="0">
+            <a:spAutoFit/>
+          </a:bodyPr>
+          <a:lstStyle/>
+          <a:p>
+            <a:r>
+              <a:rPr lang="en-US" sz="1100" dirty="0" err="1">
+                <a:latin typeface="Poppins Medium" panose="00000600000000000000" pitchFamily="2" charset="0"/>
+                <a:cs typeface="Poppins Medium" panose="00000600000000000000" pitchFamily="2" charset="0"/>
+              </a:rPr>
+              <a:t>Fullstack</a:t>
+            </a:r>
+            <a:r>
+              <a:rPr lang="en-US" sz="1100" dirty="0">
+                <a:latin typeface="Poppins Medium" panose="00000600000000000000" pitchFamily="2" charset="0"/>
+                <a:cs typeface="Poppins Medium" panose="00000600000000000000" pitchFamily="2" charset="0"/>
+              </a:rPr>
+              <a:t> Web3 Engineer</a:t>
+            </a:r>
+            <a:endParaRPr lang="en-CA" sz="1100" dirty="0">
+              <a:latin typeface="Poppins Medium" panose="00000600000000000000" pitchFamily="2" charset="0"/>
+              <a:cs typeface="Poppins Medium" panose="00000600000000000000" pitchFamily="2" charset="0"/>
+            </a:endParaRPr>
+          </a:p>
+        </p:txBody>
+      </p:sp>
+      <p:sp>
+        <p:nvSpPr>
+          <p:cNvPr id="29" name="TextBox 28">
+            <a:extLst>
+              <a:ext uri="{FF2B5EF4-FFF2-40B4-BE49-F238E27FC236}">
+                <a16:creationId xmlns:a16="http://schemas.microsoft.com/office/drawing/2014/main" id="{3970281A-E582-ADCB-32B2-FF8EC85EAFC2}"/>
+              </a:ext>
+            </a:extLst>
+          </p:cNvPr>
+          <p:cNvSpPr txBox="1"/>
+          <p:nvPr/>
+        </p:nvSpPr>
+        <p:spPr>
+          <a:xfrm>
+            <a:off x="8479487" y="3586523"/>
+            <a:ext cx="2711371" cy="307777"/>
+          </a:xfrm>
+          <a:prstGeom prst="rect">
+            <a:avLst/>
+          </a:prstGeom>
+          <a:noFill/>
+        </p:spPr>
+        <p:txBody>
+          <a:bodyPr wrap="square">
+            <a:spAutoFit/>
+          </a:bodyPr>
+          <a:lstStyle/>
+          <a:p>
+            <a:pPr algn="ctr"/>
+            <a:r>
+              <a:rPr lang="en-US" sz="1400" dirty="0">
+                <a:latin typeface="Yeseva One" panose="00000500000000000000" pitchFamily="2" charset="0"/>
+                <a:cs typeface="Poppins Medium" panose="00000600000000000000" pitchFamily="2" charset="0"/>
+              </a:rPr>
+              <a:t>Wei Yan</a:t>
+            </a:r>
+            <a:endParaRPr lang="en-CA" sz="1400" dirty="0">
+              <a:latin typeface="Yeseva One" panose="00000500000000000000" pitchFamily="2" charset="0"/>
+              <a:cs typeface="Poppins Medium" panose="00000600000000000000" pitchFamily="2" charset="0"/>
+            </a:endParaRPr>
+          </a:p>
+        </p:txBody>
+      </p:sp>
+      <p:sp>
+        <p:nvSpPr>
+          <p:cNvPr id="30" name="TextBox 29">
+            <a:extLst>
+              <a:ext uri="{FF2B5EF4-FFF2-40B4-BE49-F238E27FC236}">
+                <a16:creationId xmlns:a16="http://schemas.microsoft.com/office/drawing/2014/main" id="{F472E723-0743-0B51-C0DA-32D0E10E8511}"/>
+              </a:ext>
+            </a:extLst>
+          </p:cNvPr>
+          <p:cNvSpPr txBox="1"/>
+          <p:nvPr/>
+        </p:nvSpPr>
+        <p:spPr>
+          <a:xfrm>
+            <a:off x="1118937" y="4169824"/>
+            <a:ext cx="2787532" cy="2308324"/>
+          </a:xfrm>
+          <a:prstGeom prst="rect">
+            <a:avLst/>
+          </a:prstGeom>
+          <a:noFill/>
+        </p:spPr>
+        <p:txBody>
+          <a:bodyPr wrap="square" rtlCol="0">
+            <a:spAutoFit/>
+          </a:bodyPr>
+          <a:lstStyle/>
+          <a:p>
+            <a:r>
+              <a:rPr lang="en-US" sz="1200" dirty="0"/>
+              <a:t>Christopher was born in the underground, open-source, metaverse. Coding since 19 years old, computer science dropout, senior web2/3 engineer at startup and enterprise</a:t>
+            </a:r>
+            <a:r>
+              <a:rPr lang="en-US" sz="1200" b="1" dirty="0"/>
+              <a:t> </a:t>
+            </a:r>
+            <a:r>
+              <a:rPr lang="en-US" sz="1200" dirty="0"/>
+              <a:t>levels.</a:t>
+            </a:r>
+            <a:br>
+              <a:rPr lang="en-US" sz="1200" dirty="0"/>
+            </a:br>
+            <a:br>
+              <a:rPr lang="en-US" sz="1200" dirty="0"/>
+            </a:br>
+            <a:r>
+              <a:rPr lang="en-US" sz="1200" dirty="0"/>
+              <a:t>Founded Own Me Inc. to bring adult content into the web3 paradigm. </a:t>
+            </a:r>
+            <a:br>
+              <a:rPr lang="en-US" sz="1200" dirty="0"/>
+            </a:br>
+            <a:br>
+              <a:rPr lang="en-US" sz="1200" dirty="0"/>
+            </a:br>
+            <a:r>
+              <a:rPr lang="en-US" sz="1200" dirty="0"/>
+              <a:t>A ruthless, determined and uncompromising technical founder and  businessman.</a:t>
+            </a:r>
+            <a:endParaRPr lang="en-CA" sz="1200" dirty="0"/>
           </a:p>
         </p:txBody>
       </p:sp>

</xml_diff>

<commit_message>
add Sylvia team bio
</commit_message>
<xml_diff>
--- a/own-me-pitch.pptx
+++ b/own-me-pitch.pptx
@@ -272,7 +272,7 @@
           <a:p>
             <a:fld id="{6F0444B0-A3CD-4285-B1AE-FEC941C62C7C}" type="datetimeFigureOut">
               <a:rPr lang="en-CA" smtClean="0"/>
-              <a:t>2022-06-11</a:t>
+              <a:t>2022-06-12</a:t>
             </a:fld>
             <a:endParaRPr lang="en-CA"/>
           </a:p>
@@ -472,7 +472,7 @@
           <a:p>
             <a:fld id="{6F0444B0-A3CD-4285-B1AE-FEC941C62C7C}" type="datetimeFigureOut">
               <a:rPr lang="en-CA" smtClean="0"/>
-              <a:t>2022-06-11</a:t>
+              <a:t>2022-06-12</a:t>
             </a:fld>
             <a:endParaRPr lang="en-CA"/>
           </a:p>
@@ -682,7 +682,7 @@
           <a:p>
             <a:fld id="{6F0444B0-A3CD-4285-B1AE-FEC941C62C7C}" type="datetimeFigureOut">
               <a:rPr lang="en-CA" smtClean="0"/>
-              <a:t>2022-06-11</a:t>
+              <a:t>2022-06-12</a:t>
             </a:fld>
             <a:endParaRPr lang="en-CA"/>
           </a:p>
@@ -882,7 +882,7 @@
           <a:p>
             <a:fld id="{6F0444B0-A3CD-4285-B1AE-FEC941C62C7C}" type="datetimeFigureOut">
               <a:rPr lang="en-CA" smtClean="0"/>
-              <a:t>2022-06-11</a:t>
+              <a:t>2022-06-12</a:t>
             </a:fld>
             <a:endParaRPr lang="en-CA"/>
           </a:p>
@@ -1158,7 +1158,7 @@
           <a:p>
             <a:fld id="{6F0444B0-A3CD-4285-B1AE-FEC941C62C7C}" type="datetimeFigureOut">
               <a:rPr lang="en-CA" smtClean="0"/>
-              <a:t>2022-06-11</a:t>
+              <a:t>2022-06-12</a:t>
             </a:fld>
             <a:endParaRPr lang="en-CA"/>
           </a:p>
@@ -1426,7 +1426,7 @@
           <a:p>
             <a:fld id="{6F0444B0-A3CD-4285-B1AE-FEC941C62C7C}" type="datetimeFigureOut">
               <a:rPr lang="en-CA" smtClean="0"/>
-              <a:t>2022-06-11</a:t>
+              <a:t>2022-06-12</a:t>
             </a:fld>
             <a:endParaRPr lang="en-CA"/>
           </a:p>
@@ -1841,7 +1841,7 @@
           <a:p>
             <a:fld id="{6F0444B0-A3CD-4285-B1AE-FEC941C62C7C}" type="datetimeFigureOut">
               <a:rPr lang="en-CA" smtClean="0"/>
-              <a:t>2022-06-11</a:t>
+              <a:t>2022-06-12</a:t>
             </a:fld>
             <a:endParaRPr lang="en-CA"/>
           </a:p>
@@ -1983,7 +1983,7 @@
           <a:p>
             <a:fld id="{6F0444B0-A3CD-4285-B1AE-FEC941C62C7C}" type="datetimeFigureOut">
               <a:rPr lang="en-CA" smtClean="0"/>
-              <a:t>2022-06-11</a:t>
+              <a:t>2022-06-12</a:t>
             </a:fld>
             <a:endParaRPr lang="en-CA"/>
           </a:p>
@@ -2096,7 +2096,7 @@
           <a:p>
             <a:fld id="{6F0444B0-A3CD-4285-B1AE-FEC941C62C7C}" type="datetimeFigureOut">
               <a:rPr lang="en-CA" smtClean="0"/>
-              <a:t>2022-06-11</a:t>
+              <a:t>2022-06-12</a:t>
             </a:fld>
             <a:endParaRPr lang="en-CA"/>
           </a:p>
@@ -2409,7 +2409,7 @@
           <a:p>
             <a:fld id="{6F0444B0-A3CD-4285-B1AE-FEC941C62C7C}" type="datetimeFigureOut">
               <a:rPr lang="en-CA" smtClean="0"/>
-              <a:t>2022-06-11</a:t>
+              <a:t>2022-06-12</a:t>
             </a:fld>
             <a:endParaRPr lang="en-CA"/>
           </a:p>
@@ -2698,7 +2698,7 @@
           <a:p>
             <a:fld id="{6F0444B0-A3CD-4285-B1AE-FEC941C62C7C}" type="datetimeFigureOut">
               <a:rPr lang="en-CA" smtClean="0"/>
-              <a:t>2022-06-11</a:t>
+              <a:t>2022-06-12</a:t>
             </a:fld>
             <a:endParaRPr lang="en-CA"/>
           </a:p>
@@ -2941,7 +2941,7 @@
           <a:p>
             <a:fld id="{6F0444B0-A3CD-4285-B1AE-FEC941C62C7C}" type="datetimeFigureOut">
               <a:rPr lang="en-CA" smtClean="0"/>
-              <a:t>2022-06-11</a:t>
+              <a:t>2022-06-12</a:t>
             </a:fld>
             <a:endParaRPr lang="en-CA"/>
           </a:p>
@@ -6690,7 +6690,7 @@
         </p:nvGrpSpPr>
         <p:grpSpPr>
           <a:xfrm>
-            <a:off x="1325547" y="2091267"/>
+            <a:off x="1241468" y="1835868"/>
             <a:ext cx="2126225" cy="1370201"/>
             <a:chOff x="725259" y="2091267"/>
             <a:chExt cx="3126658" cy="2006993"/>
@@ -6930,7 +6930,7 @@
         </p:nvSpPr>
         <p:spPr>
           <a:xfrm>
-            <a:off x="1325547" y="3862047"/>
+            <a:off x="1241468" y="3606648"/>
             <a:ext cx="2688630" cy="261610"/>
           </a:xfrm>
           <a:prstGeom prst="rect">
@@ -6972,7 +6972,7 @@
         </p:nvSpPr>
         <p:spPr>
           <a:xfrm>
-            <a:off x="1387905" y="3566643"/>
+            <a:off x="1303826" y="3311244"/>
             <a:ext cx="2711371" cy="307777"/>
           </a:xfrm>
           <a:prstGeom prst="rect">
@@ -7021,7 +7021,7 @@
         </p:nvSpPr>
         <p:spPr>
           <a:xfrm>
-            <a:off x="4736843" y="3858790"/>
+            <a:off x="4867083" y="3586523"/>
             <a:ext cx="3126658" cy="261610"/>
           </a:xfrm>
           <a:prstGeom prst="rect">
@@ -7063,7 +7063,7 @@
         </p:nvSpPr>
         <p:spPr>
           <a:xfrm>
-            <a:off x="4625703" y="3563706"/>
+            <a:off x="4755943" y="3291439"/>
             <a:ext cx="2711371" cy="307777"/>
           </a:xfrm>
           <a:prstGeom prst="rect">
@@ -7113,7 +7113,7 @@
         </p:nvGrpSpPr>
         <p:grpSpPr>
           <a:xfrm>
-            <a:off x="4991534" y="2083302"/>
+            <a:off x="5121774" y="1811035"/>
             <a:ext cx="1979711" cy="1370201"/>
             <a:chOff x="4547421" y="2091267"/>
             <a:chExt cx="3126658" cy="2006993"/>
@@ -7721,8 +7721,8 @@
         </p:nvSpPr>
         <p:spPr>
           <a:xfrm>
-            <a:off x="1118937" y="4169824"/>
-            <a:ext cx="2787532" cy="2308324"/>
+            <a:off x="838200" y="4169824"/>
+            <a:ext cx="3244732" cy="1938992"/>
           </a:xfrm>
           <a:prstGeom prst="rect">
             <a:avLst/>
@@ -7765,7 +7765,63 @@
             </a:br>
             <a:r>
               <a:rPr lang="en-US" sz="1200" dirty="0"/>
-              <a:t>A ruthless, determined and uncompromising technical founder and  businessman.</a:t>
+              <a:t>A ruthless, determined and uncompromising technical founder.</a:t>
+            </a:r>
+            <a:endParaRPr lang="en-CA" sz="1200" dirty="0"/>
+          </a:p>
+        </p:txBody>
+      </p:sp>
+      <p:sp>
+        <p:nvSpPr>
+          <p:cNvPr id="33" name="TextBox 32">
+            <a:extLst>
+              <a:ext uri="{FF2B5EF4-FFF2-40B4-BE49-F238E27FC236}">
+                <a16:creationId xmlns:a16="http://schemas.microsoft.com/office/drawing/2014/main" id="{79728DF3-4658-B00E-6A03-C64B34D13DD8}"/>
+              </a:ext>
+            </a:extLst>
+          </p:cNvPr>
+          <p:cNvSpPr txBox="1"/>
+          <p:nvPr/>
+        </p:nvSpPr>
+        <p:spPr>
+          <a:xfrm>
+            <a:off x="4684295" y="4107575"/>
+            <a:ext cx="3244732" cy="1754326"/>
+          </a:xfrm>
+          <a:prstGeom prst="rect">
+            <a:avLst/>
+          </a:prstGeom>
+          <a:noFill/>
+        </p:spPr>
+        <p:txBody>
+          <a:bodyPr wrap="square" rtlCol="0">
+            <a:spAutoFit/>
+          </a:bodyPr>
+          <a:lstStyle/>
+          <a:p>
+            <a:r>
+              <a:rPr lang="en-US" sz="1200" dirty="0"/>
+              <a:t>Sylvia brings the visual and artistic weaponry. iPad Pro digital artist, React developer, designer and medical field dropout.</a:t>
+            </a:r>
+            <a:br>
+              <a:rPr lang="en-US" sz="1200" dirty="0"/>
+            </a:br>
+            <a:br>
+              <a:rPr lang="en-US" sz="1200" dirty="0"/>
+            </a:br>
+            <a:r>
+              <a:rPr lang="en-US" sz="1200" dirty="0"/>
+              <a:t>Joined forces with Own Me and has created the founding style and art direction for our company.</a:t>
+            </a:r>
+            <a:br>
+              <a:rPr lang="en-US" sz="1200" dirty="0"/>
+            </a:br>
+            <a:br>
+              <a:rPr lang="en-US" sz="1200" dirty="0"/>
+            </a:br>
+            <a:r>
+              <a:rPr lang="en-US" sz="1200" dirty="0"/>
+              <a:t>A charming, educated, talented artist and keen businesswoman.</a:t>
             </a:r>
             <a:endParaRPr lang="en-CA" sz="1200" dirty="0"/>
           </a:p>

</xml_diff>